<commit_message>
more scenes + removed binary likelihood trials
- added second scene/image for each prompt -> 48 scenes in total (2 per prompt x 6 prompts x 4 truth status combinations)
- added code to randomly pick between one of the now two possible scenes per prompt in both target and filler filename variables
- removed likelihood as an option for condition assignment if response format is radio (i.e. binary) as decided it is too unnatural to ask for binary judgements on probability trials
- removed central text for slider trials (now just shows blank)
</commit_message>
<xml_diff>
--- a/pilot/stimuli/pilot_all_scenes.pptx
+++ b/pilot/stimuli/pilot_all_scenes.pptx
@@ -235,7 +235,7 @@
           <a:p>
             <a:fld id="{02BB8D72-771C-BD4A-9CC1-F77D1C2F112E}" type="datetimeFigureOut">
               <a:rPr lang="en-GB" smtClean="0"/>
-              <a:t>02/04/2024</a:t>
+              <a:t>23/05/2024</a:t>
             </a:fld>
             <a:endParaRPr lang="en-GB"/>
           </a:p>
@@ -546,22 +546,7 @@
           <a:bodyPr/>
           <a:lstStyle/>
           <a:p>
-            <a:r>
-              <a:rPr lang="en-GB" dirty="0"/>
-              <a:t>ARC</a:t>
-            </a:r>
-          </a:p>
-          <a:p>
-            <a:r>
-              <a:rPr lang="en-GB" dirty="0"/>
-              <a:t>The circle, which is blue, is right of the triangle</a:t>
-            </a:r>
-          </a:p>
-          <a:p>
-            <a:r>
-              <a:rPr lang="en-GB" dirty="0"/>
-              <a:t>T + T</a:t>
-            </a:r>
+            <a:endParaRPr lang="en-GB" dirty="0"/>
           </a:p>
         </p:txBody>
       </p:sp>
@@ -582,7 +567,7 @@
           <a:p>
             <a:fld id="{B36E31BD-47D6-AF47-9BDE-D36BBCCAD48A}" type="slidenum">
               <a:rPr lang="en-GB" smtClean="0"/>
-              <a:t>2</a:t>
+              <a:t>1</a:t>
             </a:fld>
             <a:endParaRPr lang="en-GB"/>
           </a:p>
@@ -591,7 +576,7 @@
     </p:spTree>
     <p:extLst>
       <p:ext uri="{BB962C8B-B14F-4D97-AF65-F5344CB8AC3E}">
-        <p14:creationId xmlns:p14="http://schemas.microsoft.com/office/powerpoint/2010/main" val="2709311642"/>
+        <p14:creationId xmlns:p14="http://schemas.microsoft.com/office/powerpoint/2010/main" val="2714090626"/>
       </p:ext>
     </p:extLst>
   </p:cSld>
@@ -645,46 +630,12 @@
           <a:bodyPr/>
           <a:lstStyle/>
           <a:p>
-            <a:pPr marL="0" marR="0" lvl="0" indent="0" algn="l" defTabSz="518465" rtl="0" eaLnBrk="1" fontAlgn="auto" latinLnBrk="0" hangingPunct="1">
-              <a:lnSpc>
-                <a:spcPct val="100000"/>
-              </a:lnSpc>
-              <a:spcBef>
-                <a:spcPts val="0"/>
-              </a:spcBef>
-              <a:spcAft>
-                <a:spcPts val="0"/>
-              </a:spcAft>
-              <a:buClrTx/>
-              <a:buSzTx/>
-              <a:buFontTx/>
-              <a:buNone/>
-              <a:tabLst/>
-              <a:defRPr/>
-            </a:pPr>
             <a:r>
               <a:rPr lang="en-GB" dirty="0"/>
               <a:t>ARC</a:t>
             </a:r>
           </a:p>
           <a:p>
-            <a:pPr marL="0" marR="0" lvl="0" indent="0" algn="l" defTabSz="518465" rtl="0" eaLnBrk="1" fontAlgn="auto" latinLnBrk="0" hangingPunct="1">
-              <a:lnSpc>
-                <a:spcPct val="100000"/>
-              </a:lnSpc>
-              <a:spcBef>
-                <a:spcPts val="0"/>
-              </a:spcBef>
-              <a:spcAft>
-                <a:spcPts val="0"/>
-              </a:spcAft>
-              <a:buClrTx/>
-              <a:buSzTx/>
-              <a:buFontTx/>
-              <a:buNone/>
-              <a:tabLst/>
-              <a:defRPr/>
-            </a:pPr>
             <a:r>
               <a:rPr lang="en-GB" dirty="0"/>
               <a:t>The circle, which is blue, is right of the triangle</a:t>
@@ -693,7 +644,7 @@
           <a:p>
             <a:r>
               <a:rPr lang="en-GB" dirty="0"/>
-              <a:t>F + F</a:t>
+              <a:t>F + T</a:t>
             </a:r>
           </a:p>
         </p:txBody>
@@ -715,7 +666,7 @@
           <a:p>
             <a:fld id="{B36E31BD-47D6-AF47-9BDE-D36BBCCAD48A}" type="slidenum">
               <a:rPr lang="en-GB" smtClean="0"/>
-              <a:t>11</a:t>
+              <a:t>10</a:t>
             </a:fld>
             <a:endParaRPr lang="en-GB"/>
           </a:p>
@@ -724,7 +675,7 @@
     </p:spTree>
     <p:extLst>
       <p:ext uri="{BB962C8B-B14F-4D97-AF65-F5344CB8AC3E}">
-        <p14:creationId xmlns:p14="http://schemas.microsoft.com/office/powerpoint/2010/main" val="840748624"/>
+        <p14:creationId xmlns:p14="http://schemas.microsoft.com/office/powerpoint/2010/main" val="2593999224"/>
       </p:ext>
     </p:extLst>
   </p:cSld>
@@ -848,7 +799,7 @@
           <a:p>
             <a:fld id="{B36E31BD-47D6-AF47-9BDE-D36BBCCAD48A}" type="slidenum">
               <a:rPr lang="en-GB" smtClean="0"/>
-              <a:t>12</a:t>
+              <a:t>11</a:t>
             </a:fld>
             <a:endParaRPr lang="en-GB"/>
           </a:p>
@@ -857,7 +808,7 @@
     </p:spTree>
     <p:extLst>
       <p:ext uri="{BB962C8B-B14F-4D97-AF65-F5344CB8AC3E}">
-        <p14:creationId xmlns:p14="http://schemas.microsoft.com/office/powerpoint/2010/main" val="3606906641"/>
+        <p14:creationId xmlns:p14="http://schemas.microsoft.com/office/powerpoint/2010/main" val="840748624"/>
       </p:ext>
     </p:extLst>
   </p:cSld>
@@ -981,7 +932,7 @@
           <a:p>
             <a:fld id="{B36E31BD-47D6-AF47-9BDE-D36BBCCAD48A}" type="slidenum">
               <a:rPr lang="en-GB" smtClean="0"/>
-              <a:t>13</a:t>
+              <a:t>12</a:t>
             </a:fld>
             <a:endParaRPr lang="en-GB"/>
           </a:p>
@@ -990,7 +941,7 @@
     </p:spTree>
     <p:extLst>
       <p:ext uri="{BB962C8B-B14F-4D97-AF65-F5344CB8AC3E}">
-        <p14:creationId xmlns:p14="http://schemas.microsoft.com/office/powerpoint/2010/main" val="594113306"/>
+        <p14:creationId xmlns:p14="http://schemas.microsoft.com/office/powerpoint/2010/main" val="3606906641"/>
       </p:ext>
     </p:extLst>
   </p:cSld>
@@ -1044,21 +995,55 @@
           <a:bodyPr/>
           <a:lstStyle/>
           <a:p>
+            <a:pPr marL="0" marR="0" lvl="0" indent="0" algn="l" defTabSz="518465" rtl="0" eaLnBrk="1" fontAlgn="auto" latinLnBrk="0" hangingPunct="1">
+              <a:lnSpc>
+                <a:spcPct val="100000"/>
+              </a:lnSpc>
+              <a:spcBef>
+                <a:spcPts val="0"/>
+              </a:spcBef>
+              <a:spcAft>
+                <a:spcPts val="0"/>
+              </a:spcAft>
+              <a:buClrTx/>
+              <a:buSzTx/>
+              <a:buFontTx/>
+              <a:buNone/>
+              <a:tabLst/>
+              <a:defRPr/>
+            </a:pPr>
             <a:r>
               <a:rPr lang="en-GB" dirty="0"/>
               <a:t>ARC</a:t>
             </a:r>
           </a:p>
           <a:p>
-            <a:r>
-              <a:rPr lang="en-GB" sz="800" dirty="0"/>
-              <a:t>The square, which is orange, is left of the circle</a:t>
-            </a:r>
-          </a:p>
-          <a:p>
+            <a:pPr marL="0" marR="0" lvl="0" indent="0" algn="l" defTabSz="518465" rtl="0" eaLnBrk="1" fontAlgn="auto" latinLnBrk="0" hangingPunct="1">
+              <a:lnSpc>
+                <a:spcPct val="100000"/>
+              </a:lnSpc>
+              <a:spcBef>
+                <a:spcPts val="0"/>
+              </a:spcBef>
+              <a:spcAft>
+                <a:spcPts val="0"/>
+              </a:spcAft>
+              <a:buClrTx/>
+              <a:buSzTx/>
+              <a:buFontTx/>
+              <a:buNone/>
+              <a:tabLst/>
+              <a:defRPr/>
+            </a:pPr>
             <a:r>
               <a:rPr lang="en-GB" dirty="0"/>
-              <a:t>T + T</a:t>
+              <a:t>The circle, which is blue, is right of the triangle</a:t>
+            </a:r>
+          </a:p>
+          <a:p>
+            <a:r>
+              <a:rPr lang="en-GB" dirty="0"/>
+              <a:t>F + F</a:t>
             </a:r>
           </a:p>
         </p:txBody>
@@ -1080,7 +1065,7 @@
           <a:p>
             <a:fld id="{B36E31BD-47D6-AF47-9BDE-D36BBCCAD48A}" type="slidenum">
               <a:rPr lang="en-GB" smtClean="0"/>
-              <a:t>15</a:t>
+              <a:t>13</a:t>
             </a:fld>
             <a:endParaRPr lang="en-GB"/>
           </a:p>
@@ -1089,7 +1074,7 @@
     </p:spTree>
     <p:extLst>
       <p:ext uri="{BB962C8B-B14F-4D97-AF65-F5344CB8AC3E}">
-        <p14:creationId xmlns:p14="http://schemas.microsoft.com/office/powerpoint/2010/main" val="1812848733"/>
+        <p14:creationId xmlns:p14="http://schemas.microsoft.com/office/powerpoint/2010/main" val="594113306"/>
       </p:ext>
     </p:extLst>
   </p:cSld>
@@ -1150,7 +1135,7 @@
           </a:p>
           <a:p>
             <a:r>
-              <a:rPr lang="en-GB" sz="700" dirty="0"/>
+              <a:rPr lang="en-GB" sz="800" dirty="0"/>
               <a:t>The square, which is orange, is left of the circle</a:t>
             </a:r>
           </a:p>
@@ -1179,7 +1164,7 @@
           <a:p>
             <a:fld id="{B36E31BD-47D6-AF47-9BDE-D36BBCCAD48A}" type="slidenum">
               <a:rPr lang="en-GB" smtClean="0"/>
-              <a:t>16</a:t>
+              <a:t>15</a:t>
             </a:fld>
             <a:endParaRPr lang="en-GB"/>
           </a:p>
@@ -1188,7 +1173,7 @@
     </p:spTree>
     <p:extLst>
       <p:ext uri="{BB962C8B-B14F-4D97-AF65-F5344CB8AC3E}">
-        <p14:creationId xmlns:p14="http://schemas.microsoft.com/office/powerpoint/2010/main" val="3816627194"/>
+        <p14:creationId xmlns:p14="http://schemas.microsoft.com/office/powerpoint/2010/main" val="1812848733"/>
       </p:ext>
     </p:extLst>
   </p:cSld>
@@ -1249,7 +1234,7 @@
           </a:p>
           <a:p>
             <a:r>
-              <a:rPr lang="en-GB" sz="800" dirty="0"/>
+              <a:rPr lang="en-GB" sz="700" dirty="0"/>
               <a:t>The square, which is orange, is left of the circle</a:t>
             </a:r>
           </a:p>
@@ -1278,7 +1263,7 @@
           <a:p>
             <a:fld id="{B36E31BD-47D6-AF47-9BDE-D36BBCCAD48A}" type="slidenum">
               <a:rPr lang="en-GB" smtClean="0"/>
-              <a:t>17</a:t>
+              <a:t>16</a:t>
             </a:fld>
             <a:endParaRPr lang="en-GB"/>
           </a:p>
@@ -1287,7 +1272,7 @@
     </p:spTree>
     <p:extLst>
       <p:ext uri="{BB962C8B-B14F-4D97-AF65-F5344CB8AC3E}">
-        <p14:creationId xmlns:p14="http://schemas.microsoft.com/office/powerpoint/2010/main" val="2313666167"/>
+        <p14:creationId xmlns:p14="http://schemas.microsoft.com/office/powerpoint/2010/main" val="3816627194"/>
       </p:ext>
     </p:extLst>
   </p:cSld>
@@ -1355,7 +1340,7 @@
           <a:p>
             <a:r>
               <a:rPr lang="en-GB" dirty="0"/>
-              <a:t>T + F</a:t>
+              <a:t>T + T</a:t>
             </a:r>
           </a:p>
         </p:txBody>
@@ -1377,7 +1362,7 @@
           <a:p>
             <a:fld id="{B36E31BD-47D6-AF47-9BDE-D36BBCCAD48A}" type="slidenum">
               <a:rPr lang="en-GB" smtClean="0"/>
-              <a:t>18</a:t>
+              <a:t>17</a:t>
             </a:fld>
             <a:endParaRPr lang="en-GB"/>
           </a:p>
@@ -1386,7 +1371,7 @@
     </p:spTree>
     <p:extLst>
       <p:ext uri="{BB962C8B-B14F-4D97-AF65-F5344CB8AC3E}">
-        <p14:creationId xmlns:p14="http://schemas.microsoft.com/office/powerpoint/2010/main" val="640194153"/>
+        <p14:creationId xmlns:p14="http://schemas.microsoft.com/office/powerpoint/2010/main" val="2313666167"/>
       </p:ext>
     </p:extLst>
   </p:cSld>
@@ -1447,7 +1432,7 @@
           </a:p>
           <a:p>
             <a:r>
-              <a:rPr lang="en-GB" sz="700" dirty="0"/>
+              <a:rPr lang="en-GB" sz="800" dirty="0"/>
               <a:t>The square, which is orange, is left of the circle</a:t>
             </a:r>
           </a:p>
@@ -1476,7 +1461,7 @@
           <a:p>
             <a:fld id="{B36E31BD-47D6-AF47-9BDE-D36BBCCAD48A}" type="slidenum">
               <a:rPr lang="en-GB" smtClean="0"/>
-              <a:t>19</a:t>
+              <a:t>18</a:t>
             </a:fld>
             <a:endParaRPr lang="en-GB"/>
           </a:p>
@@ -1485,7 +1470,7 @@
     </p:spTree>
     <p:extLst>
       <p:ext uri="{BB962C8B-B14F-4D97-AF65-F5344CB8AC3E}">
-        <p14:creationId xmlns:p14="http://schemas.microsoft.com/office/powerpoint/2010/main" val="2549450653"/>
+        <p14:creationId xmlns:p14="http://schemas.microsoft.com/office/powerpoint/2010/main" val="640194153"/>
       </p:ext>
     </p:extLst>
   </p:cSld>
@@ -1546,7 +1531,7 @@
           </a:p>
           <a:p>
             <a:r>
-              <a:rPr lang="en-GB" sz="800" dirty="0"/>
+              <a:rPr lang="en-GB" sz="700" dirty="0"/>
               <a:t>The square, which is orange, is left of the circle</a:t>
             </a:r>
           </a:p>
@@ -1575,7 +1560,7 @@
           <a:p>
             <a:fld id="{B36E31BD-47D6-AF47-9BDE-D36BBCCAD48A}" type="slidenum">
               <a:rPr lang="en-GB" smtClean="0"/>
-              <a:t>20</a:t>
+              <a:t>19</a:t>
             </a:fld>
             <a:endParaRPr lang="en-GB"/>
           </a:p>
@@ -1584,7 +1569,7 @@
     </p:spTree>
     <p:extLst>
       <p:ext uri="{BB962C8B-B14F-4D97-AF65-F5344CB8AC3E}">
-        <p14:creationId xmlns:p14="http://schemas.microsoft.com/office/powerpoint/2010/main" val="789334827"/>
+        <p14:creationId xmlns:p14="http://schemas.microsoft.com/office/powerpoint/2010/main" val="2549450653"/>
       </p:ext>
     </p:extLst>
   </p:cSld>
@@ -1652,7 +1637,7 @@
           <a:p>
             <a:r>
               <a:rPr lang="en-GB" dirty="0"/>
-              <a:t>F + T</a:t>
+              <a:t>T + F</a:t>
             </a:r>
           </a:p>
         </p:txBody>
@@ -1674,7 +1659,7 @@
           <a:p>
             <a:fld id="{B36E31BD-47D6-AF47-9BDE-D36BBCCAD48A}" type="slidenum">
               <a:rPr lang="en-GB" smtClean="0"/>
-              <a:t>21</a:t>
+              <a:t>20</a:t>
             </a:fld>
             <a:endParaRPr lang="en-GB"/>
           </a:p>
@@ -1683,7 +1668,7 @@
     </p:spTree>
     <p:extLst>
       <p:ext uri="{BB962C8B-B14F-4D97-AF65-F5344CB8AC3E}">
-        <p14:creationId xmlns:p14="http://schemas.microsoft.com/office/powerpoint/2010/main" val="1214969823"/>
+        <p14:creationId xmlns:p14="http://schemas.microsoft.com/office/powerpoint/2010/main" val="789334827"/>
       </p:ext>
     </p:extLst>
   </p:cSld>
@@ -1773,7 +1758,7 @@
           <a:p>
             <a:fld id="{B36E31BD-47D6-AF47-9BDE-D36BBCCAD48A}" type="slidenum">
               <a:rPr lang="en-GB" smtClean="0"/>
-              <a:t>3</a:t>
+              <a:t>2</a:t>
             </a:fld>
             <a:endParaRPr lang="en-GB"/>
           </a:p>
@@ -1782,7 +1767,7 @@
     </p:spTree>
     <p:extLst>
       <p:ext uri="{BB962C8B-B14F-4D97-AF65-F5344CB8AC3E}">
-        <p14:creationId xmlns:p14="http://schemas.microsoft.com/office/powerpoint/2010/main" val="1906744240"/>
+        <p14:creationId xmlns:p14="http://schemas.microsoft.com/office/powerpoint/2010/main" val="2709311642"/>
       </p:ext>
     </p:extLst>
   </p:cSld>
@@ -1843,7 +1828,7 @@
           </a:p>
           <a:p>
             <a:r>
-              <a:rPr lang="en-GB" sz="700" dirty="0"/>
+              <a:rPr lang="en-GB" sz="800" dirty="0"/>
               <a:t>The square, which is orange, is left of the circle</a:t>
             </a:r>
           </a:p>
@@ -1872,7 +1857,7 @@
           <a:p>
             <a:fld id="{B36E31BD-47D6-AF47-9BDE-D36BBCCAD48A}" type="slidenum">
               <a:rPr lang="en-GB" smtClean="0"/>
-              <a:t>22</a:t>
+              <a:t>21</a:t>
             </a:fld>
             <a:endParaRPr lang="en-GB"/>
           </a:p>
@@ -1881,7 +1866,7 @@
     </p:spTree>
     <p:extLst>
       <p:ext uri="{BB962C8B-B14F-4D97-AF65-F5344CB8AC3E}">
-        <p14:creationId xmlns:p14="http://schemas.microsoft.com/office/powerpoint/2010/main" val="3972400564"/>
+        <p14:creationId xmlns:p14="http://schemas.microsoft.com/office/powerpoint/2010/main" val="1214969823"/>
       </p:ext>
     </p:extLst>
   </p:cSld>
@@ -1942,7 +1927,7 @@
           </a:p>
           <a:p>
             <a:r>
-              <a:rPr lang="en-GB" sz="800" dirty="0"/>
+              <a:rPr lang="en-GB" sz="700" dirty="0"/>
               <a:t>The square, which is orange, is left of the circle</a:t>
             </a:r>
           </a:p>
@@ -1971,7 +1956,7 @@
           <a:p>
             <a:fld id="{B36E31BD-47D6-AF47-9BDE-D36BBCCAD48A}" type="slidenum">
               <a:rPr lang="en-GB" smtClean="0"/>
-              <a:t>23</a:t>
+              <a:t>22</a:t>
             </a:fld>
             <a:endParaRPr lang="en-GB"/>
           </a:p>
@@ -1980,7 +1965,7 @@
     </p:spTree>
     <p:extLst>
       <p:ext uri="{BB962C8B-B14F-4D97-AF65-F5344CB8AC3E}">
-        <p14:creationId xmlns:p14="http://schemas.microsoft.com/office/powerpoint/2010/main" val="3201001439"/>
+        <p14:creationId xmlns:p14="http://schemas.microsoft.com/office/powerpoint/2010/main" val="3972400564"/>
       </p:ext>
     </p:extLst>
   </p:cSld>
@@ -2048,7 +2033,7 @@
           <a:p>
             <a:r>
               <a:rPr lang="en-GB" dirty="0"/>
-              <a:t>F + F</a:t>
+              <a:t>F + T</a:t>
             </a:r>
           </a:p>
         </p:txBody>
@@ -2070,7 +2055,7 @@
           <a:p>
             <a:fld id="{B36E31BD-47D6-AF47-9BDE-D36BBCCAD48A}" type="slidenum">
               <a:rPr lang="en-GB" smtClean="0"/>
-              <a:t>24</a:t>
+              <a:t>23</a:t>
             </a:fld>
             <a:endParaRPr lang="en-GB"/>
           </a:p>
@@ -2079,7 +2064,7 @@
     </p:spTree>
     <p:extLst>
       <p:ext uri="{BB962C8B-B14F-4D97-AF65-F5344CB8AC3E}">
-        <p14:creationId xmlns:p14="http://schemas.microsoft.com/office/powerpoint/2010/main" val="2096276971"/>
+        <p14:creationId xmlns:p14="http://schemas.microsoft.com/office/powerpoint/2010/main" val="3201001439"/>
       </p:ext>
     </p:extLst>
   </p:cSld>
@@ -2140,7 +2125,7 @@
           </a:p>
           <a:p>
             <a:r>
-              <a:rPr lang="en-GB" sz="700" dirty="0"/>
+              <a:rPr lang="en-GB" sz="800" dirty="0"/>
               <a:t>The square, which is orange, is left of the circle</a:t>
             </a:r>
           </a:p>
@@ -2169,7 +2154,7 @@
           <a:p>
             <a:fld id="{B36E31BD-47D6-AF47-9BDE-D36BBCCAD48A}" type="slidenum">
               <a:rPr lang="en-GB" smtClean="0"/>
-              <a:t>25</a:t>
+              <a:t>24</a:t>
             </a:fld>
             <a:endParaRPr lang="en-GB"/>
           </a:p>
@@ -2178,7 +2163,7 @@
     </p:spTree>
     <p:extLst>
       <p:ext uri="{BB962C8B-B14F-4D97-AF65-F5344CB8AC3E}">
-        <p14:creationId xmlns:p14="http://schemas.microsoft.com/office/powerpoint/2010/main" val="1933328535"/>
+        <p14:creationId xmlns:p14="http://schemas.microsoft.com/office/powerpoint/2010/main" val="2096276971"/>
       </p:ext>
     </p:extLst>
   </p:cSld>
@@ -2239,7 +2224,7 @@
           </a:p>
           <a:p>
             <a:r>
-              <a:rPr lang="en-GB" sz="800" dirty="0"/>
+              <a:rPr lang="en-GB" sz="700" dirty="0"/>
               <a:t>The square, which is orange, is left of the circle</a:t>
             </a:r>
           </a:p>
@@ -2268,7 +2253,7 @@
           <a:p>
             <a:fld id="{B36E31BD-47D6-AF47-9BDE-D36BBCCAD48A}" type="slidenum">
               <a:rPr lang="en-GB" smtClean="0"/>
-              <a:t>26</a:t>
+              <a:t>25</a:t>
             </a:fld>
             <a:endParaRPr lang="en-GB"/>
           </a:p>
@@ -2277,7 +2262,7 @@
     </p:spTree>
     <p:extLst>
       <p:ext uri="{BB962C8B-B14F-4D97-AF65-F5344CB8AC3E}">
-        <p14:creationId xmlns:p14="http://schemas.microsoft.com/office/powerpoint/2010/main" val="1001997882"/>
+        <p14:creationId xmlns:p14="http://schemas.microsoft.com/office/powerpoint/2010/main" val="1933328535"/>
       </p:ext>
     </p:extLst>
   </p:cSld>
@@ -2338,14 +2323,14 @@
           </a:p>
           <a:p>
             <a:r>
-              <a:rPr lang="en-GB" sz="700" dirty="0"/>
-              <a:t>The triangle, which is left of the square, is yellow</a:t>
+              <a:rPr lang="en-GB" sz="800" dirty="0"/>
+              <a:t>The square, which is orange, is left of the circle</a:t>
             </a:r>
           </a:p>
           <a:p>
             <a:r>
               <a:rPr lang="en-GB" dirty="0"/>
-              <a:t>T + T</a:t>
+              <a:t>F + F</a:t>
             </a:r>
           </a:p>
         </p:txBody>
@@ -2367,7 +2352,7 @@
           <a:p>
             <a:fld id="{B36E31BD-47D6-AF47-9BDE-D36BBCCAD48A}" type="slidenum">
               <a:rPr lang="en-GB" smtClean="0"/>
-              <a:t>28</a:t>
+              <a:t>26</a:t>
             </a:fld>
             <a:endParaRPr lang="en-GB"/>
           </a:p>
@@ -2376,7 +2361,7 @@
     </p:spTree>
     <p:extLst>
       <p:ext uri="{BB962C8B-B14F-4D97-AF65-F5344CB8AC3E}">
-        <p14:creationId xmlns:p14="http://schemas.microsoft.com/office/powerpoint/2010/main" val="3952205427"/>
+        <p14:creationId xmlns:p14="http://schemas.microsoft.com/office/powerpoint/2010/main" val="1001997882"/>
       </p:ext>
     </p:extLst>
   </p:cSld>
@@ -2466,7 +2451,7 @@
           <a:p>
             <a:fld id="{B36E31BD-47D6-AF47-9BDE-D36BBCCAD48A}" type="slidenum">
               <a:rPr lang="en-GB" smtClean="0"/>
-              <a:t>29</a:t>
+              <a:t>28</a:t>
             </a:fld>
             <a:endParaRPr lang="en-GB"/>
           </a:p>
@@ -2475,7 +2460,7 @@
     </p:spTree>
     <p:extLst>
       <p:ext uri="{BB962C8B-B14F-4D97-AF65-F5344CB8AC3E}">
-        <p14:creationId xmlns:p14="http://schemas.microsoft.com/office/powerpoint/2010/main" val="1478311011"/>
+        <p14:creationId xmlns:p14="http://schemas.microsoft.com/office/powerpoint/2010/main" val="3952205427"/>
       </p:ext>
     </p:extLst>
   </p:cSld>
@@ -2565,7 +2550,7 @@
           <a:p>
             <a:fld id="{B36E31BD-47D6-AF47-9BDE-D36BBCCAD48A}" type="slidenum">
               <a:rPr lang="en-GB" smtClean="0"/>
-              <a:t>30</a:t>
+              <a:t>29</a:t>
             </a:fld>
             <a:endParaRPr lang="en-GB"/>
           </a:p>
@@ -2574,7 +2559,7 @@
     </p:spTree>
     <p:extLst>
       <p:ext uri="{BB962C8B-B14F-4D97-AF65-F5344CB8AC3E}">
-        <p14:creationId xmlns:p14="http://schemas.microsoft.com/office/powerpoint/2010/main" val="3121725976"/>
+        <p14:creationId xmlns:p14="http://schemas.microsoft.com/office/powerpoint/2010/main" val="1478311011"/>
       </p:ext>
     </p:extLst>
   </p:cSld>
@@ -2642,7 +2627,7 @@
           <a:p>
             <a:r>
               <a:rPr lang="en-GB" dirty="0"/>
-              <a:t>T + F</a:t>
+              <a:t>T + T</a:t>
             </a:r>
           </a:p>
         </p:txBody>
@@ -2664,7 +2649,7 @@
           <a:p>
             <a:fld id="{B36E31BD-47D6-AF47-9BDE-D36BBCCAD48A}" type="slidenum">
               <a:rPr lang="en-GB" smtClean="0"/>
-              <a:t>31</a:t>
+              <a:t>30</a:t>
             </a:fld>
             <a:endParaRPr lang="en-GB"/>
           </a:p>
@@ -2673,7 +2658,7 @@
     </p:spTree>
     <p:extLst>
       <p:ext uri="{BB962C8B-B14F-4D97-AF65-F5344CB8AC3E}">
-        <p14:creationId xmlns:p14="http://schemas.microsoft.com/office/powerpoint/2010/main" val="3770593151"/>
+        <p14:creationId xmlns:p14="http://schemas.microsoft.com/office/powerpoint/2010/main" val="3121725976"/>
       </p:ext>
     </p:extLst>
   </p:cSld>
@@ -2763,7 +2748,7 @@
           <a:p>
             <a:fld id="{B36E31BD-47D6-AF47-9BDE-D36BBCCAD48A}" type="slidenum">
               <a:rPr lang="en-GB" smtClean="0"/>
-              <a:t>32</a:t>
+              <a:t>31</a:t>
             </a:fld>
             <a:endParaRPr lang="en-GB"/>
           </a:p>
@@ -2772,7 +2757,7 @@
     </p:spTree>
     <p:extLst>
       <p:ext uri="{BB962C8B-B14F-4D97-AF65-F5344CB8AC3E}">
-        <p14:creationId xmlns:p14="http://schemas.microsoft.com/office/powerpoint/2010/main" val="2780036475"/>
+        <p14:creationId xmlns:p14="http://schemas.microsoft.com/office/powerpoint/2010/main" val="3770593151"/>
       </p:ext>
     </p:extLst>
   </p:cSld>
@@ -2862,7 +2847,7 @@
           <a:p>
             <a:fld id="{B36E31BD-47D6-AF47-9BDE-D36BBCCAD48A}" type="slidenum">
               <a:rPr lang="en-GB" smtClean="0"/>
-              <a:t>4</a:t>
+              <a:t>3</a:t>
             </a:fld>
             <a:endParaRPr lang="en-GB"/>
           </a:p>
@@ -2871,7 +2856,7 @@
     </p:spTree>
     <p:extLst>
       <p:ext uri="{BB962C8B-B14F-4D97-AF65-F5344CB8AC3E}">
-        <p14:creationId xmlns:p14="http://schemas.microsoft.com/office/powerpoint/2010/main" val="3870357151"/>
+        <p14:creationId xmlns:p14="http://schemas.microsoft.com/office/powerpoint/2010/main" val="1906744240"/>
       </p:ext>
     </p:extLst>
   </p:cSld>
@@ -2961,7 +2946,7 @@
           <a:p>
             <a:fld id="{B36E31BD-47D6-AF47-9BDE-D36BBCCAD48A}" type="slidenum">
               <a:rPr lang="en-GB" smtClean="0"/>
-              <a:t>33</a:t>
+              <a:t>32</a:t>
             </a:fld>
             <a:endParaRPr lang="en-GB"/>
           </a:p>
@@ -2970,7 +2955,7 @@
     </p:spTree>
     <p:extLst>
       <p:ext uri="{BB962C8B-B14F-4D97-AF65-F5344CB8AC3E}">
-        <p14:creationId xmlns:p14="http://schemas.microsoft.com/office/powerpoint/2010/main" val="746636157"/>
+        <p14:creationId xmlns:p14="http://schemas.microsoft.com/office/powerpoint/2010/main" val="2780036475"/>
       </p:ext>
     </p:extLst>
   </p:cSld>
@@ -3038,7 +3023,7 @@
           <a:p>
             <a:r>
               <a:rPr lang="en-GB" dirty="0"/>
-              <a:t>F + T</a:t>
+              <a:t>T + F</a:t>
             </a:r>
           </a:p>
         </p:txBody>
@@ -3060,7 +3045,7 @@
           <a:p>
             <a:fld id="{B36E31BD-47D6-AF47-9BDE-D36BBCCAD48A}" type="slidenum">
               <a:rPr lang="en-GB" smtClean="0"/>
-              <a:t>34</a:t>
+              <a:t>33</a:t>
             </a:fld>
             <a:endParaRPr lang="en-GB"/>
           </a:p>
@@ -3069,7 +3054,7 @@
     </p:spTree>
     <p:extLst>
       <p:ext uri="{BB962C8B-B14F-4D97-AF65-F5344CB8AC3E}">
-        <p14:creationId xmlns:p14="http://schemas.microsoft.com/office/powerpoint/2010/main" val="2426873934"/>
+        <p14:creationId xmlns:p14="http://schemas.microsoft.com/office/powerpoint/2010/main" val="746636157"/>
       </p:ext>
     </p:extLst>
   </p:cSld>
@@ -3159,7 +3144,7 @@
           <a:p>
             <a:fld id="{B36E31BD-47D6-AF47-9BDE-D36BBCCAD48A}" type="slidenum">
               <a:rPr lang="en-GB" smtClean="0"/>
-              <a:t>35</a:t>
+              <a:t>34</a:t>
             </a:fld>
             <a:endParaRPr lang="en-GB"/>
           </a:p>
@@ -3168,7 +3153,7 @@
     </p:spTree>
     <p:extLst>
       <p:ext uri="{BB962C8B-B14F-4D97-AF65-F5344CB8AC3E}">
-        <p14:creationId xmlns:p14="http://schemas.microsoft.com/office/powerpoint/2010/main" val="3044411204"/>
+        <p14:creationId xmlns:p14="http://schemas.microsoft.com/office/powerpoint/2010/main" val="2426873934"/>
       </p:ext>
     </p:extLst>
   </p:cSld>
@@ -3258,7 +3243,7 @@
           <a:p>
             <a:fld id="{B36E31BD-47D6-AF47-9BDE-D36BBCCAD48A}" type="slidenum">
               <a:rPr lang="en-GB" smtClean="0"/>
-              <a:t>36</a:t>
+              <a:t>35</a:t>
             </a:fld>
             <a:endParaRPr lang="en-GB"/>
           </a:p>
@@ -3267,7 +3252,7 @@
     </p:spTree>
     <p:extLst>
       <p:ext uri="{BB962C8B-B14F-4D97-AF65-F5344CB8AC3E}">
-        <p14:creationId xmlns:p14="http://schemas.microsoft.com/office/powerpoint/2010/main" val="2202838759"/>
+        <p14:creationId xmlns:p14="http://schemas.microsoft.com/office/powerpoint/2010/main" val="3044411204"/>
       </p:ext>
     </p:extLst>
   </p:cSld>
@@ -3335,7 +3320,7 @@
           <a:p>
             <a:r>
               <a:rPr lang="en-GB" dirty="0"/>
-              <a:t>F + F</a:t>
+              <a:t>F + T</a:t>
             </a:r>
           </a:p>
         </p:txBody>
@@ -3357,7 +3342,7 @@
           <a:p>
             <a:fld id="{B36E31BD-47D6-AF47-9BDE-D36BBCCAD48A}" type="slidenum">
               <a:rPr lang="en-GB" smtClean="0"/>
-              <a:t>37</a:t>
+              <a:t>36</a:t>
             </a:fld>
             <a:endParaRPr lang="en-GB"/>
           </a:p>
@@ -3366,7 +3351,7 @@
     </p:spTree>
     <p:extLst>
       <p:ext uri="{BB962C8B-B14F-4D97-AF65-F5344CB8AC3E}">
-        <p14:creationId xmlns:p14="http://schemas.microsoft.com/office/powerpoint/2010/main" val="321301765"/>
+        <p14:creationId xmlns:p14="http://schemas.microsoft.com/office/powerpoint/2010/main" val="2202838759"/>
       </p:ext>
     </p:extLst>
   </p:cSld>
@@ -3456,6 +3441,105 @@
           <a:p>
             <a:fld id="{B36E31BD-47D6-AF47-9BDE-D36BBCCAD48A}" type="slidenum">
               <a:rPr lang="en-GB" smtClean="0"/>
+              <a:t>37</a:t>
+            </a:fld>
+            <a:endParaRPr lang="en-GB"/>
+          </a:p>
+        </p:txBody>
+      </p:sp>
+    </p:spTree>
+    <p:extLst>
+      <p:ext uri="{BB962C8B-B14F-4D97-AF65-F5344CB8AC3E}">
+        <p14:creationId xmlns:p14="http://schemas.microsoft.com/office/powerpoint/2010/main" val="321301765"/>
+      </p:ext>
+    </p:extLst>
+  </p:cSld>
+  <p:clrMapOvr>
+    <a:masterClrMapping/>
+  </p:clrMapOvr>
+</p:notes>
+</file>
+
+<file path=ppt/notesSlides/notesSlide36.xml><?xml version="1.0" encoding="utf-8"?>
+<p:notes xmlns:a="http://schemas.openxmlformats.org/drawingml/2006/main" xmlns:r="http://schemas.openxmlformats.org/officeDocument/2006/relationships" xmlns:p="http://schemas.openxmlformats.org/presentationml/2006/main">
+  <p:cSld>
+    <p:spTree>
+      <p:nvGrpSpPr>
+        <p:cNvPr id="1" name=""/>
+        <p:cNvGrpSpPr/>
+        <p:nvPr/>
+      </p:nvGrpSpPr>
+      <p:grpSpPr>
+        <a:xfrm>
+          <a:off x="0" y="0"/>
+          <a:ext cx="0" cy="0"/>
+          <a:chOff x="0" y="0"/>
+          <a:chExt cx="0" cy="0"/>
+        </a:xfrm>
+      </p:grpSpPr>
+      <p:sp>
+        <p:nvSpPr>
+          <p:cNvPr id="2" name="Slide Image Placeholder 1"/>
+          <p:cNvSpPr>
+            <a:spLocks noGrp="1" noRot="1" noChangeAspect="1"/>
+          </p:cNvSpPr>
+          <p:nvPr>
+            <p:ph type="sldImg"/>
+          </p:nvPr>
+        </p:nvSpPr>
+        <p:spPr/>
+      </p:sp>
+      <p:sp>
+        <p:nvSpPr>
+          <p:cNvPr id="3" name="Notes Placeholder 2"/>
+          <p:cNvSpPr>
+            <a:spLocks noGrp="1"/>
+          </p:cNvSpPr>
+          <p:nvPr>
+            <p:ph type="body" idx="1"/>
+          </p:nvPr>
+        </p:nvSpPr>
+        <p:spPr/>
+        <p:txBody>
+          <a:bodyPr/>
+          <a:lstStyle/>
+          <a:p>
+            <a:r>
+              <a:rPr lang="en-GB" dirty="0"/>
+              <a:t>ARC</a:t>
+            </a:r>
+          </a:p>
+          <a:p>
+            <a:r>
+              <a:rPr lang="en-GB" sz="700" dirty="0"/>
+              <a:t>The triangle, which is left of the square, is yellow</a:t>
+            </a:r>
+          </a:p>
+          <a:p>
+            <a:r>
+              <a:rPr lang="en-GB" dirty="0"/>
+              <a:t>F + F</a:t>
+            </a:r>
+          </a:p>
+        </p:txBody>
+      </p:sp>
+      <p:sp>
+        <p:nvSpPr>
+          <p:cNvPr id="4" name="Slide Number Placeholder 3"/>
+          <p:cNvSpPr>
+            <a:spLocks noGrp="1"/>
+          </p:cNvSpPr>
+          <p:nvPr>
+            <p:ph type="sldNum" sz="quarter" idx="5"/>
+          </p:nvPr>
+        </p:nvSpPr>
+        <p:spPr/>
+        <p:txBody>
+          <a:bodyPr/>
+          <a:lstStyle/>
+          <a:p>
+            <a:fld id="{B36E31BD-47D6-AF47-9BDE-D36BBCCAD48A}" type="slidenum">
+              <a:rPr lang="en-GB" smtClean="0"/>
               <a:t>38</a:t>
             </a:fld>
             <a:endParaRPr lang="en-GB"/>
@@ -3475,7 +3559,7 @@
 </p:notes>
 </file>
 
-<file path=ppt/notesSlides/notesSlide36.xml><?xml version="1.0" encoding="utf-8"?>
+<file path=ppt/notesSlides/notesSlide37.xml><?xml version="1.0" encoding="utf-8"?>
 <p:notes xmlns:a="http://schemas.openxmlformats.org/drawingml/2006/main" xmlns:r="http://schemas.openxmlformats.org/officeDocument/2006/relationships" xmlns:p="http://schemas.openxmlformats.org/presentationml/2006/main">
   <p:cSld>
     <p:spTree>
@@ -3632,7 +3716,7 @@
           <a:p>
             <a:r>
               <a:rPr lang="en-GB" dirty="0"/>
-              <a:t>T + F</a:t>
+              <a:t>T + T</a:t>
             </a:r>
           </a:p>
         </p:txBody>
@@ -3654,7 +3738,7 @@
           <a:p>
             <a:fld id="{B36E31BD-47D6-AF47-9BDE-D36BBCCAD48A}" type="slidenum">
               <a:rPr lang="en-GB" smtClean="0"/>
-              <a:t>5</a:t>
+              <a:t>4</a:t>
             </a:fld>
             <a:endParaRPr lang="en-GB"/>
           </a:p>
@@ -3663,7 +3747,7 @@
     </p:spTree>
     <p:extLst>
       <p:ext uri="{BB962C8B-B14F-4D97-AF65-F5344CB8AC3E}">
-        <p14:creationId xmlns:p14="http://schemas.microsoft.com/office/powerpoint/2010/main" val="2876737755"/>
+        <p14:creationId xmlns:p14="http://schemas.microsoft.com/office/powerpoint/2010/main" val="3870357151"/>
       </p:ext>
     </p:extLst>
   </p:cSld>
@@ -3753,7 +3837,7 @@
           <a:p>
             <a:fld id="{B36E31BD-47D6-AF47-9BDE-D36BBCCAD48A}" type="slidenum">
               <a:rPr lang="en-GB" smtClean="0"/>
-              <a:t>6</a:t>
+              <a:t>5</a:t>
             </a:fld>
             <a:endParaRPr lang="en-GB"/>
           </a:p>
@@ -3762,7 +3846,7 @@
     </p:spTree>
     <p:extLst>
       <p:ext uri="{BB962C8B-B14F-4D97-AF65-F5344CB8AC3E}">
-        <p14:creationId xmlns:p14="http://schemas.microsoft.com/office/powerpoint/2010/main" val="2496012589"/>
+        <p14:creationId xmlns:p14="http://schemas.microsoft.com/office/powerpoint/2010/main" val="2876737755"/>
       </p:ext>
     </p:extLst>
   </p:cSld>
@@ -3852,7 +3936,7 @@
           <a:p>
             <a:fld id="{B36E31BD-47D6-AF47-9BDE-D36BBCCAD48A}" type="slidenum">
               <a:rPr lang="en-GB" smtClean="0"/>
-              <a:t>7</a:t>
+              <a:t>6</a:t>
             </a:fld>
             <a:endParaRPr lang="en-GB"/>
           </a:p>
@@ -3861,7 +3945,7 @@
     </p:spTree>
     <p:extLst>
       <p:ext uri="{BB962C8B-B14F-4D97-AF65-F5344CB8AC3E}">
-        <p14:creationId xmlns:p14="http://schemas.microsoft.com/office/powerpoint/2010/main" val="1012625388"/>
+        <p14:creationId xmlns:p14="http://schemas.microsoft.com/office/powerpoint/2010/main" val="2496012589"/>
       </p:ext>
     </p:extLst>
   </p:cSld>
@@ -3929,7 +4013,7 @@
           <a:p>
             <a:r>
               <a:rPr lang="en-GB" dirty="0"/>
-              <a:t>F + T</a:t>
+              <a:t>T + F</a:t>
             </a:r>
           </a:p>
         </p:txBody>
@@ -3951,7 +4035,7 @@
           <a:p>
             <a:fld id="{B36E31BD-47D6-AF47-9BDE-D36BBCCAD48A}" type="slidenum">
               <a:rPr lang="en-GB" smtClean="0"/>
-              <a:t>8</a:t>
+              <a:t>7</a:t>
             </a:fld>
             <a:endParaRPr lang="en-GB"/>
           </a:p>
@@ -3960,7 +4044,7 @@
     </p:spTree>
     <p:extLst>
       <p:ext uri="{BB962C8B-B14F-4D97-AF65-F5344CB8AC3E}">
-        <p14:creationId xmlns:p14="http://schemas.microsoft.com/office/powerpoint/2010/main" val="2944111266"/>
+        <p14:creationId xmlns:p14="http://schemas.microsoft.com/office/powerpoint/2010/main" val="1012625388"/>
       </p:ext>
     </p:extLst>
   </p:cSld>
@@ -4050,7 +4134,7 @@
           <a:p>
             <a:fld id="{B36E31BD-47D6-AF47-9BDE-D36BBCCAD48A}" type="slidenum">
               <a:rPr lang="en-GB" smtClean="0"/>
-              <a:t>9</a:t>
+              <a:t>8</a:t>
             </a:fld>
             <a:endParaRPr lang="en-GB"/>
           </a:p>
@@ -4059,7 +4143,7 @@
     </p:spTree>
     <p:extLst>
       <p:ext uri="{BB962C8B-B14F-4D97-AF65-F5344CB8AC3E}">
-        <p14:creationId xmlns:p14="http://schemas.microsoft.com/office/powerpoint/2010/main" val="2515573565"/>
+        <p14:creationId xmlns:p14="http://schemas.microsoft.com/office/powerpoint/2010/main" val="2944111266"/>
       </p:ext>
     </p:extLst>
   </p:cSld>
@@ -4149,7 +4233,7 @@
           <a:p>
             <a:fld id="{B36E31BD-47D6-AF47-9BDE-D36BBCCAD48A}" type="slidenum">
               <a:rPr lang="en-GB" smtClean="0"/>
-              <a:t>10</a:t>
+              <a:t>9</a:t>
             </a:fld>
             <a:endParaRPr lang="en-GB"/>
           </a:p>
@@ -4158,7 +4242,7 @@
     </p:spTree>
     <p:extLst>
       <p:ext uri="{BB962C8B-B14F-4D97-AF65-F5344CB8AC3E}">
-        <p14:creationId xmlns:p14="http://schemas.microsoft.com/office/powerpoint/2010/main" val="2593999224"/>
+        <p14:creationId xmlns:p14="http://schemas.microsoft.com/office/powerpoint/2010/main" val="2515573565"/>
       </p:ext>
     </p:extLst>
   </p:cSld>
@@ -4299,7 +4383,7 @@
           <a:p>
             <a:fld id="{ED2FA5E0-9DF3-3448-9EC7-9B2886EDE714}" type="datetimeFigureOut">
               <a:rPr lang="en-GB" smtClean="0"/>
-              <a:t>02/04/2024</a:t>
+              <a:t>23/05/2024</a:t>
             </a:fld>
             <a:endParaRPr lang="en-GB"/>
           </a:p>
@@ -4469,7 +4553,7 @@
           <a:p>
             <a:fld id="{ED2FA5E0-9DF3-3448-9EC7-9B2886EDE714}" type="datetimeFigureOut">
               <a:rPr lang="en-GB" smtClean="0"/>
-              <a:t>02/04/2024</a:t>
+              <a:t>23/05/2024</a:t>
             </a:fld>
             <a:endParaRPr lang="en-GB"/>
           </a:p>
@@ -4649,7 +4733,7 @@
           <a:p>
             <a:fld id="{ED2FA5E0-9DF3-3448-9EC7-9B2886EDE714}" type="datetimeFigureOut">
               <a:rPr lang="en-GB" smtClean="0"/>
-              <a:t>02/04/2024</a:t>
+              <a:t>23/05/2024</a:t>
             </a:fld>
             <a:endParaRPr lang="en-GB"/>
           </a:p>
@@ -4819,7 +4903,7 @@
           <a:p>
             <a:fld id="{ED2FA5E0-9DF3-3448-9EC7-9B2886EDE714}" type="datetimeFigureOut">
               <a:rPr lang="en-GB" smtClean="0"/>
-              <a:t>02/04/2024</a:t>
+              <a:t>23/05/2024</a:t>
             </a:fld>
             <a:endParaRPr lang="en-GB"/>
           </a:p>
@@ -5065,7 +5149,7 @@
           <a:p>
             <a:fld id="{ED2FA5E0-9DF3-3448-9EC7-9B2886EDE714}" type="datetimeFigureOut">
               <a:rPr lang="en-GB" smtClean="0"/>
-              <a:t>02/04/2024</a:t>
+              <a:t>23/05/2024</a:t>
             </a:fld>
             <a:endParaRPr lang="en-GB"/>
           </a:p>
@@ -5297,7 +5381,7 @@
           <a:p>
             <a:fld id="{ED2FA5E0-9DF3-3448-9EC7-9B2886EDE714}" type="datetimeFigureOut">
               <a:rPr lang="en-GB" smtClean="0"/>
-              <a:t>02/04/2024</a:t>
+              <a:t>23/05/2024</a:t>
             </a:fld>
             <a:endParaRPr lang="en-GB"/>
           </a:p>
@@ -5664,7 +5748,7 @@
           <a:p>
             <a:fld id="{ED2FA5E0-9DF3-3448-9EC7-9B2886EDE714}" type="datetimeFigureOut">
               <a:rPr lang="en-GB" smtClean="0"/>
-              <a:t>02/04/2024</a:t>
+              <a:t>23/05/2024</a:t>
             </a:fld>
             <a:endParaRPr lang="en-GB"/>
           </a:p>
@@ -5782,7 +5866,7 @@
           <a:p>
             <a:fld id="{ED2FA5E0-9DF3-3448-9EC7-9B2886EDE714}" type="datetimeFigureOut">
               <a:rPr lang="en-GB" smtClean="0"/>
-              <a:t>02/04/2024</a:t>
+              <a:t>23/05/2024</a:t>
             </a:fld>
             <a:endParaRPr lang="en-GB"/>
           </a:p>
@@ -5877,7 +5961,7 @@
           <a:p>
             <a:fld id="{ED2FA5E0-9DF3-3448-9EC7-9B2886EDE714}" type="datetimeFigureOut">
               <a:rPr lang="en-GB" smtClean="0"/>
-              <a:t>02/04/2024</a:t>
+              <a:t>23/05/2024</a:t>
             </a:fld>
             <a:endParaRPr lang="en-GB"/>
           </a:p>
@@ -6154,7 +6238,7 @@
           <a:p>
             <a:fld id="{ED2FA5E0-9DF3-3448-9EC7-9B2886EDE714}" type="datetimeFigureOut">
               <a:rPr lang="en-GB" smtClean="0"/>
-              <a:t>02/04/2024</a:t>
+              <a:t>23/05/2024</a:t>
             </a:fld>
             <a:endParaRPr lang="en-GB"/>
           </a:p>
@@ -6411,7 +6495,7 @@
           <a:p>
             <a:fld id="{ED2FA5E0-9DF3-3448-9EC7-9B2886EDE714}" type="datetimeFigureOut">
               <a:rPr lang="en-GB" smtClean="0"/>
-              <a:t>02/04/2024</a:t>
+              <a:t>23/05/2024</a:t>
             </a:fld>
             <a:endParaRPr lang="en-GB"/>
           </a:p>
@@ -6624,7 +6708,7 @@
           <a:p>
             <a:fld id="{ED2FA5E0-9DF3-3448-9EC7-9B2886EDE714}" type="datetimeFigureOut">
               <a:rPr lang="en-GB" smtClean="0"/>
-              <a:t>02/04/2024</a:t>
+              <a:t>23/05/2024</a:t>
             </a:fld>
             <a:endParaRPr lang="en-GB"/>
           </a:p>
@@ -7135,7 +7219,7 @@
             <a:avLst/>
           </a:prstGeom>
           <a:solidFill>
-            <a:srgbClr val="658FFF"/>
+            <a:srgbClr val="0E6E2F"/>
           </a:solidFill>
           <a:ln>
             <a:noFill/>
@@ -7243,7 +7327,7 @@
             <a:avLst/>
           </a:prstGeom>
           <a:solidFill>
-            <a:srgbClr val="FF6100"/>
+            <a:srgbClr val="648FFF"/>
           </a:solidFill>
           <a:ln>
             <a:noFill/>
@@ -7381,7 +7465,7 @@
             <a:avLst/>
           </a:prstGeom>
           <a:solidFill>
-            <a:srgbClr val="0E6E2F"/>
+            <a:srgbClr val="648FFF"/>
           </a:solidFill>
           <a:ln>
             <a:noFill/>
@@ -8286,7 +8370,7 @@
             <a:avLst/>
           </a:prstGeom>
           <a:solidFill>
-            <a:srgbClr val="F9AD00"/>
+            <a:srgbClr val="0E6E2F"/>
           </a:solidFill>
           <a:ln>
             <a:noFill/>
@@ -9000,7 +9084,7 @@
             <a:avLst/>
           </a:prstGeom>
           <a:solidFill>
-            <a:srgbClr val="658FFF"/>
+            <a:srgbClr val="F9AE00"/>
           </a:solidFill>
           <a:ln>
             <a:noFill/>
@@ -9330,7 +9414,7 @@
             <a:avLst/>
           </a:prstGeom>
           <a:solidFill>
-            <a:srgbClr val="0E6E2F"/>
+            <a:srgbClr val="F9AE00"/>
           </a:solidFill>
           <a:ln>
             <a:noFill/>
@@ -9438,7 +9522,7 @@
             <a:avLst/>
           </a:prstGeom>
           <a:solidFill>
-            <a:srgbClr val="F9AD00"/>
+            <a:srgbClr val="648FFF"/>
           </a:solidFill>
           <a:ln>
             <a:noFill/>
@@ -13061,7 +13145,7 @@
             <a:avLst/>
           </a:prstGeom>
           <a:solidFill>
-            <a:srgbClr val="FF6100"/>
+            <a:srgbClr val="648FFF"/>
           </a:solidFill>
           <a:ln>
             <a:noFill/>
@@ -13115,7 +13199,7 @@
             <a:avLst/>
           </a:prstGeom>
           <a:solidFill>
-            <a:srgbClr val="658FFF"/>
+            <a:srgbClr val="F9AE00"/>
           </a:solidFill>
           <a:ln>
             <a:noFill/>
@@ -13162,14 +13246,14 @@
         </p:nvSpPr>
         <p:spPr>
           <a:xfrm>
-            <a:off x="254377" y="1846052"/>
+            <a:off x="254377" y="1846050"/>
             <a:ext cx="1391874" cy="1357365"/>
           </a:xfrm>
           <a:prstGeom prst="triangle">
             <a:avLst/>
           </a:prstGeom>
           <a:solidFill>
-            <a:srgbClr val="F9AD00"/>
+            <a:srgbClr val="0E6E2F"/>
           </a:solidFill>
           <a:ln>
             <a:noFill/>
@@ -13691,7 +13775,7 @@
             <a:avLst/>
           </a:prstGeom>
           <a:solidFill>
-            <a:srgbClr val="0E6E2F"/>
+            <a:srgbClr val="F9AE00"/>
           </a:solidFill>
           <a:ln>
             <a:noFill/>
@@ -13745,7 +13829,7 @@
             <a:avLst/>
           </a:prstGeom>
           <a:solidFill>
-            <a:srgbClr val="F9AD00"/>
+            <a:srgbClr val="648FFF"/>
           </a:solidFill>
           <a:ln>
             <a:noFill/>
@@ -13822,64 +13906,10 @@
         </p:nvSpPr>
         <p:spPr>
           <a:xfrm>
-            <a:off x="3754424" y="1846052"/>
+            <a:off x="254377" y="1846051"/>
             <a:ext cx="1391874" cy="1357365"/>
           </a:xfrm>
           <a:prstGeom prst="ellipse">
-            <a:avLst/>
-          </a:prstGeom>
-          <a:solidFill>
-            <a:srgbClr val="0E6E2F"/>
-          </a:solidFill>
-          <a:ln>
-            <a:noFill/>
-          </a:ln>
-        </p:spPr>
-        <p:style>
-          <a:lnRef idx="2">
-            <a:schemeClr val="accent1">
-              <a:shade val="15000"/>
-            </a:schemeClr>
-          </a:lnRef>
-          <a:fillRef idx="1">
-            <a:schemeClr val="accent1"/>
-          </a:fillRef>
-          <a:effectRef idx="0">
-            <a:schemeClr val="accent1"/>
-          </a:effectRef>
-          <a:fontRef idx="minor">
-            <a:schemeClr val="lt1"/>
-          </a:fontRef>
-        </p:style>
-        <p:txBody>
-          <a:bodyPr rtlCol="0" anchor="ctr"/>
-          <a:lstStyle/>
-          <a:p>
-            <a:pPr algn="ctr"/>
-            <a:endParaRPr lang="en-GB"/>
-          </a:p>
-        </p:txBody>
-      </p:sp>
-      <p:sp>
-        <p:nvSpPr>
-          <p:cNvPr id="5" name="Triangle 4">
-            <a:extLst>
-              <a:ext uri="{FF2B5EF4-FFF2-40B4-BE49-F238E27FC236}">
-                <a16:creationId xmlns:a16="http://schemas.microsoft.com/office/drawing/2014/main" id="{D8CFA293-B87D-E0E0-0746-085DD53471E8}"/>
-              </a:ext>
-            </a:extLst>
-          </p:cNvPr>
-          <p:cNvSpPr>
-            <a:spLocks noChangeAspect="1"/>
-          </p:cNvSpPr>
-          <p:nvPr/>
-        </p:nvSpPr>
-        <p:spPr>
-          <a:xfrm>
-            <a:off x="254377" y="1846051"/>
-            <a:ext cx="1391874" cy="1357365"/>
-          </a:xfrm>
-          <a:prstGeom prst="triangle">
             <a:avLst/>
           </a:prstGeom>
           <a:solidFill>
@@ -13916,6 +13946,60 @@
       </p:sp>
       <p:sp>
         <p:nvSpPr>
+          <p:cNvPr id="5" name="Triangle 4">
+            <a:extLst>
+              <a:ext uri="{FF2B5EF4-FFF2-40B4-BE49-F238E27FC236}">
+                <a16:creationId xmlns:a16="http://schemas.microsoft.com/office/drawing/2014/main" id="{D8CFA293-B87D-E0E0-0746-085DD53471E8}"/>
+              </a:ext>
+            </a:extLst>
+          </p:cNvPr>
+          <p:cNvSpPr>
+            <a:spLocks noChangeAspect="1"/>
+          </p:cNvSpPr>
+          <p:nvPr/>
+        </p:nvSpPr>
+        <p:spPr>
+          <a:xfrm>
+            <a:off x="3754423" y="1846050"/>
+            <a:ext cx="1391874" cy="1357365"/>
+          </a:xfrm>
+          <a:prstGeom prst="triangle">
+            <a:avLst/>
+          </a:prstGeom>
+          <a:solidFill>
+            <a:srgbClr val="FF6100"/>
+          </a:solidFill>
+          <a:ln>
+            <a:noFill/>
+          </a:ln>
+        </p:spPr>
+        <p:style>
+          <a:lnRef idx="2">
+            <a:schemeClr val="accent1">
+              <a:shade val="15000"/>
+            </a:schemeClr>
+          </a:lnRef>
+          <a:fillRef idx="1">
+            <a:schemeClr val="accent1"/>
+          </a:fillRef>
+          <a:effectRef idx="0">
+            <a:schemeClr val="accent1"/>
+          </a:effectRef>
+          <a:fontRef idx="minor">
+            <a:schemeClr val="lt1"/>
+          </a:fontRef>
+        </p:style>
+        <p:txBody>
+          <a:bodyPr rtlCol="0" anchor="ctr"/>
+          <a:lstStyle/>
+          <a:p>
+            <a:pPr algn="ctr"/>
+            <a:endParaRPr lang="en-GB" dirty="0"/>
+          </a:p>
+        </p:txBody>
+      </p:sp>
+      <p:sp>
+        <p:nvSpPr>
           <p:cNvPr id="2" name="Oval 1">
             <a:extLst>
               <a:ext uri="{FF2B5EF4-FFF2-40B4-BE49-F238E27FC236}">
@@ -13930,14 +14014,14 @@
         </p:nvSpPr>
         <p:spPr>
           <a:xfrm>
-            <a:off x="2004400" y="1846053"/>
+            <a:off x="2004400" y="1846051"/>
             <a:ext cx="1391874" cy="1357365"/>
           </a:xfrm>
           <a:prstGeom prst="ellipse">
             <a:avLst/>
           </a:prstGeom>
           <a:solidFill>
-            <a:srgbClr val="0E6E2F"/>
+            <a:srgbClr val="FF6100"/>
           </a:solidFill>
           <a:ln>
             <a:noFill/>
@@ -14021,7 +14105,7 @@
             <a:avLst/>
           </a:prstGeom>
           <a:solidFill>
-            <a:srgbClr val="658FFF"/>
+            <a:srgbClr val="0E6E2F"/>
           </a:solidFill>
           <a:ln>
             <a:noFill/>
@@ -14075,7 +14159,7 @@
             <a:avLst/>
           </a:prstGeom>
           <a:solidFill>
-            <a:srgbClr val="F9AD00"/>
+            <a:srgbClr val="648FFF"/>
           </a:solidFill>
           <a:ln>
             <a:noFill/>
@@ -14129,7 +14213,7 @@
             <a:avLst/>
           </a:prstGeom>
           <a:solidFill>
-            <a:srgbClr val="FF6100"/>
+            <a:srgbClr val="648FFF"/>
           </a:solidFill>
           <a:ln>
             <a:noFill/>

</xml_diff>

<commit_message>
updated stims, changed instruction reminder, added feedback box
- added stims that are only using 3 colours (orange, blue, green). Have kept the 4 colour ones for backup
- changed instruction reminder on each trial to be specific to the condition and response format assignments
- added a feedback box before the demo survey
</commit_message>
<xml_diff>
--- a/pilot/stimuli/pilot_all_scenes.pptx
+++ b/pilot/stimuli/pilot_all_scenes.pptx
@@ -235,7 +235,7 @@
           <a:p>
             <a:fld id="{02BB8D72-771C-BD4A-9CC1-F77D1C2F112E}" type="datetimeFigureOut">
               <a:rPr lang="en-GB" smtClean="0"/>
-              <a:t>23/05/2024</a:t>
+              <a:t>10/06/2024</a:t>
             </a:fld>
             <a:endParaRPr lang="en-GB"/>
           </a:p>
@@ -1244,6 +1244,33 @@
               <a:t>T + T</a:t>
             </a:r>
           </a:p>
+          <a:p>
+            <a:endParaRPr lang="en-GB" dirty="0"/>
+          </a:p>
+          <a:p>
+            <a:r>
+              <a:rPr lang="en-GB" dirty="0"/>
+              <a:t>These are the three colours we’ll try to stick to:</a:t>
+            </a:r>
+          </a:p>
+          <a:p>
+            <a:r>
+              <a:rPr lang="en-GB" dirty="0"/>
+              <a:t>Green: 0E6E2F</a:t>
+            </a:r>
+          </a:p>
+          <a:p>
+            <a:r>
+              <a:rPr lang="en-GB" dirty="0"/>
+              <a:t>Blue: 658FFF</a:t>
+            </a:r>
+          </a:p>
+          <a:p>
+            <a:r>
+              <a:rPr lang="en-GB" dirty="0"/>
+              <a:t>Orange: FF9400</a:t>
+            </a:r>
+          </a:p>
         </p:txBody>
       </p:sp>
       <p:sp>
@@ -4383,7 +4410,7 @@
           <a:p>
             <a:fld id="{ED2FA5E0-9DF3-3448-9EC7-9B2886EDE714}" type="datetimeFigureOut">
               <a:rPr lang="en-GB" smtClean="0"/>
-              <a:t>23/05/2024</a:t>
+              <a:t>10/06/2024</a:t>
             </a:fld>
             <a:endParaRPr lang="en-GB"/>
           </a:p>
@@ -4553,7 +4580,7 @@
           <a:p>
             <a:fld id="{ED2FA5E0-9DF3-3448-9EC7-9B2886EDE714}" type="datetimeFigureOut">
               <a:rPr lang="en-GB" smtClean="0"/>
-              <a:t>23/05/2024</a:t>
+              <a:t>10/06/2024</a:t>
             </a:fld>
             <a:endParaRPr lang="en-GB"/>
           </a:p>
@@ -4733,7 +4760,7 @@
           <a:p>
             <a:fld id="{ED2FA5E0-9DF3-3448-9EC7-9B2886EDE714}" type="datetimeFigureOut">
               <a:rPr lang="en-GB" smtClean="0"/>
-              <a:t>23/05/2024</a:t>
+              <a:t>10/06/2024</a:t>
             </a:fld>
             <a:endParaRPr lang="en-GB"/>
           </a:p>
@@ -4903,7 +4930,7 @@
           <a:p>
             <a:fld id="{ED2FA5E0-9DF3-3448-9EC7-9B2886EDE714}" type="datetimeFigureOut">
               <a:rPr lang="en-GB" smtClean="0"/>
-              <a:t>23/05/2024</a:t>
+              <a:t>10/06/2024</a:t>
             </a:fld>
             <a:endParaRPr lang="en-GB"/>
           </a:p>
@@ -5149,7 +5176,7 @@
           <a:p>
             <a:fld id="{ED2FA5E0-9DF3-3448-9EC7-9B2886EDE714}" type="datetimeFigureOut">
               <a:rPr lang="en-GB" smtClean="0"/>
-              <a:t>23/05/2024</a:t>
+              <a:t>10/06/2024</a:t>
             </a:fld>
             <a:endParaRPr lang="en-GB"/>
           </a:p>
@@ -5381,7 +5408,7 @@
           <a:p>
             <a:fld id="{ED2FA5E0-9DF3-3448-9EC7-9B2886EDE714}" type="datetimeFigureOut">
               <a:rPr lang="en-GB" smtClean="0"/>
-              <a:t>23/05/2024</a:t>
+              <a:t>10/06/2024</a:t>
             </a:fld>
             <a:endParaRPr lang="en-GB"/>
           </a:p>
@@ -5748,7 +5775,7 @@
           <a:p>
             <a:fld id="{ED2FA5E0-9DF3-3448-9EC7-9B2886EDE714}" type="datetimeFigureOut">
               <a:rPr lang="en-GB" smtClean="0"/>
-              <a:t>23/05/2024</a:t>
+              <a:t>10/06/2024</a:t>
             </a:fld>
             <a:endParaRPr lang="en-GB"/>
           </a:p>
@@ -5866,7 +5893,7 @@
           <a:p>
             <a:fld id="{ED2FA5E0-9DF3-3448-9EC7-9B2886EDE714}" type="datetimeFigureOut">
               <a:rPr lang="en-GB" smtClean="0"/>
-              <a:t>23/05/2024</a:t>
+              <a:t>10/06/2024</a:t>
             </a:fld>
             <a:endParaRPr lang="en-GB"/>
           </a:p>
@@ -5961,7 +5988,7 @@
           <a:p>
             <a:fld id="{ED2FA5E0-9DF3-3448-9EC7-9B2886EDE714}" type="datetimeFigureOut">
               <a:rPr lang="en-GB" smtClean="0"/>
-              <a:t>23/05/2024</a:t>
+              <a:t>10/06/2024</a:t>
             </a:fld>
             <a:endParaRPr lang="en-GB"/>
           </a:p>
@@ -6238,7 +6265,7 @@
           <a:p>
             <a:fld id="{ED2FA5E0-9DF3-3448-9EC7-9B2886EDE714}" type="datetimeFigureOut">
               <a:rPr lang="en-GB" smtClean="0"/>
-              <a:t>23/05/2024</a:t>
+              <a:t>10/06/2024</a:t>
             </a:fld>
             <a:endParaRPr lang="en-GB"/>
           </a:p>
@@ -6495,7 +6522,7 @@
           <a:p>
             <a:fld id="{ED2FA5E0-9DF3-3448-9EC7-9B2886EDE714}" type="datetimeFigureOut">
               <a:rPr lang="en-GB" smtClean="0"/>
-              <a:t>23/05/2024</a:t>
+              <a:t>10/06/2024</a:t>
             </a:fld>
             <a:endParaRPr lang="en-GB"/>
           </a:p>
@@ -6708,7 +6735,7 @@
           <a:p>
             <a:fld id="{ED2FA5E0-9DF3-3448-9EC7-9B2886EDE714}" type="datetimeFigureOut">
               <a:rPr lang="en-GB" smtClean="0"/>
-              <a:t>23/05/2024</a:t>
+              <a:t>10/06/2024</a:t>
             </a:fld>
             <a:endParaRPr lang="en-GB"/>
           </a:p>
@@ -7219,7 +7246,7 @@
             <a:avLst/>
           </a:prstGeom>
           <a:solidFill>
-            <a:srgbClr val="0E6E2F"/>
+            <a:srgbClr val="FF9400"/>
           </a:solidFill>
           <a:ln>
             <a:noFill/>
@@ -7273,7 +7300,7 @@
             <a:avLst/>
           </a:prstGeom>
           <a:solidFill>
-            <a:srgbClr val="F9AD00"/>
+            <a:srgbClr val="648FFF"/>
           </a:solidFill>
           <a:ln>
             <a:noFill/>
@@ -7411,7 +7438,7 @@
             <a:avLst/>
           </a:prstGeom>
           <a:solidFill>
-            <a:srgbClr val="FF6100"/>
+            <a:srgbClr val="FF9400"/>
           </a:solidFill>
           <a:ln>
             <a:noFill/>
@@ -7465,7 +7492,7 @@
             <a:avLst/>
           </a:prstGeom>
           <a:solidFill>
-            <a:srgbClr val="648FFF"/>
+            <a:srgbClr val="0C6B2E"/>
           </a:solidFill>
           <a:ln>
             <a:noFill/>
@@ -7519,7 +7546,7 @@
             <a:avLst/>
           </a:prstGeom>
           <a:solidFill>
-            <a:srgbClr val="F9AD00"/>
+            <a:srgbClr val="648FFF"/>
           </a:solidFill>
           <a:ln>
             <a:noFill/>
@@ -8070,7 +8097,7 @@
             <a:avLst/>
           </a:prstGeom>
           <a:solidFill>
-            <a:srgbClr val="FF6100"/>
+            <a:srgbClr val="648FFF"/>
           </a:solidFill>
           <a:ln>
             <a:noFill/>
@@ -8124,7 +8151,7 @@
             <a:avLst/>
           </a:prstGeom>
           <a:solidFill>
-            <a:srgbClr val="658FFF"/>
+            <a:srgbClr val="FF9400"/>
           </a:solidFill>
           <a:ln>
             <a:noFill/>
@@ -8178,7 +8205,7 @@
             <a:avLst/>
           </a:prstGeom>
           <a:solidFill>
-            <a:srgbClr val="F9AD00"/>
+            <a:srgbClr val="0C6B2E"/>
           </a:solidFill>
           <a:ln>
             <a:noFill/>
@@ -8262,7 +8289,7 @@
             <a:avLst/>
           </a:prstGeom>
           <a:solidFill>
-            <a:srgbClr val="FF6100"/>
+            <a:srgbClr val="FF9400"/>
           </a:solidFill>
           <a:ln>
             <a:noFill/>
@@ -8316,7 +8343,7 @@
             <a:avLst/>
           </a:prstGeom>
           <a:solidFill>
-            <a:srgbClr val="658FFF"/>
+            <a:srgbClr val="FF9400"/>
           </a:solidFill>
           <a:ln>
             <a:noFill/>
@@ -8447,14 +8474,14 @@
         </p:nvSpPr>
         <p:spPr>
           <a:xfrm>
-            <a:off x="254376" y="1846054"/>
+            <a:off x="3754424" y="1846051"/>
             <a:ext cx="1391874" cy="1357365"/>
           </a:xfrm>
           <a:prstGeom prst="rect">
             <a:avLst/>
           </a:prstGeom>
           <a:solidFill>
-            <a:srgbClr val="F9AE00"/>
+            <a:srgbClr val="0E6E2F"/>
           </a:solidFill>
           <a:ln>
             <a:noFill/>
@@ -8481,7 +8508,7 @@
           <a:lstStyle/>
           <a:p>
             <a:pPr algn="ctr"/>
-            <a:endParaRPr lang="en-GB"/>
+            <a:endParaRPr lang="en-GB" dirty="0"/>
           </a:p>
         </p:txBody>
       </p:sp>
@@ -8555,14 +8582,14 @@
         </p:nvSpPr>
         <p:spPr>
           <a:xfrm>
-            <a:off x="3754424" y="1846052"/>
+            <a:off x="254376" y="1846052"/>
             <a:ext cx="1391874" cy="1357365"/>
           </a:xfrm>
           <a:prstGeom prst="triangle">
             <a:avLst/>
           </a:prstGeom>
           <a:solidFill>
-            <a:srgbClr val="0E6E2F"/>
+            <a:srgbClr val="FF6100"/>
           </a:solidFill>
           <a:ln>
             <a:noFill/>
@@ -9023,14 +9050,14 @@
         </p:nvSpPr>
         <p:spPr>
           <a:xfrm>
-            <a:off x="254376" y="1846054"/>
+            <a:off x="2004400" y="1846052"/>
             <a:ext cx="1391874" cy="1357365"/>
           </a:xfrm>
           <a:prstGeom prst="rect">
             <a:avLst/>
           </a:prstGeom>
           <a:solidFill>
-            <a:srgbClr val="FF6100"/>
+            <a:srgbClr val="648FFF"/>
           </a:solidFill>
           <a:ln>
             <a:noFill/>
@@ -9077,14 +9104,14 @@
         </p:nvSpPr>
         <p:spPr>
           <a:xfrm>
-            <a:off x="3754424" y="1846053"/>
+            <a:off x="3751859" y="1846052"/>
             <a:ext cx="1391874" cy="1357365"/>
           </a:xfrm>
           <a:prstGeom prst="ellipse">
             <a:avLst/>
           </a:prstGeom>
           <a:solidFill>
-            <a:srgbClr val="F9AE00"/>
+            <a:srgbClr val="FF9400"/>
           </a:solidFill>
           <a:ln>
             <a:noFill/>
@@ -9131,14 +9158,14 @@
         </p:nvSpPr>
         <p:spPr>
           <a:xfrm>
-            <a:off x="2004400" y="1846054"/>
+            <a:off x="256942" y="1846051"/>
             <a:ext cx="1391874" cy="1357365"/>
           </a:xfrm>
           <a:prstGeom prst="triangle">
             <a:avLst/>
           </a:prstGeom>
           <a:solidFill>
-            <a:srgbClr val="F9AD00"/>
+            <a:srgbClr val="FF9400"/>
           </a:solidFill>
           <a:ln>
             <a:noFill/>
@@ -9599,14 +9626,14 @@
         </p:nvSpPr>
         <p:spPr>
           <a:xfrm>
-            <a:off x="2004400" y="1846052"/>
+            <a:off x="254376" y="1846051"/>
             <a:ext cx="1391874" cy="1357365"/>
           </a:xfrm>
           <a:prstGeom prst="rect">
             <a:avLst/>
           </a:prstGeom>
           <a:solidFill>
-            <a:srgbClr val="FF6100"/>
+            <a:srgbClr val="648FFF"/>
           </a:solidFill>
           <a:ln>
             <a:noFill/>
@@ -9633,7 +9660,7 @@
           <a:lstStyle/>
           <a:p>
             <a:pPr algn="ctr"/>
-            <a:endParaRPr lang="en-GB"/>
+            <a:endParaRPr lang="en-GB" dirty="0"/>
           </a:p>
         </p:txBody>
       </p:sp>
@@ -9653,14 +9680,14 @@
         </p:nvSpPr>
         <p:spPr>
           <a:xfrm>
-            <a:off x="254376" y="1846050"/>
+            <a:off x="2004400" y="1846051"/>
             <a:ext cx="1391874" cy="1357365"/>
           </a:xfrm>
           <a:prstGeom prst="ellipse">
             <a:avLst/>
           </a:prstGeom>
           <a:solidFill>
-            <a:srgbClr val="658FFF"/>
+            <a:srgbClr val="0C6B2E"/>
           </a:solidFill>
           <a:ln>
             <a:noFill/>
@@ -9714,7 +9741,7 @@
             <a:avLst/>
           </a:prstGeom>
           <a:solidFill>
-            <a:srgbClr val="F9AD00"/>
+            <a:srgbClr val="FF9400"/>
           </a:solidFill>
           <a:ln>
             <a:noFill/>
@@ -10175,7 +10202,7 @@
         </p:nvSpPr>
         <p:spPr>
           <a:xfrm>
-            <a:off x="2004400" y="1846052"/>
+            <a:off x="254377" y="1846050"/>
             <a:ext cx="1391874" cy="1357365"/>
           </a:xfrm>
           <a:prstGeom prst="rect">
@@ -10229,7 +10256,7 @@
         </p:nvSpPr>
         <p:spPr>
           <a:xfrm>
-            <a:off x="254376" y="1846050"/>
+            <a:off x="2004400" y="1846050"/>
             <a:ext cx="1391874" cy="1357365"/>
           </a:xfrm>
           <a:prstGeom prst="ellipse">
@@ -10841,7 +10868,7 @@
             <a:avLst/>
           </a:prstGeom>
           <a:solidFill>
-            <a:srgbClr val="FF6100"/>
+            <a:srgbClr val="0C6B2E"/>
           </a:solidFill>
           <a:ln>
             <a:noFill/>
@@ -10949,7 +10976,7 @@
             <a:avLst/>
           </a:prstGeom>
           <a:solidFill>
-            <a:srgbClr val="F9AD00"/>
+            <a:srgbClr val="0C6B2E"/>
           </a:solidFill>
           <a:ln>
             <a:noFill/>
@@ -11033,6 +11060,60 @@
             <a:avLst/>
           </a:prstGeom>
           <a:solidFill>
+            <a:srgbClr val="0E6E2F"/>
+          </a:solidFill>
+          <a:ln>
+            <a:noFill/>
+          </a:ln>
+        </p:spPr>
+        <p:style>
+          <a:lnRef idx="2">
+            <a:schemeClr val="accent1">
+              <a:shade val="15000"/>
+            </a:schemeClr>
+          </a:lnRef>
+          <a:fillRef idx="1">
+            <a:schemeClr val="accent1"/>
+          </a:fillRef>
+          <a:effectRef idx="0">
+            <a:schemeClr val="accent1"/>
+          </a:effectRef>
+          <a:fontRef idx="minor">
+            <a:schemeClr val="lt1"/>
+          </a:fontRef>
+        </p:style>
+        <p:txBody>
+          <a:bodyPr rtlCol="0" anchor="ctr"/>
+          <a:lstStyle/>
+          <a:p>
+            <a:pPr algn="ctr"/>
+            <a:endParaRPr lang="en-GB"/>
+          </a:p>
+        </p:txBody>
+      </p:sp>
+      <p:sp>
+        <p:nvSpPr>
+          <p:cNvPr id="4" name="Oval 3">
+            <a:extLst>
+              <a:ext uri="{FF2B5EF4-FFF2-40B4-BE49-F238E27FC236}">
+                <a16:creationId xmlns:a16="http://schemas.microsoft.com/office/drawing/2014/main" id="{A5D00632-C5F2-B986-62B7-5205D04E5C68}"/>
+              </a:ext>
+            </a:extLst>
+          </p:cNvPr>
+          <p:cNvSpPr>
+            <a:spLocks noChangeAspect="1"/>
+          </p:cNvSpPr>
+          <p:nvPr/>
+        </p:nvSpPr>
+        <p:spPr>
+          <a:xfrm>
+            <a:off x="3754424" y="1846053"/>
+            <a:ext cx="1391874" cy="1357365"/>
+          </a:xfrm>
+          <a:prstGeom prst="ellipse">
+            <a:avLst/>
+          </a:prstGeom>
+          <a:solidFill>
             <a:srgbClr val="FF6100"/>
           </a:solidFill>
           <a:ln>
@@ -11066,60 +11147,6 @@
       </p:sp>
       <p:sp>
         <p:nvSpPr>
-          <p:cNvPr id="4" name="Oval 3">
-            <a:extLst>
-              <a:ext uri="{FF2B5EF4-FFF2-40B4-BE49-F238E27FC236}">
-                <a16:creationId xmlns:a16="http://schemas.microsoft.com/office/drawing/2014/main" id="{A5D00632-C5F2-B986-62B7-5205D04E5C68}"/>
-              </a:ext>
-            </a:extLst>
-          </p:cNvPr>
-          <p:cNvSpPr>
-            <a:spLocks noChangeAspect="1"/>
-          </p:cNvSpPr>
-          <p:nvPr/>
-        </p:nvSpPr>
-        <p:spPr>
-          <a:xfrm>
-            <a:off x="3754424" y="1846053"/>
-            <a:ext cx="1391874" cy="1357365"/>
-          </a:xfrm>
-          <a:prstGeom prst="ellipse">
-            <a:avLst/>
-          </a:prstGeom>
-          <a:solidFill>
-            <a:srgbClr val="658FFF"/>
-          </a:solidFill>
-          <a:ln>
-            <a:noFill/>
-          </a:ln>
-        </p:spPr>
-        <p:style>
-          <a:lnRef idx="2">
-            <a:schemeClr val="accent1">
-              <a:shade val="15000"/>
-            </a:schemeClr>
-          </a:lnRef>
-          <a:fillRef idx="1">
-            <a:schemeClr val="accent1"/>
-          </a:fillRef>
-          <a:effectRef idx="0">
-            <a:schemeClr val="accent1"/>
-          </a:effectRef>
-          <a:fontRef idx="minor">
-            <a:schemeClr val="lt1"/>
-          </a:fontRef>
-        </p:style>
-        <p:txBody>
-          <a:bodyPr rtlCol="0" anchor="ctr"/>
-          <a:lstStyle/>
-          <a:p>
-            <a:pPr algn="ctr"/>
-            <a:endParaRPr lang="en-GB"/>
-          </a:p>
-        </p:txBody>
-      </p:sp>
-      <p:sp>
-        <p:nvSpPr>
           <p:cNvPr id="5" name="Triangle 4">
             <a:extLst>
               <a:ext uri="{FF2B5EF4-FFF2-40B4-BE49-F238E27FC236}">
@@ -11141,7 +11168,7 @@
             <a:avLst/>
           </a:prstGeom>
           <a:solidFill>
-            <a:srgbClr val="F9AD00"/>
+            <a:srgbClr val="0E6E2F"/>
           </a:solidFill>
           <a:ln>
             <a:noFill/>
@@ -11801,7 +11828,7 @@
             <a:avLst/>
           </a:prstGeom>
           <a:solidFill>
-            <a:srgbClr val="FF6100"/>
+            <a:srgbClr val="0C6B2E"/>
           </a:solidFill>
           <a:ln>
             <a:noFill/>
@@ -11855,7 +11882,7 @@
             <a:avLst/>
           </a:prstGeom>
           <a:solidFill>
-            <a:srgbClr val="658FFF"/>
+            <a:srgbClr val="0C6B2E"/>
           </a:solidFill>
           <a:ln>
             <a:noFill/>
@@ -11909,7 +11936,7 @@
             <a:avLst/>
           </a:prstGeom>
           <a:solidFill>
-            <a:srgbClr val="F9AD00"/>
+            <a:srgbClr val="648FFF"/>
           </a:solidFill>
           <a:ln>
             <a:noFill/>
@@ -13145,7 +13172,7 @@
             <a:avLst/>
           </a:prstGeom>
           <a:solidFill>
-            <a:srgbClr val="648FFF"/>
+            <a:srgbClr val="FF9400"/>
           </a:solidFill>
           <a:ln>
             <a:noFill/>
@@ -13199,7 +13226,7 @@
             <a:avLst/>
           </a:prstGeom>
           <a:solidFill>
-            <a:srgbClr val="F9AE00"/>
+            <a:srgbClr val="0C6B2E"/>
           </a:solidFill>
           <a:ln>
             <a:noFill/>
@@ -13253,7 +13280,7 @@
             <a:avLst/>
           </a:prstGeom>
           <a:solidFill>
-            <a:srgbClr val="0E6E2F"/>
+            <a:srgbClr val="648FFF"/>
           </a:solidFill>
           <a:ln>
             <a:noFill/>
@@ -13330,14 +13357,14 @@
         </p:nvSpPr>
         <p:spPr>
           <a:xfrm>
-            <a:off x="254376" y="1846054"/>
+            <a:off x="254377" y="1846053"/>
             <a:ext cx="1391874" cy="1357365"/>
           </a:xfrm>
           <a:prstGeom prst="rect">
             <a:avLst/>
           </a:prstGeom>
           <a:solidFill>
-            <a:srgbClr val="FF6100"/>
+            <a:srgbClr val="0C6B2E"/>
           </a:solidFill>
           <a:ln>
             <a:noFill/>
@@ -13391,7 +13418,7 @@
             <a:avLst/>
           </a:prstGeom>
           <a:solidFill>
-            <a:srgbClr val="0E6E2F"/>
+            <a:srgbClr val="648FFF"/>
           </a:solidFill>
           <a:ln>
             <a:noFill/>
@@ -13438,14 +13465,14 @@
         </p:nvSpPr>
         <p:spPr>
           <a:xfrm>
-            <a:off x="2004400" y="1846054"/>
+            <a:off x="2004400" y="1846053"/>
             <a:ext cx="1391874" cy="1357365"/>
           </a:xfrm>
           <a:prstGeom prst="triangle">
             <a:avLst/>
           </a:prstGeom>
           <a:solidFill>
-            <a:srgbClr val="F9AD00"/>
+            <a:srgbClr val="FF9400"/>
           </a:solidFill>
           <a:ln>
             <a:noFill/>
@@ -13529,7 +13556,7 @@
             <a:avLst/>
           </a:prstGeom>
           <a:solidFill>
-            <a:srgbClr val="F9AE00"/>
+            <a:srgbClr val="FF9400"/>
           </a:solidFill>
           <a:ln>
             <a:noFill/>
@@ -13583,7 +13610,7 @@
             <a:avLst/>
           </a:prstGeom>
           <a:solidFill>
-            <a:srgbClr val="FF6100"/>
+            <a:srgbClr val="648FFF"/>
           </a:solidFill>
           <a:ln>
             <a:noFill/>
@@ -13714,14 +13741,14 @@
         </p:nvSpPr>
         <p:spPr>
           <a:xfrm>
-            <a:off x="3754424" y="1846050"/>
+            <a:off x="3754424" y="1846051"/>
             <a:ext cx="1391874" cy="1357365"/>
           </a:xfrm>
           <a:prstGeom prst="rect">
             <a:avLst/>
           </a:prstGeom>
           <a:solidFill>
-            <a:srgbClr val="FF6100"/>
+            <a:srgbClr val="648FFF"/>
           </a:solidFill>
           <a:ln>
             <a:noFill/>
@@ -13775,7 +13802,7 @@
             <a:avLst/>
           </a:prstGeom>
           <a:solidFill>
-            <a:srgbClr val="F9AE00"/>
+            <a:srgbClr val="648FFF"/>
           </a:solidFill>
           <a:ln>
             <a:noFill/>
@@ -13829,7 +13856,7 @@
             <a:avLst/>
           </a:prstGeom>
           <a:solidFill>
-            <a:srgbClr val="648FFF"/>
+            <a:srgbClr val="0C6B2E"/>
           </a:solidFill>
           <a:ln>
             <a:noFill/>
@@ -13906,7 +13933,7 @@
         </p:nvSpPr>
         <p:spPr>
           <a:xfrm>
-            <a:off x="254377" y="1846051"/>
+            <a:off x="3754423" y="1846050"/>
             <a:ext cx="1391874" cy="1357365"/>
           </a:xfrm>
           <a:prstGeom prst="ellipse">
@@ -13960,14 +13987,14 @@
         </p:nvSpPr>
         <p:spPr>
           <a:xfrm>
-            <a:off x="3754423" y="1846050"/>
+            <a:off x="254377" y="1846050"/>
             <a:ext cx="1391874" cy="1357365"/>
           </a:xfrm>
           <a:prstGeom prst="triangle">
             <a:avLst/>
           </a:prstGeom>
           <a:solidFill>
-            <a:srgbClr val="FF6100"/>
+            <a:srgbClr val="0C6B2E"/>
           </a:solidFill>
           <a:ln>
             <a:noFill/>
@@ -14021,7 +14048,7 @@
             <a:avLst/>
           </a:prstGeom>
           <a:solidFill>
-            <a:srgbClr val="FF6100"/>
+            <a:srgbClr val="FF9400"/>
           </a:solidFill>
           <a:ln>
             <a:noFill/>
@@ -14098,64 +14125,10 @@
         </p:nvSpPr>
         <p:spPr>
           <a:xfrm>
-            <a:off x="254376" y="1846054"/>
+            <a:off x="2004400" y="1840239"/>
             <a:ext cx="1391874" cy="1357365"/>
           </a:xfrm>
           <a:prstGeom prst="ellipse">
-            <a:avLst/>
-          </a:prstGeom>
-          <a:solidFill>
-            <a:srgbClr val="0E6E2F"/>
-          </a:solidFill>
-          <a:ln>
-            <a:noFill/>
-          </a:ln>
-        </p:spPr>
-        <p:style>
-          <a:lnRef idx="2">
-            <a:schemeClr val="accent1">
-              <a:shade val="15000"/>
-            </a:schemeClr>
-          </a:lnRef>
-          <a:fillRef idx="1">
-            <a:schemeClr val="accent1"/>
-          </a:fillRef>
-          <a:effectRef idx="0">
-            <a:schemeClr val="accent1"/>
-          </a:effectRef>
-          <a:fontRef idx="minor">
-            <a:schemeClr val="lt1"/>
-          </a:fontRef>
-        </p:style>
-        <p:txBody>
-          <a:bodyPr rtlCol="0" anchor="ctr"/>
-          <a:lstStyle/>
-          <a:p>
-            <a:pPr algn="ctr"/>
-            <a:endParaRPr lang="en-GB"/>
-          </a:p>
-        </p:txBody>
-      </p:sp>
-      <p:sp>
-        <p:nvSpPr>
-          <p:cNvPr id="5" name="Triangle 4">
-            <a:extLst>
-              <a:ext uri="{FF2B5EF4-FFF2-40B4-BE49-F238E27FC236}">
-                <a16:creationId xmlns:a16="http://schemas.microsoft.com/office/drawing/2014/main" id="{D8CFA293-B87D-E0E0-0746-085DD53471E8}"/>
-              </a:ext>
-            </a:extLst>
-          </p:cNvPr>
-          <p:cNvSpPr>
-            <a:spLocks noChangeAspect="1"/>
-          </p:cNvSpPr>
-          <p:nvPr/>
-        </p:nvSpPr>
-        <p:spPr>
-          <a:xfrm>
-            <a:off x="3754424" y="1846053"/>
-            <a:ext cx="1391874" cy="1357365"/>
-          </a:xfrm>
-          <a:prstGeom prst="triangle">
             <a:avLst/>
           </a:prstGeom>
           <a:solidFill>
@@ -14192,6 +14165,60 @@
       </p:sp>
       <p:sp>
         <p:nvSpPr>
+          <p:cNvPr id="5" name="Triangle 4">
+            <a:extLst>
+              <a:ext uri="{FF2B5EF4-FFF2-40B4-BE49-F238E27FC236}">
+                <a16:creationId xmlns:a16="http://schemas.microsoft.com/office/drawing/2014/main" id="{D8CFA293-B87D-E0E0-0746-085DD53471E8}"/>
+              </a:ext>
+            </a:extLst>
+          </p:cNvPr>
+          <p:cNvSpPr>
+            <a:spLocks noChangeAspect="1"/>
+          </p:cNvSpPr>
+          <p:nvPr/>
+        </p:nvSpPr>
+        <p:spPr>
+          <a:xfrm>
+            <a:off x="3754424" y="1846053"/>
+            <a:ext cx="1391874" cy="1357365"/>
+          </a:xfrm>
+          <a:prstGeom prst="triangle">
+            <a:avLst/>
+          </a:prstGeom>
+          <a:solidFill>
+            <a:srgbClr val="FF9400"/>
+          </a:solidFill>
+          <a:ln>
+            <a:noFill/>
+          </a:ln>
+        </p:spPr>
+        <p:style>
+          <a:lnRef idx="2">
+            <a:schemeClr val="accent1">
+              <a:shade val="15000"/>
+            </a:schemeClr>
+          </a:lnRef>
+          <a:fillRef idx="1">
+            <a:schemeClr val="accent1"/>
+          </a:fillRef>
+          <a:effectRef idx="0">
+            <a:schemeClr val="accent1"/>
+          </a:effectRef>
+          <a:fontRef idx="minor">
+            <a:schemeClr val="lt1"/>
+          </a:fontRef>
+        </p:style>
+        <p:txBody>
+          <a:bodyPr rtlCol="0" anchor="ctr"/>
+          <a:lstStyle/>
+          <a:p>
+            <a:pPr algn="ctr"/>
+            <a:endParaRPr lang="en-GB"/>
+          </a:p>
+        </p:txBody>
+      </p:sp>
+      <p:sp>
+        <p:nvSpPr>
           <p:cNvPr id="6" name="Rectangle 5">
             <a:extLst>
               <a:ext uri="{FF2B5EF4-FFF2-40B4-BE49-F238E27FC236}">
@@ -14206,14 +14233,14 @@
         </p:nvSpPr>
         <p:spPr>
           <a:xfrm>
-            <a:off x="2004400" y="1843345"/>
+            <a:off x="254376" y="1840238"/>
             <a:ext cx="1391874" cy="1357365"/>
           </a:xfrm>
           <a:prstGeom prst="rect">
             <a:avLst/>
           </a:prstGeom>
           <a:solidFill>
-            <a:srgbClr val="648FFF"/>
+            <a:srgbClr val="0C6B2E"/>
           </a:solidFill>
           <a:ln>
             <a:noFill/>

</xml_diff>

<commit_message>
updates to training block test code and training stims
- added plugin type as a dynamic variable dependent on response format assignment
- added building the file paths for the training stims; as they'll be the same for every participant (note: not the neatest code atm, as somewhat repetitive, but works)
- changed training trial building function to take prompt, target image, fillers and correct answer as parameters
- latter not solved; have noted some ideas for how to check for correct answers but not yet implemented
- decided on the training stims and these are updated with relevant file names
- also removed demo survey age question from main exp
</commit_message>
<xml_diff>
--- a/pilot/stimuli/pilot_all_scenes.pptx
+++ b/pilot/stimuli/pilot_all_scenes.pptx
@@ -235,7 +235,7 @@
           <a:p>
             <a:fld id="{02BB8D72-771C-BD4A-9CC1-F77D1C2F112E}" type="datetimeFigureOut">
               <a:rPr lang="en-GB" smtClean="0"/>
-              <a:t>10/06/2024</a:t>
+              <a:t>10/07/2024</a:t>
             </a:fld>
             <a:endParaRPr lang="en-GB"/>
           </a:p>
@@ -4410,7 +4410,7 @@
           <a:p>
             <a:fld id="{ED2FA5E0-9DF3-3448-9EC7-9B2886EDE714}" type="datetimeFigureOut">
               <a:rPr lang="en-GB" smtClean="0"/>
-              <a:t>10/06/2024</a:t>
+              <a:t>10/07/2024</a:t>
             </a:fld>
             <a:endParaRPr lang="en-GB"/>
           </a:p>
@@ -4580,7 +4580,7 @@
           <a:p>
             <a:fld id="{ED2FA5E0-9DF3-3448-9EC7-9B2886EDE714}" type="datetimeFigureOut">
               <a:rPr lang="en-GB" smtClean="0"/>
-              <a:t>10/06/2024</a:t>
+              <a:t>10/07/2024</a:t>
             </a:fld>
             <a:endParaRPr lang="en-GB"/>
           </a:p>
@@ -4760,7 +4760,7 @@
           <a:p>
             <a:fld id="{ED2FA5E0-9DF3-3448-9EC7-9B2886EDE714}" type="datetimeFigureOut">
               <a:rPr lang="en-GB" smtClean="0"/>
-              <a:t>10/06/2024</a:t>
+              <a:t>10/07/2024</a:t>
             </a:fld>
             <a:endParaRPr lang="en-GB"/>
           </a:p>
@@ -4930,7 +4930,7 @@
           <a:p>
             <a:fld id="{ED2FA5E0-9DF3-3448-9EC7-9B2886EDE714}" type="datetimeFigureOut">
               <a:rPr lang="en-GB" smtClean="0"/>
-              <a:t>10/06/2024</a:t>
+              <a:t>10/07/2024</a:t>
             </a:fld>
             <a:endParaRPr lang="en-GB"/>
           </a:p>
@@ -5176,7 +5176,7 @@
           <a:p>
             <a:fld id="{ED2FA5E0-9DF3-3448-9EC7-9B2886EDE714}" type="datetimeFigureOut">
               <a:rPr lang="en-GB" smtClean="0"/>
-              <a:t>10/06/2024</a:t>
+              <a:t>10/07/2024</a:t>
             </a:fld>
             <a:endParaRPr lang="en-GB"/>
           </a:p>
@@ -5408,7 +5408,7 @@
           <a:p>
             <a:fld id="{ED2FA5E0-9DF3-3448-9EC7-9B2886EDE714}" type="datetimeFigureOut">
               <a:rPr lang="en-GB" smtClean="0"/>
-              <a:t>10/06/2024</a:t>
+              <a:t>10/07/2024</a:t>
             </a:fld>
             <a:endParaRPr lang="en-GB"/>
           </a:p>
@@ -5775,7 +5775,7 @@
           <a:p>
             <a:fld id="{ED2FA5E0-9DF3-3448-9EC7-9B2886EDE714}" type="datetimeFigureOut">
               <a:rPr lang="en-GB" smtClean="0"/>
-              <a:t>10/06/2024</a:t>
+              <a:t>10/07/2024</a:t>
             </a:fld>
             <a:endParaRPr lang="en-GB"/>
           </a:p>
@@ -5893,7 +5893,7 @@
           <a:p>
             <a:fld id="{ED2FA5E0-9DF3-3448-9EC7-9B2886EDE714}" type="datetimeFigureOut">
               <a:rPr lang="en-GB" smtClean="0"/>
-              <a:t>10/06/2024</a:t>
+              <a:t>10/07/2024</a:t>
             </a:fld>
             <a:endParaRPr lang="en-GB"/>
           </a:p>
@@ -5988,7 +5988,7 @@
           <a:p>
             <a:fld id="{ED2FA5E0-9DF3-3448-9EC7-9B2886EDE714}" type="datetimeFigureOut">
               <a:rPr lang="en-GB" smtClean="0"/>
-              <a:t>10/06/2024</a:t>
+              <a:t>10/07/2024</a:t>
             </a:fld>
             <a:endParaRPr lang="en-GB"/>
           </a:p>
@@ -6265,7 +6265,7 @@
           <a:p>
             <a:fld id="{ED2FA5E0-9DF3-3448-9EC7-9B2886EDE714}" type="datetimeFigureOut">
               <a:rPr lang="en-GB" smtClean="0"/>
-              <a:t>10/06/2024</a:t>
+              <a:t>10/07/2024</a:t>
             </a:fld>
             <a:endParaRPr lang="en-GB"/>
           </a:p>
@@ -6522,7 +6522,7 @@
           <a:p>
             <a:fld id="{ED2FA5E0-9DF3-3448-9EC7-9B2886EDE714}" type="datetimeFigureOut">
               <a:rPr lang="en-GB" smtClean="0"/>
-              <a:t>10/06/2024</a:t>
+              <a:t>10/07/2024</a:t>
             </a:fld>
             <a:endParaRPr lang="en-GB"/>
           </a:p>
@@ -6735,7 +6735,7 @@
           <a:p>
             <a:fld id="{ED2FA5E0-9DF3-3448-9EC7-9B2886EDE714}" type="datetimeFigureOut">
               <a:rPr lang="en-GB" smtClean="0"/>
-              <a:t>10/06/2024</a:t>
+              <a:t>10/07/2024</a:t>
             </a:fld>
             <a:endParaRPr lang="en-GB"/>
           </a:p>
@@ -7492,7 +7492,7 @@
             <a:avLst/>
           </a:prstGeom>
           <a:solidFill>
-            <a:srgbClr val="0C6B2E"/>
+            <a:srgbClr val="FF9400"/>
           </a:solidFill>
           <a:ln>
             <a:noFill/>
@@ -7546,7 +7546,7 @@
             <a:avLst/>
           </a:prstGeom>
           <a:solidFill>
-            <a:srgbClr val="648FFF"/>
+            <a:srgbClr val="0C6B2E"/>
           </a:solidFill>
           <a:ln>
             <a:noFill/>

</xml_diff>

<commit_message>
stim colour change, feedback bug fixed
- changed the orange in the stimuli to be pink as that is more colourblindfriendly and a non-ambiguous name
- discovered bug in feedback on second slider training trial in truth and acceptability conditions, fixed so that this now has 80-100 stored as correct response
- added participant id to the backup saving function (which dumps all the data, including stuff we won't need, in a csv at the end of the experiment)
- added prompt to refresh in error message if preloading fails and experiment doesn't run
</commit_message>
<xml_diff>
--- a/pilot/stimuli/pilot_all_scenes.pptx
+++ b/pilot/stimuli/pilot_all_scenes.pptx
@@ -5,7 +5,7 @@
     <p:sldMasterId id="2147483660" r:id="rId1"/>
   </p:sldMasterIdLst>
   <p:notesMasterIdLst>
-    <p:notesMasterId r:id="rId41"/>
+    <p:notesMasterId r:id="rId44"/>
   </p:notesMasterIdLst>
   <p:sldIdLst>
     <p:sldId id="275" r:id="rId2"/>
@@ -16,37 +16,40 @@
     <p:sldId id="281" r:id="rId7"/>
     <p:sldId id="282" r:id="rId8"/>
     <p:sldId id="270" r:id="rId9"/>
-    <p:sldId id="273" r:id="rId10"/>
-    <p:sldId id="272" r:id="rId11"/>
-    <p:sldId id="269" r:id="rId12"/>
-    <p:sldId id="268" r:id="rId13"/>
-    <p:sldId id="267" r:id="rId14"/>
-    <p:sldId id="283" r:id="rId15"/>
-    <p:sldId id="289" r:id="rId16"/>
-    <p:sldId id="290" r:id="rId17"/>
-    <p:sldId id="291" r:id="rId18"/>
-    <p:sldId id="284" r:id="rId19"/>
-    <p:sldId id="286" r:id="rId20"/>
-    <p:sldId id="288" r:id="rId21"/>
-    <p:sldId id="292" r:id="rId22"/>
-    <p:sldId id="293" r:id="rId23"/>
-    <p:sldId id="294" r:id="rId24"/>
-    <p:sldId id="295" r:id="rId25"/>
-    <p:sldId id="296" r:id="rId26"/>
-    <p:sldId id="297" r:id="rId27"/>
-    <p:sldId id="298" r:id="rId28"/>
-    <p:sldId id="302" r:id="rId29"/>
-    <p:sldId id="300" r:id="rId30"/>
-    <p:sldId id="303" r:id="rId31"/>
-    <p:sldId id="304" r:id="rId32"/>
-    <p:sldId id="305" r:id="rId33"/>
-    <p:sldId id="306" r:id="rId34"/>
-    <p:sldId id="307" r:id="rId35"/>
-    <p:sldId id="308" r:id="rId36"/>
-    <p:sldId id="309" r:id="rId37"/>
-    <p:sldId id="310" r:id="rId38"/>
-    <p:sldId id="311" r:id="rId39"/>
-    <p:sldId id="312" r:id="rId40"/>
+    <p:sldId id="314" r:id="rId10"/>
+    <p:sldId id="313" r:id="rId11"/>
+    <p:sldId id="315" r:id="rId12"/>
+    <p:sldId id="273" r:id="rId13"/>
+    <p:sldId id="272" r:id="rId14"/>
+    <p:sldId id="269" r:id="rId15"/>
+    <p:sldId id="268" r:id="rId16"/>
+    <p:sldId id="267" r:id="rId17"/>
+    <p:sldId id="283" r:id="rId18"/>
+    <p:sldId id="289" r:id="rId19"/>
+    <p:sldId id="290" r:id="rId20"/>
+    <p:sldId id="291" r:id="rId21"/>
+    <p:sldId id="284" r:id="rId22"/>
+    <p:sldId id="286" r:id="rId23"/>
+    <p:sldId id="288" r:id="rId24"/>
+    <p:sldId id="292" r:id="rId25"/>
+    <p:sldId id="293" r:id="rId26"/>
+    <p:sldId id="294" r:id="rId27"/>
+    <p:sldId id="295" r:id="rId28"/>
+    <p:sldId id="296" r:id="rId29"/>
+    <p:sldId id="297" r:id="rId30"/>
+    <p:sldId id="298" r:id="rId31"/>
+    <p:sldId id="302" r:id="rId32"/>
+    <p:sldId id="300" r:id="rId33"/>
+    <p:sldId id="303" r:id="rId34"/>
+    <p:sldId id="304" r:id="rId35"/>
+    <p:sldId id="305" r:id="rId36"/>
+    <p:sldId id="306" r:id="rId37"/>
+    <p:sldId id="307" r:id="rId38"/>
+    <p:sldId id="308" r:id="rId39"/>
+    <p:sldId id="309" r:id="rId40"/>
+    <p:sldId id="310" r:id="rId41"/>
+    <p:sldId id="311" r:id="rId42"/>
+    <p:sldId id="312" r:id="rId43"/>
   </p:sldIdLst>
   <p:sldSz cx="5400675" cy="5400675"/>
   <p:notesSz cx="6858000" cy="9144000"/>
@@ -235,7 +238,7 @@
           <a:p>
             <a:fld id="{02BB8D72-771C-BD4A-9CC1-F77D1C2F112E}" type="datetimeFigureOut">
               <a:rPr lang="en-GB" smtClean="0"/>
-              <a:t>10/07/2024</a:t>
+              <a:t>26/08/2024</a:t>
             </a:fld>
             <a:endParaRPr lang="en-GB"/>
           </a:p>
@@ -591,7 +594,13 @@
   <p:cSld>
     <p:spTree>
       <p:nvGrpSpPr>
-        <p:cNvPr id="1" name=""/>
+        <p:cNvPr id="1" name="">
+          <a:extLst>
+            <a:ext uri="{FF2B5EF4-FFF2-40B4-BE49-F238E27FC236}">
+              <a16:creationId xmlns:a16="http://schemas.microsoft.com/office/drawing/2014/main" id="{DF11B4A1-D040-E18E-FFD6-D88C9DBE4B62}"/>
+            </a:ext>
+          </a:extLst>
+        </p:cNvPr>
         <p:cNvGrpSpPr/>
         <p:nvPr/>
       </p:nvGrpSpPr>
@@ -605,7 +614,13 @@
       </p:grpSpPr>
       <p:sp>
         <p:nvSpPr>
-          <p:cNvPr id="2" name="Slide Image Placeholder 1"/>
+          <p:cNvPr id="2" name="Slide Image Placeholder 1">
+            <a:extLst>
+              <a:ext uri="{FF2B5EF4-FFF2-40B4-BE49-F238E27FC236}">
+                <a16:creationId xmlns:a16="http://schemas.microsoft.com/office/drawing/2014/main" id="{45664422-956E-4C8F-85DA-E10E8E91C624}"/>
+              </a:ext>
+            </a:extLst>
+          </p:cNvPr>
           <p:cNvSpPr>
             <a:spLocks noGrp="1" noRot="1" noChangeAspect="1"/>
           </p:cNvSpPr>
@@ -617,7 +632,13 @@
       </p:sp>
       <p:sp>
         <p:nvSpPr>
-          <p:cNvPr id="3" name="Notes Placeholder 2"/>
+          <p:cNvPr id="3" name="Notes Placeholder 2">
+            <a:extLst>
+              <a:ext uri="{FF2B5EF4-FFF2-40B4-BE49-F238E27FC236}">
+                <a16:creationId xmlns:a16="http://schemas.microsoft.com/office/drawing/2014/main" id="{BC2FA968-2010-106C-503E-F1CEB5EA0E1D}"/>
+              </a:ext>
+            </a:extLst>
+          </p:cNvPr>
           <p:cNvSpPr>
             <a:spLocks noGrp="1"/>
           </p:cNvSpPr>
@@ -647,11 +668,32 @@
               <a:t>F + T</a:t>
             </a:r>
           </a:p>
-        </p:txBody>
-      </p:sp>
-      <p:sp>
-        <p:nvSpPr>
-          <p:cNvPr id="4" name="Slide Number Placeholder 3"/>
+          <a:p>
+            <a:endParaRPr lang="en-GB" dirty="0"/>
+          </a:p>
+          <a:p>
+            <a:r>
+              <a:rPr lang="en-GB" dirty="0"/>
+              <a:t>Testing a more orange orange for this one too</a:t>
+            </a:r>
+          </a:p>
+          <a:p>
+            <a:r>
+              <a:rPr lang="en-GB" dirty="0"/>
+              <a:t>Richard says easy to distinguish but not necessarily easy to say what colour they are, which is what we need! Maybe pink instead? That’s what </a:t>
+            </a:r>
+          </a:p>
+        </p:txBody>
+      </p:sp>
+      <p:sp>
+        <p:nvSpPr>
+          <p:cNvPr id="4" name="Slide Number Placeholder 3">
+            <a:extLst>
+              <a:ext uri="{FF2B5EF4-FFF2-40B4-BE49-F238E27FC236}">
+                <a16:creationId xmlns:a16="http://schemas.microsoft.com/office/drawing/2014/main" id="{56BE98FF-229B-4015-D9C1-B12363AF60CF}"/>
+              </a:ext>
+            </a:extLst>
+          </p:cNvPr>
           <p:cNvSpPr>
             <a:spLocks noGrp="1"/>
           </p:cNvSpPr>
@@ -675,7 +717,7 @@
     </p:spTree>
     <p:extLst>
       <p:ext uri="{BB962C8B-B14F-4D97-AF65-F5344CB8AC3E}">
-        <p14:creationId xmlns:p14="http://schemas.microsoft.com/office/powerpoint/2010/main" val="2593999224"/>
+        <p14:creationId xmlns:p14="http://schemas.microsoft.com/office/powerpoint/2010/main" val="3256756342"/>
       </p:ext>
     </p:extLst>
   </p:cSld>
@@ -690,7 +732,13 @@
   <p:cSld>
     <p:spTree>
       <p:nvGrpSpPr>
-        <p:cNvPr id="1" name=""/>
+        <p:cNvPr id="1" name="">
+          <a:extLst>
+            <a:ext uri="{FF2B5EF4-FFF2-40B4-BE49-F238E27FC236}">
+              <a16:creationId xmlns:a16="http://schemas.microsoft.com/office/drawing/2014/main" id="{2C8AD65F-D7B7-8AB1-4BE4-B28BA88263CB}"/>
+            </a:ext>
+          </a:extLst>
+        </p:cNvPr>
         <p:cNvGrpSpPr/>
         <p:nvPr/>
       </p:nvGrpSpPr>
@@ -704,7 +752,13 @@
       </p:grpSpPr>
       <p:sp>
         <p:nvSpPr>
-          <p:cNvPr id="2" name="Slide Image Placeholder 1"/>
+          <p:cNvPr id="2" name="Slide Image Placeholder 1">
+            <a:extLst>
+              <a:ext uri="{FF2B5EF4-FFF2-40B4-BE49-F238E27FC236}">
+                <a16:creationId xmlns:a16="http://schemas.microsoft.com/office/drawing/2014/main" id="{9A09BD07-7828-1882-C0AA-4BB60DD74B27}"/>
+              </a:ext>
+            </a:extLst>
+          </p:cNvPr>
           <p:cNvSpPr>
             <a:spLocks noGrp="1" noRot="1" noChangeAspect="1"/>
           </p:cNvSpPr>
@@ -716,7 +770,13 @@
       </p:sp>
       <p:sp>
         <p:nvSpPr>
-          <p:cNvPr id="3" name="Notes Placeholder 2"/>
+          <p:cNvPr id="3" name="Notes Placeholder 2">
+            <a:extLst>
+              <a:ext uri="{FF2B5EF4-FFF2-40B4-BE49-F238E27FC236}">
+                <a16:creationId xmlns:a16="http://schemas.microsoft.com/office/drawing/2014/main" id="{F02BC1D9-FB31-DE17-5BD8-4279FD4D1D71}"/>
+              </a:ext>
+            </a:extLst>
+          </p:cNvPr>
           <p:cNvSpPr>
             <a:spLocks noGrp="1"/>
           </p:cNvSpPr>
@@ -729,46 +789,12 @@
           <a:bodyPr/>
           <a:lstStyle/>
           <a:p>
-            <a:pPr marL="0" marR="0" lvl="0" indent="0" algn="l" defTabSz="518465" rtl="0" eaLnBrk="1" fontAlgn="auto" latinLnBrk="0" hangingPunct="1">
-              <a:lnSpc>
-                <a:spcPct val="100000"/>
-              </a:lnSpc>
-              <a:spcBef>
-                <a:spcPts val="0"/>
-              </a:spcBef>
-              <a:spcAft>
-                <a:spcPts val="0"/>
-              </a:spcAft>
-              <a:buClrTx/>
-              <a:buSzTx/>
-              <a:buFontTx/>
-              <a:buNone/>
-              <a:tabLst/>
-              <a:defRPr/>
-            </a:pPr>
             <a:r>
               <a:rPr lang="en-GB" dirty="0"/>
               <a:t>ARC</a:t>
             </a:r>
           </a:p>
           <a:p>
-            <a:pPr marL="0" marR="0" lvl="0" indent="0" algn="l" defTabSz="518465" rtl="0" eaLnBrk="1" fontAlgn="auto" latinLnBrk="0" hangingPunct="1">
-              <a:lnSpc>
-                <a:spcPct val="100000"/>
-              </a:lnSpc>
-              <a:spcBef>
-                <a:spcPts val="0"/>
-              </a:spcBef>
-              <a:spcAft>
-                <a:spcPts val="0"/>
-              </a:spcAft>
-              <a:buClrTx/>
-              <a:buSzTx/>
-              <a:buFontTx/>
-              <a:buNone/>
-              <a:tabLst/>
-              <a:defRPr/>
-            </a:pPr>
             <a:r>
               <a:rPr lang="en-GB" dirty="0"/>
               <a:t>The circle, which is blue, is right of the triangle</a:t>
@@ -777,14 +803,35 @@
           <a:p>
             <a:r>
               <a:rPr lang="en-GB" dirty="0"/>
-              <a:t>F + F</a:t>
-            </a:r>
-          </a:p>
-        </p:txBody>
-      </p:sp>
-      <p:sp>
-        <p:nvSpPr>
-          <p:cNvPr id="4" name="Slide Number Placeholder 3"/>
+              <a:t>F + T</a:t>
+            </a:r>
+          </a:p>
+          <a:p>
+            <a:endParaRPr lang="en-GB" dirty="0"/>
+          </a:p>
+          <a:p>
+            <a:r>
+              <a:rPr lang="en-GB" dirty="0"/>
+              <a:t>Testing a more orange orange for this one too</a:t>
+            </a:r>
+          </a:p>
+          <a:p>
+            <a:r>
+              <a:rPr lang="en-GB" dirty="0"/>
+              <a:t>Richard says easy to distinguish but not necessarily easy to say what colour they are, which is what we need! Maybe pink instead? That’s what </a:t>
+            </a:r>
+          </a:p>
+        </p:txBody>
+      </p:sp>
+      <p:sp>
+        <p:nvSpPr>
+          <p:cNvPr id="4" name="Slide Number Placeholder 3">
+            <a:extLst>
+              <a:ext uri="{FF2B5EF4-FFF2-40B4-BE49-F238E27FC236}">
+                <a16:creationId xmlns:a16="http://schemas.microsoft.com/office/drawing/2014/main" id="{4F1C01EC-7D2F-053E-1A67-531B3C12E8A7}"/>
+              </a:ext>
+            </a:extLst>
+          </p:cNvPr>
           <p:cNvSpPr>
             <a:spLocks noGrp="1"/>
           </p:cNvSpPr>
@@ -808,7 +855,7 @@
     </p:spTree>
     <p:extLst>
       <p:ext uri="{BB962C8B-B14F-4D97-AF65-F5344CB8AC3E}">
-        <p14:creationId xmlns:p14="http://schemas.microsoft.com/office/powerpoint/2010/main" val="840748624"/>
+        <p14:creationId xmlns:p14="http://schemas.microsoft.com/office/powerpoint/2010/main" val="3746615720"/>
       </p:ext>
     </p:extLst>
   </p:cSld>
@@ -862,46 +909,12 @@
           <a:bodyPr/>
           <a:lstStyle/>
           <a:p>
-            <a:pPr marL="0" marR="0" lvl="0" indent="0" algn="l" defTabSz="518465" rtl="0" eaLnBrk="1" fontAlgn="auto" latinLnBrk="0" hangingPunct="1">
-              <a:lnSpc>
-                <a:spcPct val="100000"/>
-              </a:lnSpc>
-              <a:spcBef>
-                <a:spcPts val="0"/>
-              </a:spcBef>
-              <a:spcAft>
-                <a:spcPts val="0"/>
-              </a:spcAft>
-              <a:buClrTx/>
-              <a:buSzTx/>
-              <a:buFontTx/>
-              <a:buNone/>
-              <a:tabLst/>
-              <a:defRPr/>
-            </a:pPr>
             <a:r>
               <a:rPr lang="en-GB" dirty="0"/>
               <a:t>ARC</a:t>
             </a:r>
           </a:p>
           <a:p>
-            <a:pPr marL="0" marR="0" lvl="0" indent="0" algn="l" defTabSz="518465" rtl="0" eaLnBrk="1" fontAlgn="auto" latinLnBrk="0" hangingPunct="1">
-              <a:lnSpc>
-                <a:spcPct val="100000"/>
-              </a:lnSpc>
-              <a:spcBef>
-                <a:spcPts val="0"/>
-              </a:spcBef>
-              <a:spcAft>
-                <a:spcPts val="0"/>
-              </a:spcAft>
-              <a:buClrTx/>
-              <a:buSzTx/>
-              <a:buFontTx/>
-              <a:buNone/>
-              <a:tabLst/>
-              <a:defRPr/>
-            </a:pPr>
             <a:r>
               <a:rPr lang="en-GB" dirty="0"/>
               <a:t>The circle, which is blue, is right of the triangle</a:t>
@@ -910,7 +923,7 @@
           <a:p>
             <a:r>
               <a:rPr lang="en-GB" dirty="0"/>
-              <a:t>F + F</a:t>
+              <a:t>F + T</a:t>
             </a:r>
           </a:p>
         </p:txBody>
@@ -941,7 +954,7 @@
     </p:spTree>
     <p:extLst>
       <p:ext uri="{BB962C8B-B14F-4D97-AF65-F5344CB8AC3E}">
-        <p14:creationId xmlns:p14="http://schemas.microsoft.com/office/powerpoint/2010/main" val="3606906641"/>
+        <p14:creationId xmlns:p14="http://schemas.microsoft.com/office/powerpoint/2010/main" val="2515573565"/>
       </p:ext>
     </p:extLst>
   </p:cSld>
@@ -995,46 +1008,12 @@
           <a:bodyPr/>
           <a:lstStyle/>
           <a:p>
-            <a:pPr marL="0" marR="0" lvl="0" indent="0" algn="l" defTabSz="518465" rtl="0" eaLnBrk="1" fontAlgn="auto" latinLnBrk="0" hangingPunct="1">
-              <a:lnSpc>
-                <a:spcPct val="100000"/>
-              </a:lnSpc>
-              <a:spcBef>
-                <a:spcPts val="0"/>
-              </a:spcBef>
-              <a:spcAft>
-                <a:spcPts val="0"/>
-              </a:spcAft>
-              <a:buClrTx/>
-              <a:buSzTx/>
-              <a:buFontTx/>
-              <a:buNone/>
-              <a:tabLst/>
-              <a:defRPr/>
-            </a:pPr>
             <a:r>
               <a:rPr lang="en-GB" dirty="0"/>
               <a:t>ARC</a:t>
             </a:r>
           </a:p>
           <a:p>
-            <a:pPr marL="0" marR="0" lvl="0" indent="0" algn="l" defTabSz="518465" rtl="0" eaLnBrk="1" fontAlgn="auto" latinLnBrk="0" hangingPunct="1">
-              <a:lnSpc>
-                <a:spcPct val="100000"/>
-              </a:lnSpc>
-              <a:spcBef>
-                <a:spcPts val="0"/>
-              </a:spcBef>
-              <a:spcAft>
-                <a:spcPts val="0"/>
-              </a:spcAft>
-              <a:buClrTx/>
-              <a:buSzTx/>
-              <a:buFontTx/>
-              <a:buNone/>
-              <a:tabLst/>
-              <a:defRPr/>
-            </a:pPr>
             <a:r>
               <a:rPr lang="en-GB" dirty="0"/>
               <a:t>The circle, which is blue, is right of the triangle</a:t>
@@ -1043,7 +1022,7 @@
           <a:p>
             <a:r>
               <a:rPr lang="en-GB" dirty="0"/>
-              <a:t>F + F</a:t>
+              <a:t>F + T</a:t>
             </a:r>
           </a:p>
         </p:txBody>
@@ -1074,7 +1053,7 @@
     </p:spTree>
     <p:extLst>
       <p:ext uri="{BB962C8B-B14F-4D97-AF65-F5344CB8AC3E}">
-        <p14:creationId xmlns:p14="http://schemas.microsoft.com/office/powerpoint/2010/main" val="594113306"/>
+        <p14:creationId xmlns:p14="http://schemas.microsoft.com/office/powerpoint/2010/main" val="2593999224"/>
       </p:ext>
     </p:extLst>
   </p:cSld>
@@ -1128,21 +1107,55 @@
           <a:bodyPr/>
           <a:lstStyle/>
           <a:p>
+            <a:pPr marL="0" marR="0" lvl="0" indent="0" algn="l" defTabSz="518465" rtl="0" eaLnBrk="1" fontAlgn="auto" latinLnBrk="0" hangingPunct="1">
+              <a:lnSpc>
+                <a:spcPct val="100000"/>
+              </a:lnSpc>
+              <a:spcBef>
+                <a:spcPts val="0"/>
+              </a:spcBef>
+              <a:spcAft>
+                <a:spcPts val="0"/>
+              </a:spcAft>
+              <a:buClrTx/>
+              <a:buSzTx/>
+              <a:buFontTx/>
+              <a:buNone/>
+              <a:tabLst/>
+              <a:defRPr/>
+            </a:pPr>
             <a:r>
               <a:rPr lang="en-GB" dirty="0"/>
               <a:t>ARC</a:t>
             </a:r>
           </a:p>
           <a:p>
-            <a:r>
-              <a:rPr lang="en-GB" sz="800" dirty="0"/>
-              <a:t>The square, which is orange, is left of the circle</a:t>
-            </a:r>
-          </a:p>
-          <a:p>
+            <a:pPr marL="0" marR="0" lvl="0" indent="0" algn="l" defTabSz="518465" rtl="0" eaLnBrk="1" fontAlgn="auto" latinLnBrk="0" hangingPunct="1">
+              <a:lnSpc>
+                <a:spcPct val="100000"/>
+              </a:lnSpc>
+              <a:spcBef>
+                <a:spcPts val="0"/>
+              </a:spcBef>
+              <a:spcAft>
+                <a:spcPts val="0"/>
+              </a:spcAft>
+              <a:buClrTx/>
+              <a:buSzTx/>
+              <a:buFontTx/>
+              <a:buNone/>
+              <a:tabLst/>
+              <a:defRPr/>
+            </a:pPr>
             <a:r>
               <a:rPr lang="en-GB" dirty="0"/>
-              <a:t>T + T</a:t>
+              <a:t>The circle, which is blue, is right of the triangle</a:t>
+            </a:r>
+          </a:p>
+          <a:p>
+            <a:r>
+              <a:rPr lang="en-GB" dirty="0"/>
+              <a:t>F + F</a:t>
             </a:r>
           </a:p>
         </p:txBody>
@@ -1164,7 +1177,7 @@
           <a:p>
             <a:fld id="{B36E31BD-47D6-AF47-9BDE-D36BBCCAD48A}" type="slidenum">
               <a:rPr lang="en-GB" smtClean="0"/>
-              <a:t>15</a:t>
+              <a:t>14</a:t>
             </a:fld>
             <a:endParaRPr lang="en-GB"/>
           </a:p>
@@ -1173,7 +1186,7 @@
     </p:spTree>
     <p:extLst>
       <p:ext uri="{BB962C8B-B14F-4D97-AF65-F5344CB8AC3E}">
-        <p14:creationId xmlns:p14="http://schemas.microsoft.com/office/powerpoint/2010/main" val="1812848733"/>
+        <p14:creationId xmlns:p14="http://schemas.microsoft.com/office/powerpoint/2010/main" val="840748624"/>
       </p:ext>
     </p:extLst>
   </p:cSld>
@@ -1227,48 +1240,55 @@
           <a:bodyPr/>
           <a:lstStyle/>
           <a:p>
+            <a:pPr marL="0" marR="0" lvl="0" indent="0" algn="l" defTabSz="518465" rtl="0" eaLnBrk="1" fontAlgn="auto" latinLnBrk="0" hangingPunct="1">
+              <a:lnSpc>
+                <a:spcPct val="100000"/>
+              </a:lnSpc>
+              <a:spcBef>
+                <a:spcPts val="0"/>
+              </a:spcBef>
+              <a:spcAft>
+                <a:spcPts val="0"/>
+              </a:spcAft>
+              <a:buClrTx/>
+              <a:buSzTx/>
+              <a:buFontTx/>
+              <a:buNone/>
+              <a:tabLst/>
+              <a:defRPr/>
+            </a:pPr>
             <a:r>
               <a:rPr lang="en-GB" dirty="0"/>
               <a:t>ARC</a:t>
             </a:r>
           </a:p>
           <a:p>
-            <a:r>
-              <a:rPr lang="en-GB" sz="700" dirty="0"/>
-              <a:t>The square, which is orange, is left of the circle</a:t>
-            </a:r>
-          </a:p>
-          <a:p>
+            <a:pPr marL="0" marR="0" lvl="0" indent="0" algn="l" defTabSz="518465" rtl="0" eaLnBrk="1" fontAlgn="auto" latinLnBrk="0" hangingPunct="1">
+              <a:lnSpc>
+                <a:spcPct val="100000"/>
+              </a:lnSpc>
+              <a:spcBef>
+                <a:spcPts val="0"/>
+              </a:spcBef>
+              <a:spcAft>
+                <a:spcPts val="0"/>
+              </a:spcAft>
+              <a:buClrTx/>
+              <a:buSzTx/>
+              <a:buFontTx/>
+              <a:buNone/>
+              <a:tabLst/>
+              <a:defRPr/>
+            </a:pPr>
             <a:r>
               <a:rPr lang="en-GB" dirty="0"/>
-              <a:t>T + T</a:t>
-            </a:r>
-          </a:p>
-          <a:p>
-            <a:endParaRPr lang="en-GB" dirty="0"/>
+              <a:t>The circle, which is blue, is right of the triangle</a:t>
+            </a:r>
           </a:p>
           <a:p>
             <a:r>
               <a:rPr lang="en-GB" dirty="0"/>
-              <a:t>These are the three colours we’ll try to stick to:</a:t>
-            </a:r>
-          </a:p>
-          <a:p>
-            <a:r>
-              <a:rPr lang="en-GB" dirty="0"/>
-              <a:t>Green: 0E6E2F</a:t>
-            </a:r>
-          </a:p>
-          <a:p>
-            <a:r>
-              <a:rPr lang="en-GB" dirty="0"/>
-              <a:t>Blue: 658FFF</a:t>
-            </a:r>
-          </a:p>
-          <a:p>
-            <a:r>
-              <a:rPr lang="en-GB" dirty="0"/>
-              <a:t>Orange: FF9400</a:t>
+              <a:t>F + F</a:t>
             </a:r>
           </a:p>
         </p:txBody>
@@ -1290,7 +1310,7 @@
           <a:p>
             <a:fld id="{B36E31BD-47D6-AF47-9BDE-D36BBCCAD48A}" type="slidenum">
               <a:rPr lang="en-GB" smtClean="0"/>
-              <a:t>16</a:t>
+              <a:t>15</a:t>
             </a:fld>
             <a:endParaRPr lang="en-GB"/>
           </a:p>
@@ -1299,7 +1319,7 @@
     </p:spTree>
     <p:extLst>
       <p:ext uri="{BB962C8B-B14F-4D97-AF65-F5344CB8AC3E}">
-        <p14:creationId xmlns:p14="http://schemas.microsoft.com/office/powerpoint/2010/main" val="3816627194"/>
+        <p14:creationId xmlns:p14="http://schemas.microsoft.com/office/powerpoint/2010/main" val="3606906641"/>
       </p:ext>
     </p:extLst>
   </p:cSld>
@@ -1353,21 +1373,55 @@
           <a:bodyPr/>
           <a:lstStyle/>
           <a:p>
+            <a:pPr marL="0" marR="0" lvl="0" indent="0" algn="l" defTabSz="518465" rtl="0" eaLnBrk="1" fontAlgn="auto" latinLnBrk="0" hangingPunct="1">
+              <a:lnSpc>
+                <a:spcPct val="100000"/>
+              </a:lnSpc>
+              <a:spcBef>
+                <a:spcPts val="0"/>
+              </a:spcBef>
+              <a:spcAft>
+                <a:spcPts val="0"/>
+              </a:spcAft>
+              <a:buClrTx/>
+              <a:buSzTx/>
+              <a:buFontTx/>
+              <a:buNone/>
+              <a:tabLst/>
+              <a:defRPr/>
+            </a:pPr>
             <a:r>
               <a:rPr lang="en-GB" dirty="0"/>
               <a:t>ARC</a:t>
             </a:r>
           </a:p>
           <a:p>
-            <a:r>
-              <a:rPr lang="en-GB" sz="800" dirty="0"/>
-              <a:t>The square, which is orange, is left of the circle</a:t>
-            </a:r>
-          </a:p>
-          <a:p>
+            <a:pPr marL="0" marR="0" lvl="0" indent="0" algn="l" defTabSz="518465" rtl="0" eaLnBrk="1" fontAlgn="auto" latinLnBrk="0" hangingPunct="1">
+              <a:lnSpc>
+                <a:spcPct val="100000"/>
+              </a:lnSpc>
+              <a:spcBef>
+                <a:spcPts val="0"/>
+              </a:spcBef>
+              <a:spcAft>
+                <a:spcPts val="0"/>
+              </a:spcAft>
+              <a:buClrTx/>
+              <a:buSzTx/>
+              <a:buFontTx/>
+              <a:buNone/>
+              <a:tabLst/>
+              <a:defRPr/>
+            </a:pPr>
             <a:r>
               <a:rPr lang="en-GB" dirty="0"/>
-              <a:t>T + T</a:t>
+              <a:t>The circle, which is blue, is right of the triangle</a:t>
+            </a:r>
+          </a:p>
+          <a:p>
+            <a:r>
+              <a:rPr lang="en-GB" dirty="0"/>
+              <a:t>F + F</a:t>
             </a:r>
           </a:p>
         </p:txBody>
@@ -1389,7 +1443,7 @@
           <a:p>
             <a:fld id="{B36E31BD-47D6-AF47-9BDE-D36BBCCAD48A}" type="slidenum">
               <a:rPr lang="en-GB" smtClean="0"/>
-              <a:t>17</a:t>
+              <a:t>16</a:t>
             </a:fld>
             <a:endParaRPr lang="en-GB"/>
           </a:p>
@@ -1398,7 +1452,7 @@
     </p:spTree>
     <p:extLst>
       <p:ext uri="{BB962C8B-B14F-4D97-AF65-F5344CB8AC3E}">
-        <p14:creationId xmlns:p14="http://schemas.microsoft.com/office/powerpoint/2010/main" val="2313666167"/>
+        <p14:creationId xmlns:p14="http://schemas.microsoft.com/office/powerpoint/2010/main" val="594113306"/>
       </p:ext>
     </p:extLst>
   </p:cSld>
@@ -1466,7 +1520,7 @@
           <a:p>
             <a:r>
               <a:rPr lang="en-GB" dirty="0"/>
-              <a:t>T + F</a:t>
+              <a:t>T + T</a:t>
             </a:r>
           </a:p>
         </p:txBody>
@@ -1497,7 +1551,7 @@
     </p:spTree>
     <p:extLst>
       <p:ext uri="{BB962C8B-B14F-4D97-AF65-F5344CB8AC3E}">
-        <p14:creationId xmlns:p14="http://schemas.microsoft.com/office/powerpoint/2010/main" val="640194153"/>
+        <p14:creationId xmlns:p14="http://schemas.microsoft.com/office/powerpoint/2010/main" val="1812848733"/>
       </p:ext>
     </p:extLst>
   </p:cSld>
@@ -1565,7 +1619,34 @@
           <a:p>
             <a:r>
               <a:rPr lang="en-GB" dirty="0"/>
-              <a:t>T + F</a:t>
+              <a:t>T + T</a:t>
+            </a:r>
+          </a:p>
+          <a:p>
+            <a:endParaRPr lang="en-GB" dirty="0"/>
+          </a:p>
+          <a:p>
+            <a:r>
+              <a:rPr lang="en-GB" dirty="0"/>
+              <a:t>These are the three colours we’ll try to stick to:</a:t>
+            </a:r>
+          </a:p>
+          <a:p>
+            <a:r>
+              <a:rPr lang="en-GB" dirty="0"/>
+              <a:t>Green: 0E6E2F</a:t>
+            </a:r>
+          </a:p>
+          <a:p>
+            <a:r>
+              <a:rPr lang="en-GB" dirty="0"/>
+              <a:t>Blue: 658FFF</a:t>
+            </a:r>
+          </a:p>
+          <a:p>
+            <a:r>
+              <a:rPr lang="en-GB" dirty="0"/>
+              <a:t>Orange: FF9400</a:t>
             </a:r>
           </a:p>
         </p:txBody>
@@ -1596,7 +1677,7 @@
     </p:spTree>
     <p:extLst>
       <p:ext uri="{BB962C8B-B14F-4D97-AF65-F5344CB8AC3E}">
-        <p14:creationId xmlns:p14="http://schemas.microsoft.com/office/powerpoint/2010/main" val="2549450653"/>
+        <p14:creationId xmlns:p14="http://schemas.microsoft.com/office/powerpoint/2010/main" val="3816627194"/>
       </p:ext>
     </p:extLst>
   </p:cSld>
@@ -1664,7 +1745,7 @@
           <a:p>
             <a:r>
               <a:rPr lang="en-GB" dirty="0"/>
-              <a:t>T + F</a:t>
+              <a:t>T + T</a:t>
             </a:r>
           </a:p>
         </p:txBody>
@@ -1695,7 +1776,7 @@
     </p:spTree>
     <p:extLst>
       <p:ext uri="{BB962C8B-B14F-4D97-AF65-F5344CB8AC3E}">
-        <p14:creationId xmlns:p14="http://schemas.microsoft.com/office/powerpoint/2010/main" val="789334827"/>
+        <p14:creationId xmlns:p14="http://schemas.microsoft.com/office/powerpoint/2010/main" val="2313666167"/>
       </p:ext>
     </p:extLst>
   </p:cSld>
@@ -1862,7 +1943,7 @@
           <a:p>
             <a:r>
               <a:rPr lang="en-GB" dirty="0"/>
-              <a:t>F + T</a:t>
+              <a:t>T + F</a:t>
             </a:r>
           </a:p>
         </p:txBody>
@@ -1893,7 +1974,7 @@
     </p:spTree>
     <p:extLst>
       <p:ext uri="{BB962C8B-B14F-4D97-AF65-F5344CB8AC3E}">
-        <p14:creationId xmlns:p14="http://schemas.microsoft.com/office/powerpoint/2010/main" val="1214969823"/>
+        <p14:creationId xmlns:p14="http://schemas.microsoft.com/office/powerpoint/2010/main" val="640194153"/>
       </p:ext>
     </p:extLst>
   </p:cSld>
@@ -1961,7 +2042,7 @@
           <a:p>
             <a:r>
               <a:rPr lang="en-GB" dirty="0"/>
-              <a:t>F + T</a:t>
+              <a:t>T + F</a:t>
             </a:r>
           </a:p>
         </p:txBody>
@@ -1992,7 +2073,7 @@
     </p:spTree>
     <p:extLst>
       <p:ext uri="{BB962C8B-B14F-4D97-AF65-F5344CB8AC3E}">
-        <p14:creationId xmlns:p14="http://schemas.microsoft.com/office/powerpoint/2010/main" val="3972400564"/>
+        <p14:creationId xmlns:p14="http://schemas.microsoft.com/office/powerpoint/2010/main" val="2549450653"/>
       </p:ext>
     </p:extLst>
   </p:cSld>
@@ -2060,7 +2141,7 @@
           <a:p>
             <a:r>
               <a:rPr lang="en-GB" dirty="0"/>
-              <a:t>F + T</a:t>
+              <a:t>T + F</a:t>
             </a:r>
           </a:p>
         </p:txBody>
@@ -2091,7 +2172,7 @@
     </p:spTree>
     <p:extLst>
       <p:ext uri="{BB962C8B-B14F-4D97-AF65-F5344CB8AC3E}">
-        <p14:creationId xmlns:p14="http://schemas.microsoft.com/office/powerpoint/2010/main" val="3201001439"/>
+        <p14:creationId xmlns:p14="http://schemas.microsoft.com/office/powerpoint/2010/main" val="789334827"/>
       </p:ext>
     </p:extLst>
   </p:cSld>
@@ -2159,7 +2240,7 @@
           <a:p>
             <a:r>
               <a:rPr lang="en-GB" dirty="0"/>
-              <a:t>F + F</a:t>
+              <a:t>F + T</a:t>
             </a:r>
           </a:p>
         </p:txBody>
@@ -2190,7 +2271,7 @@
     </p:spTree>
     <p:extLst>
       <p:ext uri="{BB962C8B-B14F-4D97-AF65-F5344CB8AC3E}">
-        <p14:creationId xmlns:p14="http://schemas.microsoft.com/office/powerpoint/2010/main" val="2096276971"/>
+        <p14:creationId xmlns:p14="http://schemas.microsoft.com/office/powerpoint/2010/main" val="1214969823"/>
       </p:ext>
     </p:extLst>
   </p:cSld>
@@ -2258,7 +2339,7 @@
           <a:p>
             <a:r>
               <a:rPr lang="en-GB" dirty="0"/>
-              <a:t>F + F</a:t>
+              <a:t>F + T</a:t>
             </a:r>
           </a:p>
         </p:txBody>
@@ -2289,7 +2370,7 @@
     </p:spTree>
     <p:extLst>
       <p:ext uri="{BB962C8B-B14F-4D97-AF65-F5344CB8AC3E}">
-        <p14:creationId xmlns:p14="http://schemas.microsoft.com/office/powerpoint/2010/main" val="1933328535"/>
+        <p14:creationId xmlns:p14="http://schemas.microsoft.com/office/powerpoint/2010/main" val="3972400564"/>
       </p:ext>
     </p:extLst>
   </p:cSld>
@@ -2357,7 +2438,7 @@
           <a:p>
             <a:r>
               <a:rPr lang="en-GB" dirty="0"/>
-              <a:t>F + F</a:t>
+              <a:t>F + T</a:t>
             </a:r>
           </a:p>
         </p:txBody>
@@ -2388,7 +2469,7 @@
     </p:spTree>
     <p:extLst>
       <p:ext uri="{BB962C8B-B14F-4D97-AF65-F5344CB8AC3E}">
-        <p14:creationId xmlns:p14="http://schemas.microsoft.com/office/powerpoint/2010/main" val="1001997882"/>
+        <p14:creationId xmlns:p14="http://schemas.microsoft.com/office/powerpoint/2010/main" val="3201001439"/>
       </p:ext>
     </p:extLst>
   </p:cSld>
@@ -2449,14 +2530,14 @@
           </a:p>
           <a:p>
             <a:r>
-              <a:rPr lang="en-GB" sz="700" dirty="0"/>
-              <a:t>The triangle, which is left of the square, is yellow</a:t>
+              <a:rPr lang="en-GB" sz="800" dirty="0"/>
+              <a:t>The square, which is orange, is left of the circle</a:t>
             </a:r>
           </a:p>
           <a:p>
             <a:r>
               <a:rPr lang="en-GB" dirty="0"/>
-              <a:t>T + T</a:t>
+              <a:t>F + F</a:t>
             </a:r>
           </a:p>
         </p:txBody>
@@ -2478,7 +2559,7 @@
           <a:p>
             <a:fld id="{B36E31BD-47D6-AF47-9BDE-D36BBCCAD48A}" type="slidenum">
               <a:rPr lang="en-GB" smtClean="0"/>
-              <a:t>28</a:t>
+              <a:t>27</a:t>
             </a:fld>
             <a:endParaRPr lang="en-GB"/>
           </a:p>
@@ -2487,7 +2568,7 @@
     </p:spTree>
     <p:extLst>
       <p:ext uri="{BB962C8B-B14F-4D97-AF65-F5344CB8AC3E}">
-        <p14:creationId xmlns:p14="http://schemas.microsoft.com/office/powerpoint/2010/main" val="3952205427"/>
+        <p14:creationId xmlns:p14="http://schemas.microsoft.com/office/powerpoint/2010/main" val="2096276971"/>
       </p:ext>
     </p:extLst>
   </p:cSld>
@@ -2549,13 +2630,13 @@
           <a:p>
             <a:r>
               <a:rPr lang="en-GB" sz="700" dirty="0"/>
-              <a:t>The triangle, which is left of the square, is yellow</a:t>
+              <a:t>The square, which is orange, is left of the circle</a:t>
             </a:r>
           </a:p>
           <a:p>
             <a:r>
               <a:rPr lang="en-GB" dirty="0"/>
-              <a:t>T + T</a:t>
+              <a:t>F + F</a:t>
             </a:r>
           </a:p>
         </p:txBody>
@@ -2577,7 +2658,7 @@
           <a:p>
             <a:fld id="{B36E31BD-47D6-AF47-9BDE-D36BBCCAD48A}" type="slidenum">
               <a:rPr lang="en-GB" smtClean="0"/>
-              <a:t>29</a:t>
+              <a:t>28</a:t>
             </a:fld>
             <a:endParaRPr lang="en-GB"/>
           </a:p>
@@ -2586,7 +2667,7 @@
     </p:spTree>
     <p:extLst>
       <p:ext uri="{BB962C8B-B14F-4D97-AF65-F5344CB8AC3E}">
-        <p14:creationId xmlns:p14="http://schemas.microsoft.com/office/powerpoint/2010/main" val="1478311011"/>
+        <p14:creationId xmlns:p14="http://schemas.microsoft.com/office/powerpoint/2010/main" val="1933328535"/>
       </p:ext>
     </p:extLst>
   </p:cSld>
@@ -2647,14 +2728,14 @@
           </a:p>
           <a:p>
             <a:r>
-              <a:rPr lang="en-GB" sz="700" dirty="0"/>
-              <a:t>The triangle, which is left of the square, is yellow</a:t>
+              <a:rPr lang="en-GB" sz="800" dirty="0"/>
+              <a:t>The square, which is orange, is left of the circle</a:t>
             </a:r>
           </a:p>
           <a:p>
             <a:r>
               <a:rPr lang="en-GB" dirty="0"/>
-              <a:t>T + T</a:t>
+              <a:t>F + F</a:t>
             </a:r>
           </a:p>
         </p:txBody>
@@ -2676,7 +2757,7 @@
           <a:p>
             <a:fld id="{B36E31BD-47D6-AF47-9BDE-D36BBCCAD48A}" type="slidenum">
               <a:rPr lang="en-GB" smtClean="0"/>
-              <a:t>30</a:t>
+              <a:t>29</a:t>
             </a:fld>
             <a:endParaRPr lang="en-GB"/>
           </a:p>
@@ -2685,7 +2766,7 @@
     </p:spTree>
     <p:extLst>
       <p:ext uri="{BB962C8B-B14F-4D97-AF65-F5344CB8AC3E}">
-        <p14:creationId xmlns:p14="http://schemas.microsoft.com/office/powerpoint/2010/main" val="3121725976"/>
+        <p14:creationId xmlns:p14="http://schemas.microsoft.com/office/powerpoint/2010/main" val="1001997882"/>
       </p:ext>
     </p:extLst>
   </p:cSld>
@@ -2753,7 +2834,7 @@
           <a:p>
             <a:r>
               <a:rPr lang="en-GB" dirty="0"/>
-              <a:t>T + F</a:t>
+              <a:t>T + T</a:t>
             </a:r>
           </a:p>
         </p:txBody>
@@ -2784,7 +2865,7 @@
     </p:spTree>
     <p:extLst>
       <p:ext uri="{BB962C8B-B14F-4D97-AF65-F5344CB8AC3E}">
-        <p14:creationId xmlns:p14="http://schemas.microsoft.com/office/powerpoint/2010/main" val="3770593151"/>
+        <p14:creationId xmlns:p14="http://schemas.microsoft.com/office/powerpoint/2010/main" val="3952205427"/>
       </p:ext>
     </p:extLst>
   </p:cSld>
@@ -2951,7 +3032,7 @@
           <a:p>
             <a:r>
               <a:rPr lang="en-GB" dirty="0"/>
-              <a:t>T + F</a:t>
+              <a:t>T + T</a:t>
             </a:r>
           </a:p>
         </p:txBody>
@@ -2982,7 +3063,7 @@
     </p:spTree>
     <p:extLst>
       <p:ext uri="{BB962C8B-B14F-4D97-AF65-F5344CB8AC3E}">
-        <p14:creationId xmlns:p14="http://schemas.microsoft.com/office/powerpoint/2010/main" val="2780036475"/>
+        <p14:creationId xmlns:p14="http://schemas.microsoft.com/office/powerpoint/2010/main" val="1478311011"/>
       </p:ext>
     </p:extLst>
   </p:cSld>
@@ -3050,7 +3131,7 @@
           <a:p>
             <a:r>
               <a:rPr lang="en-GB" dirty="0"/>
-              <a:t>T + F</a:t>
+              <a:t>T + T</a:t>
             </a:r>
           </a:p>
         </p:txBody>
@@ -3081,7 +3162,7 @@
     </p:spTree>
     <p:extLst>
       <p:ext uri="{BB962C8B-B14F-4D97-AF65-F5344CB8AC3E}">
-        <p14:creationId xmlns:p14="http://schemas.microsoft.com/office/powerpoint/2010/main" val="746636157"/>
+        <p14:creationId xmlns:p14="http://schemas.microsoft.com/office/powerpoint/2010/main" val="3121725976"/>
       </p:ext>
     </p:extLst>
   </p:cSld>
@@ -3149,7 +3230,7 @@
           <a:p>
             <a:r>
               <a:rPr lang="en-GB" dirty="0"/>
-              <a:t>F + T</a:t>
+              <a:t>T + F</a:t>
             </a:r>
           </a:p>
         </p:txBody>
@@ -3180,7 +3261,7 @@
     </p:spTree>
     <p:extLst>
       <p:ext uri="{BB962C8B-B14F-4D97-AF65-F5344CB8AC3E}">
-        <p14:creationId xmlns:p14="http://schemas.microsoft.com/office/powerpoint/2010/main" val="2426873934"/>
+        <p14:creationId xmlns:p14="http://schemas.microsoft.com/office/powerpoint/2010/main" val="3770593151"/>
       </p:ext>
     </p:extLst>
   </p:cSld>
@@ -3248,7 +3329,7 @@
           <a:p>
             <a:r>
               <a:rPr lang="en-GB" dirty="0"/>
-              <a:t>F + T</a:t>
+              <a:t>T + F</a:t>
             </a:r>
           </a:p>
         </p:txBody>
@@ -3279,7 +3360,7 @@
     </p:spTree>
     <p:extLst>
       <p:ext uri="{BB962C8B-B14F-4D97-AF65-F5344CB8AC3E}">
-        <p14:creationId xmlns:p14="http://schemas.microsoft.com/office/powerpoint/2010/main" val="3044411204"/>
+        <p14:creationId xmlns:p14="http://schemas.microsoft.com/office/powerpoint/2010/main" val="2780036475"/>
       </p:ext>
     </p:extLst>
   </p:cSld>
@@ -3347,7 +3428,7 @@
           <a:p>
             <a:r>
               <a:rPr lang="en-GB" dirty="0"/>
-              <a:t>F + T</a:t>
+              <a:t>T + F</a:t>
             </a:r>
           </a:p>
         </p:txBody>
@@ -3378,7 +3459,7 @@
     </p:spTree>
     <p:extLst>
       <p:ext uri="{BB962C8B-B14F-4D97-AF65-F5344CB8AC3E}">
-        <p14:creationId xmlns:p14="http://schemas.microsoft.com/office/powerpoint/2010/main" val="2202838759"/>
+        <p14:creationId xmlns:p14="http://schemas.microsoft.com/office/powerpoint/2010/main" val="746636157"/>
       </p:ext>
     </p:extLst>
   </p:cSld>
@@ -3446,7 +3527,7 @@
           <a:p>
             <a:r>
               <a:rPr lang="en-GB" dirty="0"/>
-              <a:t>F + F</a:t>
+              <a:t>F + T</a:t>
             </a:r>
           </a:p>
         </p:txBody>
@@ -3477,7 +3558,7 @@
     </p:spTree>
     <p:extLst>
       <p:ext uri="{BB962C8B-B14F-4D97-AF65-F5344CB8AC3E}">
-        <p14:creationId xmlns:p14="http://schemas.microsoft.com/office/powerpoint/2010/main" val="321301765"/>
+        <p14:creationId xmlns:p14="http://schemas.microsoft.com/office/powerpoint/2010/main" val="2426873934"/>
       </p:ext>
     </p:extLst>
   </p:cSld>
@@ -3545,7 +3626,7 @@
           <a:p>
             <a:r>
               <a:rPr lang="en-GB" dirty="0"/>
-              <a:t>F + F</a:t>
+              <a:t>F + T</a:t>
             </a:r>
           </a:p>
         </p:txBody>
@@ -3576,7 +3657,7 @@
     </p:spTree>
     <p:extLst>
       <p:ext uri="{BB962C8B-B14F-4D97-AF65-F5344CB8AC3E}">
-        <p14:creationId xmlns:p14="http://schemas.microsoft.com/office/powerpoint/2010/main" val="2434098653"/>
+        <p14:creationId xmlns:p14="http://schemas.microsoft.com/office/powerpoint/2010/main" val="3044411204"/>
       </p:ext>
     </p:extLst>
   </p:cSld>
@@ -3644,7 +3725,7 @@
           <a:p>
             <a:r>
               <a:rPr lang="en-GB" dirty="0"/>
-              <a:t>F + F</a:t>
+              <a:t>F + T</a:t>
             </a:r>
           </a:p>
         </p:txBody>
@@ -3675,7 +3756,205 @@
     </p:spTree>
     <p:extLst>
       <p:ext uri="{BB962C8B-B14F-4D97-AF65-F5344CB8AC3E}">
-        <p14:creationId xmlns:p14="http://schemas.microsoft.com/office/powerpoint/2010/main" val="2334456889"/>
+        <p14:creationId xmlns:p14="http://schemas.microsoft.com/office/powerpoint/2010/main" val="2202838759"/>
+      </p:ext>
+    </p:extLst>
+  </p:cSld>
+  <p:clrMapOvr>
+    <a:masterClrMapping/>
+  </p:clrMapOvr>
+</p:notes>
+</file>
+
+<file path=ppt/notesSlides/notesSlide38.xml><?xml version="1.0" encoding="utf-8"?>
+<p:notes xmlns:a="http://schemas.openxmlformats.org/drawingml/2006/main" xmlns:r="http://schemas.openxmlformats.org/officeDocument/2006/relationships" xmlns:p="http://schemas.openxmlformats.org/presentationml/2006/main">
+  <p:cSld>
+    <p:spTree>
+      <p:nvGrpSpPr>
+        <p:cNvPr id="1" name=""/>
+        <p:cNvGrpSpPr/>
+        <p:nvPr/>
+      </p:nvGrpSpPr>
+      <p:grpSpPr>
+        <a:xfrm>
+          <a:off x="0" y="0"/>
+          <a:ext cx="0" cy="0"/>
+          <a:chOff x="0" y="0"/>
+          <a:chExt cx="0" cy="0"/>
+        </a:xfrm>
+      </p:grpSpPr>
+      <p:sp>
+        <p:nvSpPr>
+          <p:cNvPr id="2" name="Slide Image Placeholder 1"/>
+          <p:cNvSpPr>
+            <a:spLocks noGrp="1" noRot="1" noChangeAspect="1"/>
+          </p:cNvSpPr>
+          <p:nvPr>
+            <p:ph type="sldImg"/>
+          </p:nvPr>
+        </p:nvSpPr>
+        <p:spPr/>
+      </p:sp>
+      <p:sp>
+        <p:nvSpPr>
+          <p:cNvPr id="3" name="Notes Placeholder 2"/>
+          <p:cNvSpPr>
+            <a:spLocks noGrp="1"/>
+          </p:cNvSpPr>
+          <p:nvPr>
+            <p:ph type="body" idx="1"/>
+          </p:nvPr>
+        </p:nvSpPr>
+        <p:spPr/>
+        <p:txBody>
+          <a:bodyPr/>
+          <a:lstStyle/>
+          <a:p>
+            <a:r>
+              <a:rPr lang="en-GB" dirty="0"/>
+              <a:t>ARC</a:t>
+            </a:r>
+          </a:p>
+          <a:p>
+            <a:r>
+              <a:rPr lang="en-GB" sz="700" dirty="0"/>
+              <a:t>The triangle, which is left of the square, is yellow</a:t>
+            </a:r>
+          </a:p>
+          <a:p>
+            <a:r>
+              <a:rPr lang="en-GB" dirty="0"/>
+              <a:t>F + F</a:t>
+            </a:r>
+          </a:p>
+        </p:txBody>
+      </p:sp>
+      <p:sp>
+        <p:nvSpPr>
+          <p:cNvPr id="4" name="Slide Number Placeholder 3"/>
+          <p:cNvSpPr>
+            <a:spLocks noGrp="1"/>
+          </p:cNvSpPr>
+          <p:nvPr>
+            <p:ph type="sldNum" sz="quarter" idx="5"/>
+          </p:nvPr>
+        </p:nvSpPr>
+        <p:spPr/>
+        <p:txBody>
+          <a:bodyPr/>
+          <a:lstStyle/>
+          <a:p>
+            <a:fld id="{B36E31BD-47D6-AF47-9BDE-D36BBCCAD48A}" type="slidenum">
+              <a:rPr lang="en-GB" smtClean="0"/>
+              <a:t>40</a:t>
+            </a:fld>
+            <a:endParaRPr lang="en-GB"/>
+          </a:p>
+        </p:txBody>
+      </p:sp>
+    </p:spTree>
+    <p:extLst>
+      <p:ext uri="{BB962C8B-B14F-4D97-AF65-F5344CB8AC3E}">
+        <p14:creationId xmlns:p14="http://schemas.microsoft.com/office/powerpoint/2010/main" val="321301765"/>
+      </p:ext>
+    </p:extLst>
+  </p:cSld>
+  <p:clrMapOvr>
+    <a:masterClrMapping/>
+  </p:clrMapOvr>
+</p:notes>
+</file>
+
+<file path=ppt/notesSlides/notesSlide39.xml><?xml version="1.0" encoding="utf-8"?>
+<p:notes xmlns:a="http://schemas.openxmlformats.org/drawingml/2006/main" xmlns:r="http://schemas.openxmlformats.org/officeDocument/2006/relationships" xmlns:p="http://schemas.openxmlformats.org/presentationml/2006/main">
+  <p:cSld>
+    <p:spTree>
+      <p:nvGrpSpPr>
+        <p:cNvPr id="1" name=""/>
+        <p:cNvGrpSpPr/>
+        <p:nvPr/>
+      </p:nvGrpSpPr>
+      <p:grpSpPr>
+        <a:xfrm>
+          <a:off x="0" y="0"/>
+          <a:ext cx="0" cy="0"/>
+          <a:chOff x="0" y="0"/>
+          <a:chExt cx="0" cy="0"/>
+        </a:xfrm>
+      </p:grpSpPr>
+      <p:sp>
+        <p:nvSpPr>
+          <p:cNvPr id="2" name="Slide Image Placeholder 1"/>
+          <p:cNvSpPr>
+            <a:spLocks noGrp="1" noRot="1" noChangeAspect="1"/>
+          </p:cNvSpPr>
+          <p:nvPr>
+            <p:ph type="sldImg"/>
+          </p:nvPr>
+        </p:nvSpPr>
+        <p:spPr/>
+      </p:sp>
+      <p:sp>
+        <p:nvSpPr>
+          <p:cNvPr id="3" name="Notes Placeholder 2"/>
+          <p:cNvSpPr>
+            <a:spLocks noGrp="1"/>
+          </p:cNvSpPr>
+          <p:nvPr>
+            <p:ph type="body" idx="1"/>
+          </p:nvPr>
+        </p:nvSpPr>
+        <p:spPr/>
+        <p:txBody>
+          <a:bodyPr/>
+          <a:lstStyle/>
+          <a:p>
+            <a:r>
+              <a:rPr lang="en-GB" dirty="0"/>
+              <a:t>ARC</a:t>
+            </a:r>
+          </a:p>
+          <a:p>
+            <a:r>
+              <a:rPr lang="en-GB" sz="700" dirty="0"/>
+              <a:t>The triangle, which is left of the square, is yellow</a:t>
+            </a:r>
+          </a:p>
+          <a:p>
+            <a:r>
+              <a:rPr lang="en-GB" dirty="0"/>
+              <a:t>F + F</a:t>
+            </a:r>
+          </a:p>
+        </p:txBody>
+      </p:sp>
+      <p:sp>
+        <p:nvSpPr>
+          <p:cNvPr id="4" name="Slide Number Placeholder 3"/>
+          <p:cNvSpPr>
+            <a:spLocks noGrp="1"/>
+          </p:cNvSpPr>
+          <p:nvPr>
+            <p:ph type="sldNum" sz="quarter" idx="5"/>
+          </p:nvPr>
+        </p:nvSpPr>
+        <p:spPr/>
+        <p:txBody>
+          <a:bodyPr/>
+          <a:lstStyle/>
+          <a:p>
+            <a:fld id="{B36E31BD-47D6-AF47-9BDE-D36BBCCAD48A}" type="slidenum">
+              <a:rPr lang="en-GB" smtClean="0"/>
+              <a:t>41</a:t>
+            </a:fld>
+            <a:endParaRPr lang="en-GB"/>
+          </a:p>
+        </p:txBody>
+      </p:sp>
+    </p:spTree>
+    <p:extLst>
+      <p:ext uri="{BB962C8B-B14F-4D97-AF65-F5344CB8AC3E}">
+        <p14:creationId xmlns:p14="http://schemas.microsoft.com/office/powerpoint/2010/main" val="2434098653"/>
       </p:ext>
     </p:extLst>
   </p:cSld>
@@ -3775,6 +4054,105 @@
     <p:extLst>
       <p:ext uri="{BB962C8B-B14F-4D97-AF65-F5344CB8AC3E}">
         <p14:creationId xmlns:p14="http://schemas.microsoft.com/office/powerpoint/2010/main" val="3870357151"/>
+      </p:ext>
+    </p:extLst>
+  </p:cSld>
+  <p:clrMapOvr>
+    <a:masterClrMapping/>
+  </p:clrMapOvr>
+</p:notes>
+</file>
+
+<file path=ppt/notesSlides/notesSlide40.xml><?xml version="1.0" encoding="utf-8"?>
+<p:notes xmlns:a="http://schemas.openxmlformats.org/drawingml/2006/main" xmlns:r="http://schemas.openxmlformats.org/officeDocument/2006/relationships" xmlns:p="http://schemas.openxmlformats.org/presentationml/2006/main">
+  <p:cSld>
+    <p:spTree>
+      <p:nvGrpSpPr>
+        <p:cNvPr id="1" name=""/>
+        <p:cNvGrpSpPr/>
+        <p:nvPr/>
+      </p:nvGrpSpPr>
+      <p:grpSpPr>
+        <a:xfrm>
+          <a:off x="0" y="0"/>
+          <a:ext cx="0" cy="0"/>
+          <a:chOff x="0" y="0"/>
+          <a:chExt cx="0" cy="0"/>
+        </a:xfrm>
+      </p:grpSpPr>
+      <p:sp>
+        <p:nvSpPr>
+          <p:cNvPr id="2" name="Slide Image Placeholder 1"/>
+          <p:cNvSpPr>
+            <a:spLocks noGrp="1" noRot="1" noChangeAspect="1"/>
+          </p:cNvSpPr>
+          <p:nvPr>
+            <p:ph type="sldImg"/>
+          </p:nvPr>
+        </p:nvSpPr>
+        <p:spPr/>
+      </p:sp>
+      <p:sp>
+        <p:nvSpPr>
+          <p:cNvPr id="3" name="Notes Placeholder 2"/>
+          <p:cNvSpPr>
+            <a:spLocks noGrp="1"/>
+          </p:cNvSpPr>
+          <p:nvPr>
+            <p:ph type="body" idx="1"/>
+          </p:nvPr>
+        </p:nvSpPr>
+        <p:spPr/>
+        <p:txBody>
+          <a:bodyPr/>
+          <a:lstStyle/>
+          <a:p>
+            <a:r>
+              <a:rPr lang="en-GB" dirty="0"/>
+              <a:t>ARC</a:t>
+            </a:r>
+          </a:p>
+          <a:p>
+            <a:r>
+              <a:rPr lang="en-GB" sz="700" dirty="0"/>
+              <a:t>The triangle, which is left of the square, is yellow</a:t>
+            </a:r>
+          </a:p>
+          <a:p>
+            <a:r>
+              <a:rPr lang="en-GB" dirty="0"/>
+              <a:t>F + F</a:t>
+            </a:r>
+          </a:p>
+        </p:txBody>
+      </p:sp>
+      <p:sp>
+        <p:nvSpPr>
+          <p:cNvPr id="4" name="Slide Number Placeholder 3"/>
+          <p:cNvSpPr>
+            <a:spLocks noGrp="1"/>
+          </p:cNvSpPr>
+          <p:nvPr>
+            <p:ph type="sldNum" sz="quarter" idx="5"/>
+          </p:nvPr>
+        </p:nvSpPr>
+        <p:spPr/>
+        <p:txBody>
+          <a:bodyPr/>
+          <a:lstStyle/>
+          <a:p>
+            <a:fld id="{B36E31BD-47D6-AF47-9BDE-D36BBCCAD48A}" type="slidenum">
+              <a:rPr lang="en-GB" smtClean="0"/>
+              <a:t>42</a:t>
+            </a:fld>
+            <a:endParaRPr lang="en-GB"/>
+          </a:p>
+        </p:txBody>
+      </p:sp>
+    </p:spTree>
+    <p:extLst>
+      <p:ext uri="{BB962C8B-B14F-4D97-AF65-F5344CB8AC3E}">
+        <p14:creationId xmlns:p14="http://schemas.microsoft.com/office/powerpoint/2010/main" val="2334456889"/>
       </p:ext>
     </p:extLst>
   </p:cSld>
@@ -3944,6 +4322,15 @@
               <a:t>T + F</a:t>
             </a:r>
           </a:p>
+          <a:p>
+            <a:endParaRPr lang="en-GB" dirty="0"/>
+          </a:p>
+          <a:p>
+            <a:r>
+              <a:rPr lang="en-GB" dirty="0"/>
+              <a:t>Trying a more orange orange on this one!</a:t>
+            </a:r>
+          </a:p>
         </p:txBody>
       </p:sp>
       <p:sp>
@@ -4142,6 +4529,21 @@
               <a:t>F + T</a:t>
             </a:r>
           </a:p>
+          <a:p>
+            <a:endParaRPr lang="en-GB" dirty="0"/>
+          </a:p>
+          <a:p>
+            <a:r>
+              <a:rPr lang="en-GB" dirty="0"/>
+              <a:t>Testing a more orange orange for this one too</a:t>
+            </a:r>
+          </a:p>
+          <a:p>
+            <a:r>
+              <a:rPr lang="en-GB" dirty="0"/>
+              <a:t>Richard says easy to distinguish but not necessarily easy to say what colour they are, which is what we need! Maybe pink instead? That’s what </a:t>
+            </a:r>
+          </a:p>
         </p:txBody>
       </p:sp>
       <p:sp>
@@ -4185,7 +4587,13 @@
   <p:cSld>
     <p:spTree>
       <p:nvGrpSpPr>
-        <p:cNvPr id="1" name=""/>
+        <p:cNvPr id="1" name="">
+          <a:extLst>
+            <a:ext uri="{FF2B5EF4-FFF2-40B4-BE49-F238E27FC236}">
+              <a16:creationId xmlns:a16="http://schemas.microsoft.com/office/drawing/2014/main" id="{6B48F6C3-645D-AD1B-20AA-43BDCADA7ED6}"/>
+            </a:ext>
+          </a:extLst>
+        </p:cNvPr>
         <p:cNvGrpSpPr/>
         <p:nvPr/>
       </p:nvGrpSpPr>
@@ -4199,7 +4607,13 @@
       </p:grpSpPr>
       <p:sp>
         <p:nvSpPr>
-          <p:cNvPr id="2" name="Slide Image Placeholder 1"/>
+          <p:cNvPr id="2" name="Slide Image Placeholder 1">
+            <a:extLst>
+              <a:ext uri="{FF2B5EF4-FFF2-40B4-BE49-F238E27FC236}">
+                <a16:creationId xmlns:a16="http://schemas.microsoft.com/office/drawing/2014/main" id="{A3AA43D2-D051-43B5-479D-77BBDEDA2D54}"/>
+              </a:ext>
+            </a:extLst>
+          </p:cNvPr>
           <p:cNvSpPr>
             <a:spLocks noGrp="1" noRot="1" noChangeAspect="1"/>
           </p:cNvSpPr>
@@ -4211,7 +4625,13 @@
       </p:sp>
       <p:sp>
         <p:nvSpPr>
-          <p:cNvPr id="3" name="Notes Placeholder 2"/>
+          <p:cNvPr id="3" name="Notes Placeholder 2">
+            <a:extLst>
+              <a:ext uri="{FF2B5EF4-FFF2-40B4-BE49-F238E27FC236}">
+                <a16:creationId xmlns:a16="http://schemas.microsoft.com/office/drawing/2014/main" id="{2E682CD0-E3D8-96D2-D160-584CD663C56D}"/>
+              </a:ext>
+            </a:extLst>
+          </p:cNvPr>
           <p:cNvSpPr>
             <a:spLocks noGrp="1"/>
           </p:cNvSpPr>
@@ -4241,11 +4661,32 @@
               <a:t>F + T</a:t>
             </a:r>
           </a:p>
-        </p:txBody>
-      </p:sp>
-      <p:sp>
-        <p:nvSpPr>
-          <p:cNvPr id="4" name="Slide Number Placeholder 3"/>
+          <a:p>
+            <a:endParaRPr lang="en-GB" dirty="0"/>
+          </a:p>
+          <a:p>
+            <a:r>
+              <a:rPr lang="en-GB" dirty="0"/>
+              <a:t>Testing a more orange orange for this one too</a:t>
+            </a:r>
+          </a:p>
+          <a:p>
+            <a:r>
+              <a:rPr lang="en-GB" dirty="0"/>
+              <a:t>Richard says easy to distinguish but not necessarily easy to say what colour they are, which is what we need! Maybe pink instead? That’s what </a:t>
+            </a:r>
+          </a:p>
+        </p:txBody>
+      </p:sp>
+      <p:sp>
+        <p:nvSpPr>
+          <p:cNvPr id="4" name="Slide Number Placeholder 3">
+            <a:extLst>
+              <a:ext uri="{FF2B5EF4-FFF2-40B4-BE49-F238E27FC236}">
+                <a16:creationId xmlns:a16="http://schemas.microsoft.com/office/drawing/2014/main" id="{0654719A-010A-1014-4898-BACBF6A9BF96}"/>
+              </a:ext>
+            </a:extLst>
+          </p:cNvPr>
           <p:cNvSpPr>
             <a:spLocks noGrp="1"/>
           </p:cNvSpPr>
@@ -4269,7 +4710,7 @@
     </p:spTree>
     <p:extLst>
       <p:ext uri="{BB962C8B-B14F-4D97-AF65-F5344CB8AC3E}">
-        <p14:creationId xmlns:p14="http://schemas.microsoft.com/office/powerpoint/2010/main" val="2515573565"/>
+        <p14:creationId xmlns:p14="http://schemas.microsoft.com/office/powerpoint/2010/main" val="2581748311"/>
       </p:ext>
     </p:extLst>
   </p:cSld>
@@ -4410,7 +4851,7 @@
           <a:p>
             <a:fld id="{ED2FA5E0-9DF3-3448-9EC7-9B2886EDE714}" type="datetimeFigureOut">
               <a:rPr lang="en-GB" smtClean="0"/>
-              <a:t>10/07/2024</a:t>
+              <a:t>26/08/2024</a:t>
             </a:fld>
             <a:endParaRPr lang="en-GB"/>
           </a:p>
@@ -4580,7 +5021,7 @@
           <a:p>
             <a:fld id="{ED2FA5E0-9DF3-3448-9EC7-9B2886EDE714}" type="datetimeFigureOut">
               <a:rPr lang="en-GB" smtClean="0"/>
-              <a:t>10/07/2024</a:t>
+              <a:t>26/08/2024</a:t>
             </a:fld>
             <a:endParaRPr lang="en-GB"/>
           </a:p>
@@ -4760,7 +5201,7 @@
           <a:p>
             <a:fld id="{ED2FA5E0-9DF3-3448-9EC7-9B2886EDE714}" type="datetimeFigureOut">
               <a:rPr lang="en-GB" smtClean="0"/>
-              <a:t>10/07/2024</a:t>
+              <a:t>26/08/2024</a:t>
             </a:fld>
             <a:endParaRPr lang="en-GB"/>
           </a:p>
@@ -4930,7 +5371,7 @@
           <a:p>
             <a:fld id="{ED2FA5E0-9DF3-3448-9EC7-9B2886EDE714}" type="datetimeFigureOut">
               <a:rPr lang="en-GB" smtClean="0"/>
-              <a:t>10/07/2024</a:t>
+              <a:t>26/08/2024</a:t>
             </a:fld>
             <a:endParaRPr lang="en-GB"/>
           </a:p>
@@ -5176,7 +5617,7 @@
           <a:p>
             <a:fld id="{ED2FA5E0-9DF3-3448-9EC7-9B2886EDE714}" type="datetimeFigureOut">
               <a:rPr lang="en-GB" smtClean="0"/>
-              <a:t>10/07/2024</a:t>
+              <a:t>26/08/2024</a:t>
             </a:fld>
             <a:endParaRPr lang="en-GB"/>
           </a:p>
@@ -5408,7 +5849,7 @@
           <a:p>
             <a:fld id="{ED2FA5E0-9DF3-3448-9EC7-9B2886EDE714}" type="datetimeFigureOut">
               <a:rPr lang="en-GB" smtClean="0"/>
-              <a:t>10/07/2024</a:t>
+              <a:t>26/08/2024</a:t>
             </a:fld>
             <a:endParaRPr lang="en-GB"/>
           </a:p>
@@ -5775,7 +6216,7 @@
           <a:p>
             <a:fld id="{ED2FA5E0-9DF3-3448-9EC7-9B2886EDE714}" type="datetimeFigureOut">
               <a:rPr lang="en-GB" smtClean="0"/>
-              <a:t>10/07/2024</a:t>
+              <a:t>26/08/2024</a:t>
             </a:fld>
             <a:endParaRPr lang="en-GB"/>
           </a:p>
@@ -5893,7 +6334,7 @@
           <a:p>
             <a:fld id="{ED2FA5E0-9DF3-3448-9EC7-9B2886EDE714}" type="datetimeFigureOut">
               <a:rPr lang="en-GB" smtClean="0"/>
-              <a:t>10/07/2024</a:t>
+              <a:t>26/08/2024</a:t>
             </a:fld>
             <a:endParaRPr lang="en-GB"/>
           </a:p>
@@ -5988,7 +6429,7 @@
           <a:p>
             <a:fld id="{ED2FA5E0-9DF3-3448-9EC7-9B2886EDE714}" type="datetimeFigureOut">
               <a:rPr lang="en-GB" smtClean="0"/>
-              <a:t>10/07/2024</a:t>
+              <a:t>26/08/2024</a:t>
             </a:fld>
             <a:endParaRPr lang="en-GB"/>
           </a:p>
@@ -6265,7 +6706,7 @@
           <a:p>
             <a:fld id="{ED2FA5E0-9DF3-3448-9EC7-9B2886EDE714}" type="datetimeFigureOut">
               <a:rPr lang="en-GB" smtClean="0"/>
-              <a:t>10/07/2024</a:t>
+              <a:t>26/08/2024</a:t>
             </a:fld>
             <a:endParaRPr lang="en-GB"/>
           </a:p>
@@ -6522,7 +6963,7 @@
           <a:p>
             <a:fld id="{ED2FA5E0-9DF3-3448-9EC7-9B2886EDE714}" type="datetimeFigureOut">
               <a:rPr lang="en-GB" smtClean="0"/>
-              <a:t>10/07/2024</a:t>
+              <a:t>26/08/2024</a:t>
             </a:fld>
             <a:endParaRPr lang="en-GB"/>
           </a:p>
@@ -6735,7 +7176,7 @@
           <a:p>
             <a:fld id="{ED2FA5E0-9DF3-3448-9EC7-9B2886EDE714}" type="datetimeFigureOut">
               <a:rPr lang="en-GB" smtClean="0"/>
-              <a:t>10/07/2024</a:t>
+              <a:t>26/08/2024</a:t>
             </a:fld>
             <a:endParaRPr lang="en-GB"/>
           </a:p>
@@ -7211,7 +7652,13 @@
   <p:cSld>
     <p:spTree>
       <p:nvGrpSpPr>
-        <p:cNvPr id="1" name=""/>
+        <p:cNvPr id="1" name="">
+          <a:extLst>
+            <a:ext uri="{FF2B5EF4-FFF2-40B4-BE49-F238E27FC236}">
+              <a16:creationId xmlns:a16="http://schemas.microsoft.com/office/drawing/2014/main" id="{A67CF7D7-8C24-7A9B-55D0-3E615E9C397C}"/>
+            </a:ext>
+          </a:extLst>
+        </p:cNvPr>
         <p:cNvGrpSpPr/>
         <p:nvPr/>
       </p:nvGrpSpPr>
@@ -7228,7 +7675,7 @@
           <p:cNvPr id="4" name="Oval 3">
             <a:extLst>
               <a:ext uri="{FF2B5EF4-FFF2-40B4-BE49-F238E27FC236}">
-                <a16:creationId xmlns:a16="http://schemas.microsoft.com/office/drawing/2014/main" id="{A5D00632-C5F2-B986-62B7-5205D04E5C68}"/>
+                <a16:creationId xmlns:a16="http://schemas.microsoft.com/office/drawing/2014/main" id="{98A214BB-89E3-F5BA-EDFA-3FF73CDD5F3A}"/>
               </a:ext>
             </a:extLst>
           </p:cNvPr>
@@ -7239,14 +7686,14 @@
         </p:nvSpPr>
         <p:spPr>
           <a:xfrm>
-            <a:off x="2004400" y="1846054"/>
+            <a:off x="3754423" y="1846050"/>
             <a:ext cx="1391874" cy="1357365"/>
           </a:xfrm>
           <a:prstGeom prst="ellipse">
             <a:avLst/>
           </a:prstGeom>
           <a:solidFill>
-            <a:srgbClr val="FF9400"/>
+            <a:srgbClr val="F35BB4"/>
           </a:solidFill>
           <a:ln>
             <a:noFill/>
@@ -7282,7 +7729,7 @@
           <p:cNvPr id="5" name="Triangle 4">
             <a:extLst>
               <a:ext uri="{FF2B5EF4-FFF2-40B4-BE49-F238E27FC236}">
-                <a16:creationId xmlns:a16="http://schemas.microsoft.com/office/drawing/2014/main" id="{D8CFA293-B87D-E0E0-0746-085DD53471E8}"/>
+                <a16:creationId xmlns:a16="http://schemas.microsoft.com/office/drawing/2014/main" id="{7E2AF361-DA46-6D12-55A1-5EDAC0A926F7}"/>
               </a:ext>
             </a:extLst>
           </p:cNvPr>
@@ -7293,7 +7740,7 @@
         </p:nvSpPr>
         <p:spPr>
           <a:xfrm>
-            <a:off x="3754424" y="1846054"/>
+            <a:off x="254377" y="1846050"/>
             <a:ext cx="1391874" cy="1357365"/>
           </a:xfrm>
           <a:prstGeom prst="triangle">
@@ -7327,16 +7774,16 @@
           <a:lstStyle/>
           <a:p>
             <a:pPr algn="ctr"/>
-            <a:endParaRPr lang="en-GB"/>
-          </a:p>
-        </p:txBody>
-      </p:sp>
-      <p:sp>
-        <p:nvSpPr>
-          <p:cNvPr id="6" name="Rectangle 5">
+            <a:endParaRPr lang="en-GB" dirty="0"/>
+          </a:p>
+        </p:txBody>
+      </p:sp>
+      <p:sp>
+        <p:nvSpPr>
+          <p:cNvPr id="2" name="Oval 1">
             <a:extLst>
               <a:ext uri="{FF2B5EF4-FFF2-40B4-BE49-F238E27FC236}">
-                <a16:creationId xmlns:a16="http://schemas.microsoft.com/office/drawing/2014/main" id="{77DC5F38-6BDB-1600-9AB3-2A45AEAB8EAB}"/>
+                <a16:creationId xmlns:a16="http://schemas.microsoft.com/office/drawing/2014/main" id="{8BA125B3-D3CF-E596-9099-1E92CCF95313}"/>
               </a:ext>
             </a:extLst>
           </p:cNvPr>
@@ -7347,10 +7794,100 @@
         </p:nvSpPr>
         <p:spPr>
           <a:xfrm>
-            <a:off x="254376" y="1846053"/>
+            <a:off x="2004400" y="1846051"/>
             <a:ext cx="1391874" cy="1357365"/>
           </a:xfrm>
-          <a:prstGeom prst="rect">
+          <a:prstGeom prst="ellipse">
+            <a:avLst/>
+          </a:prstGeom>
+          <a:solidFill>
+            <a:srgbClr val="F35BB4"/>
+          </a:solidFill>
+          <a:ln>
+            <a:noFill/>
+          </a:ln>
+        </p:spPr>
+        <p:style>
+          <a:lnRef idx="2">
+            <a:schemeClr val="accent1">
+              <a:shade val="15000"/>
+            </a:schemeClr>
+          </a:lnRef>
+          <a:fillRef idx="1">
+            <a:schemeClr val="accent1"/>
+          </a:fillRef>
+          <a:effectRef idx="0">
+            <a:schemeClr val="accent1"/>
+          </a:effectRef>
+          <a:fontRef idx="minor">
+            <a:schemeClr val="lt1"/>
+          </a:fontRef>
+        </p:style>
+        <p:txBody>
+          <a:bodyPr rtlCol="0" anchor="ctr"/>
+          <a:lstStyle/>
+          <a:p>
+            <a:pPr algn="ctr"/>
+            <a:endParaRPr lang="en-GB"/>
+          </a:p>
+        </p:txBody>
+      </p:sp>
+    </p:spTree>
+    <p:extLst>
+      <p:ext uri="{BB962C8B-B14F-4D97-AF65-F5344CB8AC3E}">
+        <p14:creationId xmlns:p14="http://schemas.microsoft.com/office/powerpoint/2010/main" val="2693200670"/>
+      </p:ext>
+    </p:extLst>
+  </p:cSld>
+  <p:clrMapOvr>
+    <a:masterClrMapping/>
+  </p:clrMapOvr>
+</p:sld>
+</file>
+
+<file path=ppt/slides/slide11.xml><?xml version="1.0" encoding="utf-8"?>
+<p:sld xmlns:a="http://schemas.openxmlformats.org/drawingml/2006/main" xmlns:r="http://schemas.openxmlformats.org/officeDocument/2006/relationships" xmlns:p="http://schemas.openxmlformats.org/presentationml/2006/main">
+  <p:cSld>
+    <p:spTree>
+      <p:nvGrpSpPr>
+        <p:cNvPr id="1" name="">
+          <a:extLst>
+            <a:ext uri="{FF2B5EF4-FFF2-40B4-BE49-F238E27FC236}">
+              <a16:creationId xmlns:a16="http://schemas.microsoft.com/office/drawing/2014/main" id="{A518E921-6668-E249-7780-F0E67F97D8D3}"/>
+            </a:ext>
+          </a:extLst>
+        </p:cNvPr>
+        <p:cNvGrpSpPr/>
+        <p:nvPr/>
+      </p:nvGrpSpPr>
+      <p:grpSpPr>
+        <a:xfrm>
+          <a:off x="0" y="0"/>
+          <a:ext cx="0" cy="0"/>
+          <a:chOff x="0" y="0"/>
+          <a:chExt cx="0" cy="0"/>
+        </a:xfrm>
+      </p:grpSpPr>
+      <p:sp>
+        <p:nvSpPr>
+          <p:cNvPr id="4" name="Oval 3">
+            <a:extLst>
+              <a:ext uri="{FF2B5EF4-FFF2-40B4-BE49-F238E27FC236}">
+                <a16:creationId xmlns:a16="http://schemas.microsoft.com/office/drawing/2014/main" id="{AB68C585-7BCD-D01B-680E-7832D64D09F6}"/>
+              </a:ext>
+            </a:extLst>
+          </p:cNvPr>
+          <p:cNvSpPr>
+            <a:spLocks noChangeAspect="1"/>
+          </p:cNvSpPr>
+          <p:nvPr/>
+        </p:nvSpPr>
+        <p:spPr>
+          <a:xfrm>
+            <a:off x="254377" y="1846050"/>
+            <a:ext cx="1391874" cy="1357365"/>
+          </a:xfrm>
+          <a:prstGeom prst="ellipse">
             <a:avLst/>
           </a:prstGeom>
           <a:solidFill>
@@ -7385,42 +7922,12 @@
           </a:p>
         </p:txBody>
       </p:sp>
-    </p:spTree>
-    <p:extLst>
-      <p:ext uri="{BB962C8B-B14F-4D97-AF65-F5344CB8AC3E}">
-        <p14:creationId xmlns:p14="http://schemas.microsoft.com/office/powerpoint/2010/main" val="264842622"/>
-      </p:ext>
-    </p:extLst>
-  </p:cSld>
-  <p:clrMapOvr>
-    <a:masterClrMapping/>
-  </p:clrMapOvr>
-</p:sld>
-</file>
-
-<file path=ppt/slides/slide11.xml><?xml version="1.0" encoding="utf-8"?>
-<p:sld xmlns:a="http://schemas.openxmlformats.org/drawingml/2006/main" xmlns:r="http://schemas.openxmlformats.org/officeDocument/2006/relationships" xmlns:p="http://schemas.openxmlformats.org/presentationml/2006/main">
-  <p:cSld>
-    <p:spTree>
-      <p:nvGrpSpPr>
-        <p:cNvPr id="1" name=""/>
-        <p:cNvGrpSpPr/>
-        <p:nvPr/>
-      </p:nvGrpSpPr>
-      <p:grpSpPr>
-        <a:xfrm>
-          <a:off x="0" y="0"/>
-          <a:ext cx="0" cy="0"/>
-          <a:chOff x="0" y="0"/>
-          <a:chExt cx="0" cy="0"/>
-        </a:xfrm>
-      </p:grpSpPr>
-      <p:sp>
-        <p:nvSpPr>
-          <p:cNvPr id="6" name="Rectangle 5">
+      <p:sp>
+        <p:nvSpPr>
+          <p:cNvPr id="5" name="Triangle 4">
             <a:extLst>
               <a:ext uri="{FF2B5EF4-FFF2-40B4-BE49-F238E27FC236}">
-                <a16:creationId xmlns:a16="http://schemas.microsoft.com/office/drawing/2014/main" id="{77DC5F38-6BDB-1600-9AB3-2A45AEAB8EAB}"/>
+                <a16:creationId xmlns:a16="http://schemas.microsoft.com/office/drawing/2014/main" id="{95BA82F4-4359-4C0F-A549-E7E0428A0DC2}"/>
               </a:ext>
             </a:extLst>
           </p:cNvPr>
@@ -7431,14 +7938,14 @@
         </p:nvSpPr>
         <p:spPr>
           <a:xfrm>
-            <a:off x="3754425" y="1844285"/>
+            <a:off x="3754424" y="1846049"/>
             <a:ext cx="1391874" cy="1357365"/>
           </a:xfrm>
-          <a:prstGeom prst="rect">
+          <a:prstGeom prst="triangle">
             <a:avLst/>
           </a:prstGeom>
           <a:solidFill>
-            <a:srgbClr val="FF9400"/>
+            <a:srgbClr val="F35BB4"/>
           </a:solidFill>
           <a:ln>
             <a:noFill/>
@@ -7465,16 +7972,16 @@
           <a:lstStyle/>
           <a:p>
             <a:pPr algn="ctr"/>
-            <a:endParaRPr lang="en-GB"/>
-          </a:p>
-        </p:txBody>
-      </p:sp>
-      <p:sp>
-        <p:nvSpPr>
-          <p:cNvPr id="4" name="Oval 3">
+            <a:endParaRPr lang="en-GB" dirty="0"/>
+          </a:p>
+        </p:txBody>
+      </p:sp>
+      <p:sp>
+        <p:nvSpPr>
+          <p:cNvPr id="2" name="Oval 1">
             <a:extLst>
               <a:ext uri="{FF2B5EF4-FFF2-40B4-BE49-F238E27FC236}">
-                <a16:creationId xmlns:a16="http://schemas.microsoft.com/office/drawing/2014/main" id="{A5D00632-C5F2-B986-62B7-5205D04E5C68}"/>
+                <a16:creationId xmlns:a16="http://schemas.microsoft.com/office/drawing/2014/main" id="{E5D44976-C6C3-9FD2-377C-6701C1BD7BCF}"/>
               </a:ext>
             </a:extLst>
           </p:cNvPr>
@@ -7485,14 +7992,14 @@
         </p:nvSpPr>
         <p:spPr>
           <a:xfrm>
-            <a:off x="254376" y="1844286"/>
+            <a:off x="2004400" y="1846051"/>
             <a:ext cx="1391874" cy="1357365"/>
           </a:xfrm>
           <a:prstGeom prst="ellipse">
             <a:avLst/>
           </a:prstGeom>
           <a:solidFill>
-            <a:srgbClr val="FF9400"/>
+            <a:srgbClr val="F35BB4"/>
           </a:solidFill>
           <a:ln>
             <a:noFill/>
@@ -7523,64 +8030,10 @@
           </a:p>
         </p:txBody>
       </p:sp>
-      <p:sp>
-        <p:nvSpPr>
-          <p:cNvPr id="5" name="Triangle 4">
-            <a:extLst>
-              <a:ext uri="{FF2B5EF4-FFF2-40B4-BE49-F238E27FC236}">
-                <a16:creationId xmlns:a16="http://schemas.microsoft.com/office/drawing/2014/main" id="{D8CFA293-B87D-E0E0-0746-085DD53471E8}"/>
-              </a:ext>
-            </a:extLst>
-          </p:cNvPr>
-          <p:cNvSpPr>
-            <a:spLocks noChangeAspect="1"/>
-          </p:cNvSpPr>
-          <p:nvPr/>
-        </p:nvSpPr>
-        <p:spPr>
-          <a:xfrm>
-            <a:off x="2004400" y="1844285"/>
-            <a:ext cx="1391874" cy="1357365"/>
-          </a:xfrm>
-          <a:prstGeom prst="triangle">
-            <a:avLst/>
-          </a:prstGeom>
-          <a:solidFill>
-            <a:srgbClr val="0C6B2E"/>
-          </a:solidFill>
-          <a:ln>
-            <a:noFill/>
-          </a:ln>
-        </p:spPr>
-        <p:style>
-          <a:lnRef idx="2">
-            <a:schemeClr val="accent1">
-              <a:shade val="15000"/>
-            </a:schemeClr>
-          </a:lnRef>
-          <a:fillRef idx="1">
-            <a:schemeClr val="accent1"/>
-          </a:fillRef>
-          <a:effectRef idx="0">
-            <a:schemeClr val="accent1"/>
-          </a:effectRef>
-          <a:fontRef idx="minor">
-            <a:schemeClr val="lt1"/>
-          </a:fontRef>
-        </p:style>
-        <p:txBody>
-          <a:bodyPr rtlCol="0" anchor="ctr"/>
-          <a:lstStyle/>
-          <a:p>
-            <a:pPr algn="ctr"/>
-            <a:endParaRPr lang="en-GB" dirty="0"/>
-          </a:p>
-        </p:txBody>
-      </p:sp>
     </p:spTree>
     <p:extLst>
       <p:ext uri="{BB962C8B-B14F-4D97-AF65-F5344CB8AC3E}">
-        <p14:creationId xmlns:p14="http://schemas.microsoft.com/office/powerpoint/2010/main" val="319730910"/>
+        <p14:creationId xmlns:p14="http://schemas.microsoft.com/office/powerpoint/2010/main" val="1098833295"/>
       </p:ext>
     </p:extLst>
   </p:cSld>
@@ -7623,14 +8076,14 @@
         </p:nvSpPr>
         <p:spPr>
           <a:xfrm>
-            <a:off x="254376" y="1846054"/>
+            <a:off x="2004400" y="1840239"/>
             <a:ext cx="1391874" cy="1357365"/>
           </a:xfrm>
           <a:prstGeom prst="ellipse">
             <a:avLst/>
           </a:prstGeom>
           <a:solidFill>
-            <a:srgbClr val="DC257F"/>
+            <a:srgbClr val="F35BB4"/>
           </a:solidFill>
           <a:ln>
             <a:noFill/>
@@ -7677,14 +8130,14 @@
         </p:nvSpPr>
         <p:spPr>
           <a:xfrm>
-            <a:off x="3754425" y="1846053"/>
+            <a:off x="3754424" y="1846053"/>
             <a:ext cx="1391874" cy="1357365"/>
           </a:xfrm>
           <a:prstGeom prst="triangle">
             <a:avLst/>
           </a:prstGeom>
           <a:solidFill>
-            <a:srgbClr val="F9AD00"/>
+            <a:srgbClr val="F35BB4"/>
           </a:solidFill>
           <a:ln>
             <a:noFill/>
@@ -7731,14 +8184,14 @@
         </p:nvSpPr>
         <p:spPr>
           <a:xfrm>
-            <a:off x="2004400" y="1846053"/>
+            <a:off x="254376" y="1840238"/>
             <a:ext cx="1391874" cy="1357365"/>
           </a:xfrm>
           <a:prstGeom prst="rect">
             <a:avLst/>
           </a:prstGeom>
           <a:solidFill>
-            <a:srgbClr val="FF6100"/>
+            <a:srgbClr val="0C6B2E"/>
           </a:solidFill>
           <a:ln>
             <a:noFill/>
@@ -7772,7 +8225,7 @@
     </p:spTree>
     <p:extLst>
       <p:ext uri="{BB962C8B-B14F-4D97-AF65-F5344CB8AC3E}">
-        <p14:creationId xmlns:p14="http://schemas.microsoft.com/office/powerpoint/2010/main" val="3393569402"/>
+        <p14:creationId xmlns:p14="http://schemas.microsoft.com/office/powerpoint/2010/main" val="9109051"/>
       </p:ext>
     </p:extLst>
   </p:cSld>
@@ -7815,14 +8268,14 @@
         </p:nvSpPr>
         <p:spPr>
           <a:xfrm>
-            <a:off x="2004400" y="1844287"/>
+            <a:off x="2004400" y="1846054"/>
             <a:ext cx="1391874" cy="1357365"/>
           </a:xfrm>
           <a:prstGeom prst="ellipse">
             <a:avLst/>
           </a:prstGeom>
           <a:solidFill>
-            <a:srgbClr val="DC257F"/>
+            <a:srgbClr val="0C6B2E"/>
           </a:solidFill>
           <a:ln>
             <a:noFill/>
@@ -7869,14 +8322,14 @@
         </p:nvSpPr>
         <p:spPr>
           <a:xfrm>
-            <a:off x="3754425" y="1846053"/>
+            <a:off x="3754424" y="1846054"/>
             <a:ext cx="1391874" cy="1357365"/>
           </a:xfrm>
           <a:prstGeom prst="triangle">
             <a:avLst/>
           </a:prstGeom>
           <a:solidFill>
-            <a:srgbClr val="F9AD00"/>
+            <a:srgbClr val="F35BB4"/>
           </a:solidFill>
           <a:ln>
             <a:noFill/>
@@ -7923,14 +8376,14 @@
         </p:nvSpPr>
         <p:spPr>
           <a:xfrm>
-            <a:off x="254376" y="1844286"/>
+            <a:off x="254376" y="1846053"/>
             <a:ext cx="1391874" cy="1357365"/>
           </a:xfrm>
           <a:prstGeom prst="rect">
             <a:avLst/>
           </a:prstGeom>
           <a:solidFill>
-            <a:srgbClr val="FF6100"/>
+            <a:srgbClr val="648FFF"/>
           </a:solidFill>
           <a:ln>
             <a:noFill/>
@@ -7964,7 +8417,7 @@
     </p:spTree>
     <p:extLst>
       <p:ext uri="{BB962C8B-B14F-4D97-AF65-F5344CB8AC3E}">
-        <p14:creationId xmlns:p14="http://schemas.microsoft.com/office/powerpoint/2010/main" val="742965905"/>
+        <p14:creationId xmlns:p14="http://schemas.microsoft.com/office/powerpoint/2010/main" val="264842622"/>
       </p:ext>
     </p:extLst>
   </p:cSld>
@@ -7993,61 +8446,170 @@
       </p:grpSpPr>
       <p:sp>
         <p:nvSpPr>
-          <p:cNvPr id="2" name="Title 1">
+          <p:cNvPr id="6" name="Rectangle 5">
             <a:extLst>
               <a:ext uri="{FF2B5EF4-FFF2-40B4-BE49-F238E27FC236}">
-                <a16:creationId xmlns:a16="http://schemas.microsoft.com/office/drawing/2014/main" id="{DC159B37-C523-05DE-B193-27386EC01047}"/>
+                <a16:creationId xmlns:a16="http://schemas.microsoft.com/office/drawing/2014/main" id="{77DC5F38-6BDB-1600-9AB3-2A45AEAB8EAB}"/>
               </a:ext>
             </a:extLst>
           </p:cNvPr>
           <p:cNvSpPr>
-            <a:spLocks noGrp="1"/>
-          </p:cNvSpPr>
-          <p:nvPr>
-            <p:ph type="title"/>
-          </p:nvPr>
+            <a:spLocks noChangeAspect="1"/>
+          </p:cNvSpPr>
+          <p:nvPr/>
         </p:nvSpPr>
         <p:spPr>
           <a:xfrm>
-            <a:off x="267128" y="1924775"/>
-            <a:ext cx="4762250" cy="1551123"/>
+            <a:off x="3754425" y="1844285"/>
+            <a:ext cx="1391874" cy="1357365"/>
           </a:xfrm>
+          <a:prstGeom prst="rect">
+            <a:avLst/>
+          </a:prstGeom>
+          <a:solidFill>
+            <a:srgbClr val="F35BB4"/>
+          </a:solidFill>
+          <a:ln>
+            <a:noFill/>
+          </a:ln>
         </p:spPr>
-        <p:txBody>
-          <a:bodyPr>
-            <a:normAutofit/>
-          </a:bodyPr>
+        <p:style>
+          <a:lnRef idx="2">
+            <a:schemeClr val="accent1">
+              <a:shade val="15000"/>
+            </a:schemeClr>
+          </a:lnRef>
+          <a:fillRef idx="1">
+            <a:schemeClr val="accent1"/>
+          </a:fillRef>
+          <a:effectRef idx="0">
+            <a:schemeClr val="accent1"/>
+          </a:effectRef>
+          <a:fontRef idx="minor">
+            <a:schemeClr val="lt1"/>
+          </a:fontRef>
+        </p:style>
+        <p:txBody>
+          <a:bodyPr rtlCol="0" anchor="ctr"/>
           <a:lstStyle/>
           <a:p>
             <a:pPr algn="ctr"/>
-            <a:r>
-              <a:rPr lang="en-GB" sz="1800" dirty="0"/>
-              <a:t>The square, which is orange, is left of the circle</a:t>
-            </a:r>
-            <a:br>
-              <a:rPr lang="en-GB" sz="1800" dirty="0"/>
-            </a:br>
-            <a:br>
-              <a:rPr lang="en-GB" sz="1800" dirty="0"/>
-            </a:br>
-            <a:r>
-              <a:rPr lang="en-GB" sz="1800" dirty="0"/>
-              <a:t>Primary: square left of triangle</a:t>
-            </a:r>
-            <a:br>
-              <a:rPr lang="en-GB" sz="1800" dirty="0"/>
-            </a:br>
-            <a:r>
-              <a:rPr lang="en-GB" sz="1800" dirty="0"/>
-              <a:t>Secondary: square is orange</a:t>
-            </a:r>
+            <a:endParaRPr lang="en-GB"/>
+          </a:p>
+        </p:txBody>
+      </p:sp>
+      <p:sp>
+        <p:nvSpPr>
+          <p:cNvPr id="4" name="Oval 3">
+            <a:extLst>
+              <a:ext uri="{FF2B5EF4-FFF2-40B4-BE49-F238E27FC236}">
+                <a16:creationId xmlns:a16="http://schemas.microsoft.com/office/drawing/2014/main" id="{A5D00632-C5F2-B986-62B7-5205D04E5C68}"/>
+              </a:ext>
+            </a:extLst>
+          </p:cNvPr>
+          <p:cNvSpPr>
+            <a:spLocks noChangeAspect="1"/>
+          </p:cNvSpPr>
+          <p:nvPr/>
+        </p:nvSpPr>
+        <p:spPr>
+          <a:xfrm>
+            <a:off x="254376" y="1844286"/>
+            <a:ext cx="1391874" cy="1357365"/>
+          </a:xfrm>
+          <a:prstGeom prst="ellipse">
+            <a:avLst/>
+          </a:prstGeom>
+          <a:solidFill>
+            <a:srgbClr val="F35BB4"/>
+          </a:solidFill>
+          <a:ln>
+            <a:noFill/>
+          </a:ln>
+        </p:spPr>
+        <p:style>
+          <a:lnRef idx="2">
+            <a:schemeClr val="accent1">
+              <a:shade val="15000"/>
+            </a:schemeClr>
+          </a:lnRef>
+          <a:fillRef idx="1">
+            <a:schemeClr val="accent1"/>
+          </a:fillRef>
+          <a:effectRef idx="0">
+            <a:schemeClr val="accent1"/>
+          </a:effectRef>
+          <a:fontRef idx="minor">
+            <a:schemeClr val="lt1"/>
+          </a:fontRef>
+        </p:style>
+        <p:txBody>
+          <a:bodyPr rtlCol="0" anchor="ctr"/>
+          <a:lstStyle/>
+          <a:p>
+            <a:pPr algn="ctr"/>
+            <a:endParaRPr lang="en-GB"/>
+          </a:p>
+        </p:txBody>
+      </p:sp>
+      <p:sp>
+        <p:nvSpPr>
+          <p:cNvPr id="5" name="Triangle 4">
+            <a:extLst>
+              <a:ext uri="{FF2B5EF4-FFF2-40B4-BE49-F238E27FC236}">
+                <a16:creationId xmlns:a16="http://schemas.microsoft.com/office/drawing/2014/main" id="{D8CFA293-B87D-E0E0-0746-085DD53471E8}"/>
+              </a:ext>
+            </a:extLst>
+          </p:cNvPr>
+          <p:cNvSpPr>
+            <a:spLocks noChangeAspect="1"/>
+          </p:cNvSpPr>
+          <p:nvPr/>
+        </p:nvSpPr>
+        <p:spPr>
+          <a:xfrm>
+            <a:off x="2004400" y="1844285"/>
+            <a:ext cx="1391874" cy="1357365"/>
+          </a:xfrm>
+          <a:prstGeom prst="triangle">
+            <a:avLst/>
+          </a:prstGeom>
+          <a:solidFill>
+            <a:srgbClr val="0C6B2E"/>
+          </a:solidFill>
+          <a:ln>
+            <a:noFill/>
+          </a:ln>
+        </p:spPr>
+        <p:style>
+          <a:lnRef idx="2">
+            <a:schemeClr val="accent1">
+              <a:shade val="15000"/>
+            </a:schemeClr>
+          </a:lnRef>
+          <a:fillRef idx="1">
+            <a:schemeClr val="accent1"/>
+          </a:fillRef>
+          <a:effectRef idx="0">
+            <a:schemeClr val="accent1"/>
+          </a:effectRef>
+          <a:fontRef idx="minor">
+            <a:schemeClr val="lt1"/>
+          </a:fontRef>
+        </p:style>
+        <p:txBody>
+          <a:bodyPr rtlCol="0" anchor="ctr"/>
+          <a:lstStyle/>
+          <a:p>
+            <a:pPr algn="ctr"/>
+            <a:endParaRPr lang="en-GB" dirty="0"/>
           </a:p>
         </p:txBody>
       </p:sp>
     </p:spTree>
     <p:extLst>
       <p:ext uri="{BB962C8B-B14F-4D97-AF65-F5344CB8AC3E}">
-        <p14:creationId xmlns:p14="http://schemas.microsoft.com/office/powerpoint/2010/main" val="592547744"/>
+        <p14:creationId xmlns:p14="http://schemas.microsoft.com/office/powerpoint/2010/main" val="319730910"/>
       </p:ext>
     </p:extLst>
   </p:cSld>
@@ -8076,10 +8638,10 @@
       </p:grpSpPr>
       <p:sp>
         <p:nvSpPr>
-          <p:cNvPr id="6" name="Rectangle 5">
+          <p:cNvPr id="4" name="Oval 3">
             <a:extLst>
               <a:ext uri="{FF2B5EF4-FFF2-40B4-BE49-F238E27FC236}">
-                <a16:creationId xmlns:a16="http://schemas.microsoft.com/office/drawing/2014/main" id="{77DC5F38-6BDB-1600-9AB3-2A45AEAB8EAB}"/>
+                <a16:creationId xmlns:a16="http://schemas.microsoft.com/office/drawing/2014/main" id="{A5D00632-C5F2-B986-62B7-5205D04E5C68}"/>
               </a:ext>
             </a:extLst>
           </p:cNvPr>
@@ -8093,11 +8655,11 @@
             <a:off x="254376" y="1846054"/>
             <a:ext cx="1391874" cy="1357365"/>
           </a:xfrm>
-          <a:prstGeom prst="rect">
+          <a:prstGeom prst="ellipse">
             <a:avLst/>
           </a:prstGeom>
           <a:solidFill>
-            <a:srgbClr val="648FFF"/>
+            <a:srgbClr val="DC257F"/>
           </a:solidFill>
           <a:ln>
             <a:noFill/>
@@ -8130,10 +8692,10 @@
       </p:sp>
       <p:sp>
         <p:nvSpPr>
-          <p:cNvPr id="4" name="Oval 3">
+          <p:cNvPr id="5" name="Triangle 4">
             <a:extLst>
               <a:ext uri="{FF2B5EF4-FFF2-40B4-BE49-F238E27FC236}">
-                <a16:creationId xmlns:a16="http://schemas.microsoft.com/office/drawing/2014/main" id="{A5D00632-C5F2-B986-62B7-5205D04E5C68}"/>
+                <a16:creationId xmlns:a16="http://schemas.microsoft.com/office/drawing/2014/main" id="{D8CFA293-B87D-E0E0-0746-085DD53471E8}"/>
               </a:ext>
             </a:extLst>
           </p:cNvPr>
@@ -8144,14 +8706,14 @@
         </p:nvSpPr>
         <p:spPr>
           <a:xfrm>
-            <a:off x="3754424" y="1846053"/>
+            <a:off x="3754425" y="1846053"/>
             <a:ext cx="1391874" cy="1357365"/>
           </a:xfrm>
-          <a:prstGeom prst="ellipse">
+          <a:prstGeom prst="triangle">
             <a:avLst/>
           </a:prstGeom>
           <a:solidFill>
-            <a:srgbClr val="FF9400"/>
+            <a:srgbClr val="F9AD00"/>
           </a:solidFill>
           <a:ln>
             <a:noFill/>
@@ -8184,10 +8746,10 @@
       </p:sp>
       <p:sp>
         <p:nvSpPr>
-          <p:cNvPr id="5" name="Triangle 4">
+          <p:cNvPr id="6" name="Rectangle 5">
             <a:extLst>
               <a:ext uri="{FF2B5EF4-FFF2-40B4-BE49-F238E27FC236}">
-                <a16:creationId xmlns:a16="http://schemas.microsoft.com/office/drawing/2014/main" id="{D8CFA293-B87D-E0E0-0746-085DD53471E8}"/>
+                <a16:creationId xmlns:a16="http://schemas.microsoft.com/office/drawing/2014/main" id="{77DC5F38-6BDB-1600-9AB3-2A45AEAB8EAB}"/>
               </a:ext>
             </a:extLst>
           </p:cNvPr>
@@ -8198,14 +8760,14 @@
         </p:nvSpPr>
         <p:spPr>
           <a:xfrm>
-            <a:off x="2004400" y="1846054"/>
+            <a:off x="2004400" y="1846053"/>
             <a:ext cx="1391874" cy="1357365"/>
           </a:xfrm>
-          <a:prstGeom prst="triangle">
+          <a:prstGeom prst="rect">
             <a:avLst/>
           </a:prstGeom>
           <a:solidFill>
-            <a:srgbClr val="0C6B2E"/>
+            <a:srgbClr val="FF6100"/>
           </a:solidFill>
           <a:ln>
             <a:noFill/>
@@ -8239,7 +8801,7 @@
     </p:spTree>
     <p:extLst>
       <p:ext uri="{BB962C8B-B14F-4D97-AF65-F5344CB8AC3E}">
-        <p14:creationId xmlns:p14="http://schemas.microsoft.com/office/powerpoint/2010/main" val="131373489"/>
+        <p14:creationId xmlns:p14="http://schemas.microsoft.com/office/powerpoint/2010/main" val="3393569402"/>
       </p:ext>
     </p:extLst>
   </p:cSld>
@@ -8268,10 +8830,10 @@
       </p:grpSpPr>
       <p:sp>
         <p:nvSpPr>
-          <p:cNvPr id="6" name="Rectangle 5">
+          <p:cNvPr id="4" name="Oval 3">
             <a:extLst>
               <a:ext uri="{FF2B5EF4-FFF2-40B4-BE49-F238E27FC236}">
-                <a16:creationId xmlns:a16="http://schemas.microsoft.com/office/drawing/2014/main" id="{77DC5F38-6BDB-1600-9AB3-2A45AEAB8EAB}"/>
+                <a16:creationId xmlns:a16="http://schemas.microsoft.com/office/drawing/2014/main" id="{A5D00632-C5F2-B986-62B7-5205D04E5C68}"/>
               </a:ext>
             </a:extLst>
           </p:cNvPr>
@@ -8282,14 +8844,14 @@
         </p:nvSpPr>
         <p:spPr>
           <a:xfrm>
-            <a:off x="2004400" y="1846052"/>
+            <a:off x="2004400" y="1844287"/>
             <a:ext cx="1391874" cy="1357365"/>
           </a:xfrm>
-          <a:prstGeom prst="rect">
+          <a:prstGeom prst="ellipse">
             <a:avLst/>
           </a:prstGeom>
           <a:solidFill>
-            <a:srgbClr val="FF9400"/>
+            <a:srgbClr val="DC257F"/>
           </a:solidFill>
           <a:ln>
             <a:noFill/>
@@ -8322,10 +8884,10 @@
       </p:sp>
       <p:sp>
         <p:nvSpPr>
-          <p:cNvPr id="4" name="Oval 3">
+          <p:cNvPr id="5" name="Triangle 4">
             <a:extLst>
               <a:ext uri="{FF2B5EF4-FFF2-40B4-BE49-F238E27FC236}">
-                <a16:creationId xmlns:a16="http://schemas.microsoft.com/office/drawing/2014/main" id="{A5D00632-C5F2-B986-62B7-5205D04E5C68}"/>
+                <a16:creationId xmlns:a16="http://schemas.microsoft.com/office/drawing/2014/main" id="{D8CFA293-B87D-E0E0-0746-085DD53471E8}"/>
               </a:ext>
             </a:extLst>
           </p:cNvPr>
@@ -8336,14 +8898,14 @@
         </p:nvSpPr>
         <p:spPr>
           <a:xfrm>
-            <a:off x="3754424" y="1846053"/>
+            <a:off x="3754425" y="1846053"/>
             <a:ext cx="1391874" cy="1357365"/>
           </a:xfrm>
-          <a:prstGeom prst="ellipse">
+          <a:prstGeom prst="triangle">
             <a:avLst/>
           </a:prstGeom>
           <a:solidFill>
-            <a:srgbClr val="FF9400"/>
+            <a:srgbClr val="F9AD00"/>
           </a:solidFill>
           <a:ln>
             <a:noFill/>
@@ -8376,10 +8938,10 @@
       </p:sp>
       <p:sp>
         <p:nvSpPr>
-          <p:cNvPr id="5" name="Triangle 4">
+          <p:cNvPr id="6" name="Rectangle 5">
             <a:extLst>
               <a:ext uri="{FF2B5EF4-FFF2-40B4-BE49-F238E27FC236}">
-                <a16:creationId xmlns:a16="http://schemas.microsoft.com/office/drawing/2014/main" id="{D8CFA293-B87D-E0E0-0746-085DD53471E8}"/>
+                <a16:creationId xmlns:a16="http://schemas.microsoft.com/office/drawing/2014/main" id="{77DC5F38-6BDB-1600-9AB3-2A45AEAB8EAB}"/>
               </a:ext>
             </a:extLst>
           </p:cNvPr>
@@ -8390,14 +8952,14 @@
         </p:nvSpPr>
         <p:spPr>
           <a:xfrm>
-            <a:off x="254377" y="1846052"/>
+            <a:off x="254376" y="1844286"/>
             <a:ext cx="1391874" cy="1357365"/>
           </a:xfrm>
-          <a:prstGeom prst="triangle">
+          <a:prstGeom prst="rect">
             <a:avLst/>
           </a:prstGeom>
           <a:solidFill>
-            <a:srgbClr val="0E6E2F"/>
+            <a:srgbClr val="FF6100"/>
           </a:solidFill>
           <a:ln>
             <a:noFill/>
@@ -8431,7 +8993,7 @@
     </p:spTree>
     <p:extLst>
       <p:ext uri="{BB962C8B-B14F-4D97-AF65-F5344CB8AC3E}">
-        <p14:creationId xmlns:p14="http://schemas.microsoft.com/office/powerpoint/2010/main" val="278802086"/>
+        <p14:creationId xmlns:p14="http://schemas.microsoft.com/office/powerpoint/2010/main" val="742965905"/>
       </p:ext>
     </p:extLst>
   </p:cSld>
@@ -8460,170 +9022,61 @@
       </p:grpSpPr>
       <p:sp>
         <p:nvSpPr>
-          <p:cNvPr id="6" name="Rectangle 5">
+          <p:cNvPr id="2" name="Title 1">
             <a:extLst>
               <a:ext uri="{FF2B5EF4-FFF2-40B4-BE49-F238E27FC236}">
-                <a16:creationId xmlns:a16="http://schemas.microsoft.com/office/drawing/2014/main" id="{77DC5F38-6BDB-1600-9AB3-2A45AEAB8EAB}"/>
+                <a16:creationId xmlns:a16="http://schemas.microsoft.com/office/drawing/2014/main" id="{DC159B37-C523-05DE-B193-27386EC01047}"/>
               </a:ext>
             </a:extLst>
           </p:cNvPr>
           <p:cNvSpPr>
-            <a:spLocks noChangeAspect="1"/>
-          </p:cNvSpPr>
-          <p:nvPr/>
+            <a:spLocks noGrp="1"/>
+          </p:cNvSpPr>
+          <p:nvPr>
+            <p:ph type="title"/>
+          </p:nvPr>
         </p:nvSpPr>
         <p:spPr>
           <a:xfrm>
-            <a:off x="3754424" y="1846051"/>
-            <a:ext cx="1391874" cy="1357365"/>
+            <a:off x="267128" y="1924775"/>
+            <a:ext cx="4762250" cy="1551123"/>
           </a:xfrm>
-          <a:prstGeom prst="rect">
-            <a:avLst/>
-          </a:prstGeom>
-          <a:solidFill>
-            <a:srgbClr val="0E6E2F"/>
-          </a:solidFill>
-          <a:ln>
-            <a:noFill/>
-          </a:ln>
         </p:spPr>
-        <p:style>
-          <a:lnRef idx="2">
-            <a:schemeClr val="accent1">
-              <a:shade val="15000"/>
-            </a:schemeClr>
-          </a:lnRef>
-          <a:fillRef idx="1">
-            <a:schemeClr val="accent1"/>
-          </a:fillRef>
-          <a:effectRef idx="0">
-            <a:schemeClr val="accent1"/>
-          </a:effectRef>
-          <a:fontRef idx="minor">
-            <a:schemeClr val="lt1"/>
-          </a:fontRef>
-        </p:style>
-        <p:txBody>
-          <a:bodyPr rtlCol="0" anchor="ctr"/>
+        <p:txBody>
+          <a:bodyPr>
+            <a:normAutofit/>
+          </a:bodyPr>
           <a:lstStyle/>
           <a:p>
             <a:pPr algn="ctr"/>
-            <a:endParaRPr lang="en-GB" dirty="0"/>
-          </a:p>
-        </p:txBody>
-      </p:sp>
-      <p:sp>
-        <p:nvSpPr>
-          <p:cNvPr id="4" name="Oval 3">
-            <a:extLst>
-              <a:ext uri="{FF2B5EF4-FFF2-40B4-BE49-F238E27FC236}">
-                <a16:creationId xmlns:a16="http://schemas.microsoft.com/office/drawing/2014/main" id="{A5D00632-C5F2-B986-62B7-5205D04E5C68}"/>
-              </a:ext>
-            </a:extLst>
-          </p:cNvPr>
-          <p:cNvSpPr>
-            <a:spLocks noChangeAspect="1"/>
-          </p:cNvSpPr>
-          <p:nvPr/>
-        </p:nvSpPr>
-        <p:spPr>
-          <a:xfrm>
-            <a:off x="2004400" y="1846053"/>
-            <a:ext cx="1391874" cy="1357365"/>
-          </a:xfrm>
-          <a:prstGeom prst="ellipse">
-            <a:avLst/>
-          </a:prstGeom>
-          <a:solidFill>
-            <a:srgbClr val="658FFF"/>
-          </a:solidFill>
-          <a:ln>
-            <a:noFill/>
-          </a:ln>
-        </p:spPr>
-        <p:style>
-          <a:lnRef idx="2">
-            <a:schemeClr val="accent1">
-              <a:shade val="15000"/>
-            </a:schemeClr>
-          </a:lnRef>
-          <a:fillRef idx="1">
-            <a:schemeClr val="accent1"/>
-          </a:fillRef>
-          <a:effectRef idx="0">
-            <a:schemeClr val="accent1"/>
-          </a:effectRef>
-          <a:fontRef idx="minor">
-            <a:schemeClr val="lt1"/>
-          </a:fontRef>
-        </p:style>
-        <p:txBody>
-          <a:bodyPr rtlCol="0" anchor="ctr"/>
-          <a:lstStyle/>
-          <a:p>
-            <a:pPr algn="ctr"/>
-            <a:endParaRPr lang="en-GB"/>
-          </a:p>
-        </p:txBody>
-      </p:sp>
-      <p:sp>
-        <p:nvSpPr>
-          <p:cNvPr id="5" name="Triangle 4">
-            <a:extLst>
-              <a:ext uri="{FF2B5EF4-FFF2-40B4-BE49-F238E27FC236}">
-                <a16:creationId xmlns:a16="http://schemas.microsoft.com/office/drawing/2014/main" id="{D8CFA293-B87D-E0E0-0746-085DD53471E8}"/>
-              </a:ext>
-            </a:extLst>
-          </p:cNvPr>
-          <p:cNvSpPr>
-            <a:spLocks noChangeAspect="1"/>
-          </p:cNvSpPr>
-          <p:nvPr/>
-        </p:nvSpPr>
-        <p:spPr>
-          <a:xfrm>
-            <a:off x="254376" y="1846052"/>
-            <a:ext cx="1391874" cy="1357365"/>
-          </a:xfrm>
-          <a:prstGeom prst="triangle">
-            <a:avLst/>
-          </a:prstGeom>
-          <a:solidFill>
-            <a:srgbClr val="FF6100"/>
-          </a:solidFill>
-          <a:ln>
-            <a:noFill/>
-          </a:ln>
-        </p:spPr>
-        <p:style>
-          <a:lnRef idx="2">
-            <a:schemeClr val="accent1">
-              <a:shade val="15000"/>
-            </a:schemeClr>
-          </a:lnRef>
-          <a:fillRef idx="1">
-            <a:schemeClr val="accent1"/>
-          </a:fillRef>
-          <a:effectRef idx="0">
-            <a:schemeClr val="accent1"/>
-          </a:effectRef>
-          <a:fontRef idx="minor">
-            <a:schemeClr val="lt1"/>
-          </a:fontRef>
-        </p:style>
-        <p:txBody>
-          <a:bodyPr rtlCol="0" anchor="ctr"/>
-          <a:lstStyle/>
-          <a:p>
-            <a:pPr algn="ctr"/>
-            <a:endParaRPr lang="en-GB"/>
+            <a:r>
+              <a:rPr lang="en-GB" sz="1800" dirty="0"/>
+              <a:t>The square, which is orange, is left of the circle</a:t>
+            </a:r>
+            <a:br>
+              <a:rPr lang="en-GB" sz="1800" dirty="0"/>
+            </a:br>
+            <a:br>
+              <a:rPr lang="en-GB" sz="1800" dirty="0"/>
+            </a:br>
+            <a:r>
+              <a:rPr lang="en-GB" sz="1800" dirty="0"/>
+              <a:t>Primary: square left of triangle</a:t>
+            </a:r>
+            <a:br>
+              <a:rPr lang="en-GB" sz="1800" dirty="0"/>
+            </a:br>
+            <a:r>
+              <a:rPr lang="en-GB" sz="1800" dirty="0"/>
+              <a:t>Secondary: square is orange</a:t>
+            </a:r>
           </a:p>
         </p:txBody>
       </p:sp>
     </p:spTree>
     <p:extLst>
       <p:ext uri="{BB962C8B-B14F-4D97-AF65-F5344CB8AC3E}">
-        <p14:creationId xmlns:p14="http://schemas.microsoft.com/office/powerpoint/2010/main" val="3167719069"/>
+        <p14:creationId xmlns:p14="http://schemas.microsoft.com/office/powerpoint/2010/main" val="592547744"/>
       </p:ext>
     </p:extLst>
   </p:cSld>
@@ -8673,7 +9126,7 @@
             <a:avLst/>
           </a:prstGeom>
           <a:solidFill>
-            <a:srgbClr val="DC257F"/>
+            <a:srgbClr val="648FFF"/>
           </a:solidFill>
           <a:ln>
             <a:noFill/>
@@ -8727,7 +9180,7 @@
             <a:avLst/>
           </a:prstGeom>
           <a:solidFill>
-            <a:srgbClr val="658FFF"/>
+            <a:srgbClr val="F35BB4"/>
           </a:solidFill>
           <a:ln>
             <a:noFill/>
@@ -8781,7 +9234,7 @@
             <a:avLst/>
           </a:prstGeom>
           <a:solidFill>
-            <a:srgbClr val="F9AD00"/>
+            <a:srgbClr val="0C6B2E"/>
           </a:solidFill>
           <a:ln>
             <a:noFill/>
@@ -8815,7 +9268,7 @@
     </p:spTree>
     <p:extLst>
       <p:ext uri="{BB962C8B-B14F-4D97-AF65-F5344CB8AC3E}">
-        <p14:creationId xmlns:p14="http://schemas.microsoft.com/office/powerpoint/2010/main" val="3739976431"/>
+        <p14:creationId xmlns:p14="http://schemas.microsoft.com/office/powerpoint/2010/main" val="131373489"/>
       </p:ext>
     </p:extLst>
   </p:cSld>
@@ -8865,7 +9318,7 @@
             <a:avLst/>
           </a:prstGeom>
           <a:solidFill>
-            <a:srgbClr val="DC257F"/>
+            <a:srgbClr val="FF9400"/>
           </a:solidFill>
           <a:ln>
             <a:noFill/>
@@ -8919,7 +9372,7 @@
             <a:avLst/>
           </a:prstGeom>
           <a:solidFill>
-            <a:srgbClr val="658FFF"/>
+            <a:srgbClr val="FF9400"/>
           </a:solidFill>
           <a:ln>
             <a:noFill/>
@@ -8973,7 +9426,7 @@
             <a:avLst/>
           </a:prstGeom>
           <a:solidFill>
-            <a:srgbClr val="F9AD00"/>
+            <a:srgbClr val="0E6E2F"/>
           </a:solidFill>
           <a:ln>
             <a:noFill/>
@@ -9007,7 +9460,7 @@
     </p:spTree>
     <p:extLst>
       <p:ext uri="{BB962C8B-B14F-4D97-AF65-F5344CB8AC3E}">
-        <p14:creationId xmlns:p14="http://schemas.microsoft.com/office/powerpoint/2010/main" val="3463237431"/>
+        <p14:creationId xmlns:p14="http://schemas.microsoft.com/office/powerpoint/2010/main" val="278802086"/>
       </p:ext>
     </p:extLst>
   </p:cSld>
@@ -9111,7 +9564,7 @@
             <a:avLst/>
           </a:prstGeom>
           <a:solidFill>
-            <a:srgbClr val="FF9400"/>
+            <a:srgbClr val="F35BB4"/>
           </a:solidFill>
           <a:ln>
             <a:noFill/>
@@ -9165,7 +9618,7 @@
             <a:avLst/>
           </a:prstGeom>
           <a:solidFill>
-            <a:srgbClr val="FF9400"/>
+            <a:srgbClr val="F35BB4"/>
           </a:solidFill>
           <a:ln>
             <a:noFill/>
@@ -9242,14 +9695,14 @@
         </p:nvSpPr>
         <p:spPr>
           <a:xfrm>
-            <a:off x="254376" y="1846054"/>
+            <a:off x="3754424" y="1846051"/>
             <a:ext cx="1391874" cy="1357365"/>
           </a:xfrm>
           <a:prstGeom prst="rect">
             <a:avLst/>
           </a:prstGeom>
           <a:solidFill>
-            <a:srgbClr val="DC257F"/>
+            <a:srgbClr val="0E6E2F"/>
           </a:solidFill>
           <a:ln>
             <a:noFill/>
@@ -9276,7 +9729,7 @@
           <a:lstStyle/>
           <a:p>
             <a:pPr algn="ctr"/>
-            <a:endParaRPr lang="en-GB"/>
+            <a:endParaRPr lang="en-GB" dirty="0"/>
           </a:p>
         </p:txBody>
       </p:sp>
@@ -9350,14 +9803,14 @@
         </p:nvSpPr>
         <p:spPr>
           <a:xfrm>
-            <a:off x="3754424" y="1846052"/>
+            <a:off x="254376" y="1846052"/>
             <a:ext cx="1391874" cy="1357365"/>
           </a:xfrm>
           <a:prstGeom prst="triangle">
             <a:avLst/>
           </a:prstGeom>
           <a:solidFill>
-            <a:srgbClr val="F9AD00"/>
+            <a:srgbClr val="FF6100"/>
           </a:solidFill>
           <a:ln>
             <a:noFill/>
@@ -9391,7 +9844,7 @@
     </p:spTree>
     <p:extLst>
       <p:ext uri="{BB962C8B-B14F-4D97-AF65-F5344CB8AC3E}">
-        <p14:creationId xmlns:p14="http://schemas.microsoft.com/office/powerpoint/2010/main" val="4242367512"/>
+        <p14:creationId xmlns:p14="http://schemas.microsoft.com/office/powerpoint/2010/main" val="3167719069"/>
       </p:ext>
     </p:extLst>
   </p:cSld>
@@ -9434,14 +9887,14 @@
         </p:nvSpPr>
         <p:spPr>
           <a:xfrm>
-            <a:off x="3754425" y="1863893"/>
+            <a:off x="254376" y="1846054"/>
             <a:ext cx="1391874" cy="1357365"/>
           </a:xfrm>
           <a:prstGeom prst="rect">
             <a:avLst/>
           </a:prstGeom>
           <a:solidFill>
-            <a:srgbClr val="F9AE00"/>
+            <a:srgbClr val="DC257F"/>
           </a:solidFill>
           <a:ln>
             <a:noFill/>
@@ -9488,7 +9941,7 @@
         </p:nvSpPr>
         <p:spPr>
           <a:xfrm>
-            <a:off x="254376" y="1846053"/>
+            <a:off x="3754424" y="1846053"/>
             <a:ext cx="1391874" cy="1357365"/>
           </a:xfrm>
           <a:prstGeom prst="ellipse">
@@ -9549,7 +10002,7 @@
             <a:avLst/>
           </a:prstGeom>
           <a:solidFill>
-            <a:srgbClr val="648FFF"/>
+            <a:srgbClr val="F9AD00"/>
           </a:solidFill>
           <a:ln>
             <a:noFill/>
@@ -9583,7 +10036,7 @@
     </p:spTree>
     <p:extLst>
       <p:ext uri="{BB962C8B-B14F-4D97-AF65-F5344CB8AC3E}">
-        <p14:creationId xmlns:p14="http://schemas.microsoft.com/office/powerpoint/2010/main" val="3498030881"/>
+        <p14:creationId xmlns:p14="http://schemas.microsoft.com/office/powerpoint/2010/main" val="3739976431"/>
       </p:ext>
     </p:extLst>
   </p:cSld>
@@ -9626,14 +10079,14 @@
         </p:nvSpPr>
         <p:spPr>
           <a:xfrm>
-            <a:off x="254376" y="1846051"/>
+            <a:off x="2004400" y="1846052"/>
             <a:ext cx="1391874" cy="1357365"/>
           </a:xfrm>
           <a:prstGeom prst="rect">
             <a:avLst/>
           </a:prstGeom>
           <a:solidFill>
-            <a:srgbClr val="648FFF"/>
+            <a:srgbClr val="DC257F"/>
           </a:solidFill>
           <a:ln>
             <a:noFill/>
@@ -9660,7 +10113,7 @@
           <a:lstStyle/>
           <a:p>
             <a:pPr algn="ctr"/>
-            <a:endParaRPr lang="en-GB" dirty="0"/>
+            <a:endParaRPr lang="en-GB"/>
           </a:p>
         </p:txBody>
       </p:sp>
@@ -9680,14 +10133,14 @@
         </p:nvSpPr>
         <p:spPr>
           <a:xfrm>
-            <a:off x="2004400" y="1846051"/>
+            <a:off x="3754424" y="1846053"/>
             <a:ext cx="1391874" cy="1357365"/>
           </a:xfrm>
           <a:prstGeom prst="ellipse">
             <a:avLst/>
           </a:prstGeom>
           <a:solidFill>
-            <a:srgbClr val="0C6B2E"/>
+            <a:srgbClr val="658FFF"/>
           </a:solidFill>
           <a:ln>
             <a:noFill/>
@@ -9734,14 +10187,14 @@
         </p:nvSpPr>
         <p:spPr>
           <a:xfrm>
-            <a:off x="3754424" y="1846051"/>
+            <a:off x="254377" y="1846052"/>
             <a:ext cx="1391874" cy="1357365"/>
           </a:xfrm>
           <a:prstGeom prst="triangle">
             <a:avLst/>
           </a:prstGeom>
           <a:solidFill>
-            <a:srgbClr val="FF9400"/>
+            <a:srgbClr val="F9AD00"/>
           </a:solidFill>
           <a:ln>
             <a:noFill/>
@@ -9775,7 +10228,7 @@
     </p:spTree>
     <p:extLst>
       <p:ext uri="{BB962C8B-B14F-4D97-AF65-F5344CB8AC3E}">
-        <p14:creationId xmlns:p14="http://schemas.microsoft.com/office/powerpoint/2010/main" val="2333275768"/>
+        <p14:creationId xmlns:p14="http://schemas.microsoft.com/office/powerpoint/2010/main" val="3463237431"/>
       </p:ext>
     </p:extLst>
   </p:cSld>
@@ -9818,14 +10271,14 @@
         </p:nvSpPr>
         <p:spPr>
           <a:xfrm>
-            <a:off x="3754424" y="1846052"/>
+            <a:off x="254376" y="1846054"/>
             <a:ext cx="1391874" cy="1357365"/>
           </a:xfrm>
           <a:prstGeom prst="rect">
             <a:avLst/>
           </a:prstGeom>
           <a:solidFill>
-            <a:srgbClr val="FF6100"/>
+            <a:srgbClr val="DC257F"/>
           </a:solidFill>
           <a:ln>
             <a:noFill/>
@@ -9926,7 +10379,7 @@
         </p:nvSpPr>
         <p:spPr>
           <a:xfrm>
-            <a:off x="254377" y="1846052"/>
+            <a:off x="3754424" y="1846052"/>
             <a:ext cx="1391874" cy="1357365"/>
           </a:xfrm>
           <a:prstGeom prst="triangle">
@@ -9967,7 +10420,7 @@
     </p:spTree>
     <p:extLst>
       <p:ext uri="{BB962C8B-B14F-4D97-AF65-F5344CB8AC3E}">
-        <p14:creationId xmlns:p14="http://schemas.microsoft.com/office/powerpoint/2010/main" val="4074140442"/>
+        <p14:creationId xmlns:p14="http://schemas.microsoft.com/office/powerpoint/2010/main" val="4242367512"/>
       </p:ext>
     </p:extLst>
   </p:cSld>
@@ -10017,7 +10470,7 @@
             <a:avLst/>
           </a:prstGeom>
           <a:solidFill>
-            <a:srgbClr val="DC257F"/>
+            <a:srgbClr val="F9AE00"/>
           </a:solidFill>
           <a:ln>
             <a:noFill/>
@@ -10125,7 +10578,7 @@
             <a:avLst/>
           </a:prstGeom>
           <a:solidFill>
-            <a:srgbClr val="F9AD00"/>
+            <a:srgbClr val="648FFF"/>
           </a:solidFill>
           <a:ln>
             <a:noFill/>
@@ -10159,7 +10612,7 @@
     </p:spTree>
     <p:extLst>
       <p:ext uri="{BB962C8B-B14F-4D97-AF65-F5344CB8AC3E}">
-        <p14:creationId xmlns:p14="http://schemas.microsoft.com/office/powerpoint/2010/main" val="378975804"/>
+        <p14:creationId xmlns:p14="http://schemas.microsoft.com/office/powerpoint/2010/main" val="3498030881"/>
       </p:ext>
     </p:extLst>
   </p:cSld>
@@ -10202,14 +10655,14 @@
         </p:nvSpPr>
         <p:spPr>
           <a:xfrm>
-            <a:off x="254377" y="1846050"/>
+            <a:off x="254376" y="1846051"/>
             <a:ext cx="1391874" cy="1357365"/>
           </a:xfrm>
           <a:prstGeom prst="rect">
             <a:avLst/>
           </a:prstGeom>
           <a:solidFill>
-            <a:srgbClr val="F9AE00"/>
+            <a:srgbClr val="648FFF"/>
           </a:solidFill>
           <a:ln>
             <a:noFill/>
@@ -10236,7 +10689,7 @@
           <a:lstStyle/>
           <a:p>
             <a:pPr algn="ctr"/>
-            <a:endParaRPr lang="en-GB"/>
+            <a:endParaRPr lang="en-GB" dirty="0"/>
           </a:p>
         </p:txBody>
       </p:sp>
@@ -10256,14 +10709,14 @@
         </p:nvSpPr>
         <p:spPr>
           <a:xfrm>
-            <a:off x="2004400" y="1846050"/>
+            <a:off x="2004400" y="1846051"/>
             <a:ext cx="1391874" cy="1357365"/>
           </a:xfrm>
           <a:prstGeom prst="ellipse">
             <a:avLst/>
           </a:prstGeom>
           <a:solidFill>
-            <a:srgbClr val="658FFF"/>
+            <a:srgbClr val="0C6B2E"/>
           </a:solidFill>
           <a:ln>
             <a:noFill/>
@@ -10317,7 +10770,7 @@
             <a:avLst/>
           </a:prstGeom>
           <a:solidFill>
-            <a:srgbClr val="F9AD00"/>
+            <a:srgbClr val="FF9400"/>
           </a:solidFill>
           <a:ln>
             <a:noFill/>
@@ -10351,7 +10804,7 @@
     </p:spTree>
     <p:extLst>
       <p:ext uri="{BB962C8B-B14F-4D97-AF65-F5344CB8AC3E}">
-        <p14:creationId xmlns:p14="http://schemas.microsoft.com/office/powerpoint/2010/main" val="4095888511"/>
+        <p14:creationId xmlns:p14="http://schemas.microsoft.com/office/powerpoint/2010/main" val="2333275768"/>
       </p:ext>
     </p:extLst>
   </p:cSld>
@@ -10401,7 +10854,7 @@
             <a:avLst/>
           </a:prstGeom>
           <a:solidFill>
-            <a:srgbClr val="DC257F"/>
+            <a:srgbClr val="FF6100"/>
           </a:solidFill>
           <a:ln>
             <a:noFill/>
@@ -10543,7 +10996,7 @@
     </p:spTree>
     <p:extLst>
       <p:ext uri="{BB962C8B-B14F-4D97-AF65-F5344CB8AC3E}">
-        <p14:creationId xmlns:p14="http://schemas.microsoft.com/office/powerpoint/2010/main" val="668097044"/>
+        <p14:creationId xmlns:p14="http://schemas.microsoft.com/office/powerpoint/2010/main" val="4074140442"/>
       </p:ext>
     </p:extLst>
   </p:cSld>
@@ -10572,61 +11025,170 @@
       </p:grpSpPr>
       <p:sp>
         <p:nvSpPr>
-          <p:cNvPr id="2" name="Title 1">
+          <p:cNvPr id="6" name="Rectangle 5">
             <a:extLst>
               <a:ext uri="{FF2B5EF4-FFF2-40B4-BE49-F238E27FC236}">
-                <a16:creationId xmlns:a16="http://schemas.microsoft.com/office/drawing/2014/main" id="{DC159B37-C523-05DE-B193-27386EC01047}"/>
+                <a16:creationId xmlns:a16="http://schemas.microsoft.com/office/drawing/2014/main" id="{77DC5F38-6BDB-1600-9AB3-2A45AEAB8EAB}"/>
               </a:ext>
             </a:extLst>
           </p:cNvPr>
           <p:cNvSpPr>
-            <a:spLocks noGrp="1"/>
-          </p:cNvSpPr>
-          <p:nvPr>
-            <p:ph type="title"/>
-          </p:nvPr>
+            <a:spLocks noChangeAspect="1"/>
+          </p:cNvSpPr>
+          <p:nvPr/>
         </p:nvSpPr>
         <p:spPr>
           <a:xfrm>
-            <a:off x="267128" y="1924775"/>
-            <a:ext cx="4762250" cy="1551123"/>
+            <a:off x="3754425" y="1863893"/>
+            <a:ext cx="1391874" cy="1357365"/>
           </a:xfrm>
+          <a:prstGeom prst="rect">
+            <a:avLst/>
+          </a:prstGeom>
+          <a:solidFill>
+            <a:srgbClr val="DC257F"/>
+          </a:solidFill>
+          <a:ln>
+            <a:noFill/>
+          </a:ln>
         </p:spPr>
-        <p:txBody>
-          <a:bodyPr>
-            <a:normAutofit/>
-          </a:bodyPr>
+        <p:style>
+          <a:lnRef idx="2">
+            <a:schemeClr val="accent1">
+              <a:shade val="15000"/>
+            </a:schemeClr>
+          </a:lnRef>
+          <a:fillRef idx="1">
+            <a:schemeClr val="accent1"/>
+          </a:fillRef>
+          <a:effectRef idx="0">
+            <a:schemeClr val="accent1"/>
+          </a:effectRef>
+          <a:fontRef idx="minor">
+            <a:schemeClr val="lt1"/>
+          </a:fontRef>
+        </p:style>
+        <p:txBody>
+          <a:bodyPr rtlCol="0" anchor="ctr"/>
           <a:lstStyle/>
           <a:p>
             <a:pPr algn="ctr"/>
-            <a:r>
-              <a:rPr lang="en-GB" sz="1800" dirty="0"/>
-              <a:t>The triangle, which is left of the square, is yellow</a:t>
-            </a:r>
-            <a:br>
-              <a:rPr lang="en-GB" sz="1800" dirty="0"/>
-            </a:br>
-            <a:br>
-              <a:rPr lang="en-GB" sz="1800" dirty="0"/>
-            </a:br>
-            <a:r>
-              <a:rPr lang="en-GB" sz="1800" dirty="0"/>
-              <a:t>Primary: triangle is yellow</a:t>
-            </a:r>
-            <a:br>
-              <a:rPr lang="en-GB" sz="1800" dirty="0"/>
-            </a:br>
-            <a:r>
-              <a:rPr lang="en-GB" sz="1800" dirty="0"/>
-              <a:t>Secondary: triangle is left of square</a:t>
-            </a:r>
+            <a:endParaRPr lang="en-GB"/>
+          </a:p>
+        </p:txBody>
+      </p:sp>
+      <p:sp>
+        <p:nvSpPr>
+          <p:cNvPr id="4" name="Oval 3">
+            <a:extLst>
+              <a:ext uri="{FF2B5EF4-FFF2-40B4-BE49-F238E27FC236}">
+                <a16:creationId xmlns:a16="http://schemas.microsoft.com/office/drawing/2014/main" id="{A5D00632-C5F2-B986-62B7-5205D04E5C68}"/>
+              </a:ext>
+            </a:extLst>
+          </p:cNvPr>
+          <p:cNvSpPr>
+            <a:spLocks noChangeAspect="1"/>
+          </p:cNvSpPr>
+          <p:nvPr/>
+        </p:nvSpPr>
+        <p:spPr>
+          <a:xfrm>
+            <a:off x="254376" y="1846053"/>
+            <a:ext cx="1391874" cy="1357365"/>
+          </a:xfrm>
+          <a:prstGeom prst="ellipse">
+            <a:avLst/>
+          </a:prstGeom>
+          <a:solidFill>
+            <a:srgbClr val="658FFF"/>
+          </a:solidFill>
+          <a:ln>
+            <a:noFill/>
+          </a:ln>
+        </p:spPr>
+        <p:style>
+          <a:lnRef idx="2">
+            <a:schemeClr val="accent1">
+              <a:shade val="15000"/>
+            </a:schemeClr>
+          </a:lnRef>
+          <a:fillRef idx="1">
+            <a:schemeClr val="accent1"/>
+          </a:fillRef>
+          <a:effectRef idx="0">
+            <a:schemeClr val="accent1"/>
+          </a:effectRef>
+          <a:fontRef idx="minor">
+            <a:schemeClr val="lt1"/>
+          </a:fontRef>
+        </p:style>
+        <p:txBody>
+          <a:bodyPr rtlCol="0" anchor="ctr"/>
+          <a:lstStyle/>
+          <a:p>
+            <a:pPr algn="ctr"/>
+            <a:endParaRPr lang="en-GB"/>
+          </a:p>
+        </p:txBody>
+      </p:sp>
+      <p:sp>
+        <p:nvSpPr>
+          <p:cNvPr id="5" name="Triangle 4">
+            <a:extLst>
+              <a:ext uri="{FF2B5EF4-FFF2-40B4-BE49-F238E27FC236}">
+                <a16:creationId xmlns:a16="http://schemas.microsoft.com/office/drawing/2014/main" id="{D8CFA293-B87D-E0E0-0746-085DD53471E8}"/>
+              </a:ext>
+            </a:extLst>
+          </p:cNvPr>
+          <p:cNvSpPr>
+            <a:spLocks noChangeAspect="1"/>
+          </p:cNvSpPr>
+          <p:nvPr/>
+        </p:nvSpPr>
+        <p:spPr>
+          <a:xfrm>
+            <a:off x="2004400" y="1846054"/>
+            <a:ext cx="1391874" cy="1357365"/>
+          </a:xfrm>
+          <a:prstGeom prst="triangle">
+            <a:avLst/>
+          </a:prstGeom>
+          <a:solidFill>
+            <a:srgbClr val="F9AD00"/>
+          </a:solidFill>
+          <a:ln>
+            <a:noFill/>
+          </a:ln>
+        </p:spPr>
+        <p:style>
+          <a:lnRef idx="2">
+            <a:schemeClr val="accent1">
+              <a:shade val="15000"/>
+            </a:schemeClr>
+          </a:lnRef>
+          <a:fillRef idx="1">
+            <a:schemeClr val="accent1"/>
+          </a:fillRef>
+          <a:effectRef idx="0">
+            <a:schemeClr val="accent1"/>
+          </a:effectRef>
+          <a:fontRef idx="minor">
+            <a:schemeClr val="lt1"/>
+          </a:fontRef>
+        </p:style>
+        <p:txBody>
+          <a:bodyPr rtlCol="0" anchor="ctr"/>
+          <a:lstStyle/>
+          <a:p>
+            <a:pPr algn="ctr"/>
+            <a:endParaRPr lang="en-GB"/>
           </a:p>
         </p:txBody>
       </p:sp>
     </p:spTree>
     <p:extLst>
       <p:ext uri="{BB962C8B-B14F-4D97-AF65-F5344CB8AC3E}">
-        <p14:creationId xmlns:p14="http://schemas.microsoft.com/office/powerpoint/2010/main" val="4256202876"/>
+        <p14:creationId xmlns:p14="http://schemas.microsoft.com/office/powerpoint/2010/main" val="378975804"/>
       </p:ext>
     </p:extLst>
   </p:cSld>
@@ -10669,14 +11231,14 @@
         </p:nvSpPr>
         <p:spPr>
           <a:xfrm>
-            <a:off x="3754423" y="1846050"/>
+            <a:off x="254377" y="1846050"/>
             <a:ext cx="1391874" cy="1357365"/>
           </a:xfrm>
           <a:prstGeom prst="rect">
             <a:avLst/>
           </a:prstGeom>
           <a:solidFill>
-            <a:srgbClr val="FF6100"/>
+            <a:srgbClr val="F9AE00"/>
           </a:solidFill>
           <a:ln>
             <a:noFill/>
@@ -10723,7 +11285,7 @@
         </p:nvSpPr>
         <p:spPr>
           <a:xfrm>
-            <a:off x="2004400" y="1846051"/>
+            <a:off x="2004400" y="1846050"/>
             <a:ext cx="1391874" cy="1357365"/>
           </a:xfrm>
           <a:prstGeom prst="ellipse">
@@ -10777,7 +11339,7 @@
         </p:nvSpPr>
         <p:spPr>
           <a:xfrm>
-            <a:off x="254377" y="1846052"/>
+            <a:off x="3754424" y="1846051"/>
             <a:ext cx="1391874" cy="1357365"/>
           </a:xfrm>
           <a:prstGeom prst="triangle">
@@ -10818,7 +11380,7 @@
     </p:spTree>
     <p:extLst>
       <p:ext uri="{BB962C8B-B14F-4D97-AF65-F5344CB8AC3E}">
-        <p14:creationId xmlns:p14="http://schemas.microsoft.com/office/powerpoint/2010/main" val="681272763"/>
+        <p14:creationId xmlns:p14="http://schemas.microsoft.com/office/powerpoint/2010/main" val="4095888511"/>
       </p:ext>
     </p:extLst>
   </p:cSld>
@@ -10861,14 +11423,14 @@
         </p:nvSpPr>
         <p:spPr>
           <a:xfrm>
-            <a:off x="2004400" y="1846052"/>
+            <a:off x="3754424" y="1846052"/>
             <a:ext cx="1391874" cy="1357365"/>
           </a:xfrm>
           <a:prstGeom prst="rect">
             <a:avLst/>
           </a:prstGeom>
           <a:solidFill>
-            <a:srgbClr val="0C6B2E"/>
+            <a:srgbClr val="DC257F"/>
           </a:solidFill>
           <a:ln>
             <a:noFill/>
@@ -10915,7 +11477,7 @@
         </p:nvSpPr>
         <p:spPr>
           <a:xfrm>
-            <a:off x="3754424" y="1846053"/>
+            <a:off x="2004400" y="1846053"/>
             <a:ext cx="1391874" cy="1357365"/>
           </a:xfrm>
           <a:prstGeom prst="ellipse">
@@ -10976,7 +11538,7 @@
             <a:avLst/>
           </a:prstGeom>
           <a:solidFill>
-            <a:srgbClr val="0C6B2E"/>
+            <a:srgbClr val="F9AD00"/>
           </a:solidFill>
           <a:ln>
             <a:noFill/>
@@ -11010,7 +11572,7 @@
     </p:spTree>
     <p:extLst>
       <p:ext uri="{BB962C8B-B14F-4D97-AF65-F5344CB8AC3E}">
-        <p14:creationId xmlns:p14="http://schemas.microsoft.com/office/powerpoint/2010/main" val="988771508"/>
+        <p14:creationId xmlns:p14="http://schemas.microsoft.com/office/powerpoint/2010/main" val="668097044"/>
       </p:ext>
     </p:extLst>
   </p:cSld>
@@ -11114,7 +11676,7 @@
             <a:avLst/>
           </a:prstGeom>
           <a:solidFill>
-            <a:srgbClr val="FF6100"/>
+            <a:srgbClr val="F35BB4"/>
           </a:solidFill>
           <a:ln>
             <a:noFill/>
@@ -11231,170 +11793,61 @@
       </p:grpSpPr>
       <p:sp>
         <p:nvSpPr>
-          <p:cNvPr id="6" name="Rectangle 5">
+          <p:cNvPr id="2" name="Title 1">
             <a:extLst>
               <a:ext uri="{FF2B5EF4-FFF2-40B4-BE49-F238E27FC236}">
-                <a16:creationId xmlns:a16="http://schemas.microsoft.com/office/drawing/2014/main" id="{77DC5F38-6BDB-1600-9AB3-2A45AEAB8EAB}"/>
+                <a16:creationId xmlns:a16="http://schemas.microsoft.com/office/drawing/2014/main" id="{DC159B37-C523-05DE-B193-27386EC01047}"/>
               </a:ext>
             </a:extLst>
           </p:cNvPr>
           <p:cNvSpPr>
-            <a:spLocks noChangeAspect="1"/>
-          </p:cNvSpPr>
-          <p:nvPr/>
+            <a:spLocks noGrp="1"/>
+          </p:cNvSpPr>
+          <p:nvPr>
+            <p:ph type="title"/>
+          </p:nvPr>
         </p:nvSpPr>
         <p:spPr>
           <a:xfrm>
-            <a:off x="3754423" y="1846050"/>
-            <a:ext cx="1391874" cy="1357365"/>
+            <a:off x="267128" y="1924775"/>
+            <a:ext cx="4762250" cy="1551123"/>
           </a:xfrm>
-          <a:prstGeom prst="rect">
-            <a:avLst/>
-          </a:prstGeom>
-          <a:solidFill>
-            <a:srgbClr val="FF6100"/>
-          </a:solidFill>
-          <a:ln>
-            <a:noFill/>
-          </a:ln>
         </p:spPr>
-        <p:style>
-          <a:lnRef idx="2">
-            <a:schemeClr val="accent1">
-              <a:shade val="15000"/>
-            </a:schemeClr>
-          </a:lnRef>
-          <a:fillRef idx="1">
-            <a:schemeClr val="accent1"/>
-          </a:fillRef>
-          <a:effectRef idx="0">
-            <a:schemeClr val="accent1"/>
-          </a:effectRef>
-          <a:fontRef idx="minor">
-            <a:schemeClr val="lt1"/>
-          </a:fontRef>
-        </p:style>
-        <p:txBody>
-          <a:bodyPr rtlCol="0" anchor="ctr"/>
+        <p:txBody>
+          <a:bodyPr>
+            <a:normAutofit/>
+          </a:bodyPr>
           <a:lstStyle/>
           <a:p>
             <a:pPr algn="ctr"/>
-            <a:endParaRPr lang="en-GB"/>
-          </a:p>
-        </p:txBody>
-      </p:sp>
-      <p:sp>
-        <p:nvSpPr>
-          <p:cNvPr id="4" name="Oval 3">
-            <a:extLst>
-              <a:ext uri="{FF2B5EF4-FFF2-40B4-BE49-F238E27FC236}">
-                <a16:creationId xmlns:a16="http://schemas.microsoft.com/office/drawing/2014/main" id="{A5D00632-C5F2-B986-62B7-5205D04E5C68}"/>
-              </a:ext>
-            </a:extLst>
-          </p:cNvPr>
-          <p:cNvSpPr>
-            <a:spLocks noChangeAspect="1"/>
-          </p:cNvSpPr>
-          <p:nvPr/>
-        </p:nvSpPr>
-        <p:spPr>
-          <a:xfrm>
-            <a:off x="254378" y="1846050"/>
-            <a:ext cx="1391874" cy="1357365"/>
-          </a:xfrm>
-          <a:prstGeom prst="ellipse">
-            <a:avLst/>
-          </a:prstGeom>
-          <a:solidFill>
-            <a:srgbClr val="658FFF"/>
-          </a:solidFill>
-          <a:ln>
-            <a:noFill/>
-          </a:ln>
-        </p:spPr>
-        <p:style>
-          <a:lnRef idx="2">
-            <a:schemeClr val="accent1">
-              <a:shade val="15000"/>
-            </a:schemeClr>
-          </a:lnRef>
-          <a:fillRef idx="1">
-            <a:schemeClr val="accent1"/>
-          </a:fillRef>
-          <a:effectRef idx="0">
-            <a:schemeClr val="accent1"/>
-          </a:effectRef>
-          <a:fontRef idx="minor">
-            <a:schemeClr val="lt1"/>
-          </a:fontRef>
-        </p:style>
-        <p:txBody>
-          <a:bodyPr rtlCol="0" anchor="ctr"/>
-          <a:lstStyle/>
-          <a:p>
-            <a:pPr algn="ctr"/>
-            <a:endParaRPr lang="en-GB"/>
-          </a:p>
-        </p:txBody>
-      </p:sp>
-      <p:sp>
-        <p:nvSpPr>
-          <p:cNvPr id="5" name="Triangle 4">
-            <a:extLst>
-              <a:ext uri="{FF2B5EF4-FFF2-40B4-BE49-F238E27FC236}">
-                <a16:creationId xmlns:a16="http://schemas.microsoft.com/office/drawing/2014/main" id="{D8CFA293-B87D-E0E0-0746-085DD53471E8}"/>
-              </a:ext>
-            </a:extLst>
-          </p:cNvPr>
-          <p:cNvSpPr>
-            <a:spLocks noChangeAspect="1"/>
-          </p:cNvSpPr>
-          <p:nvPr/>
-        </p:nvSpPr>
-        <p:spPr>
-          <a:xfrm>
-            <a:off x="2004400" y="1846050"/>
-            <a:ext cx="1391874" cy="1357365"/>
-          </a:xfrm>
-          <a:prstGeom prst="triangle">
-            <a:avLst/>
-          </a:prstGeom>
-          <a:solidFill>
-            <a:srgbClr val="F9AD00"/>
-          </a:solidFill>
-          <a:ln>
-            <a:noFill/>
-          </a:ln>
-        </p:spPr>
-        <p:style>
-          <a:lnRef idx="2">
-            <a:schemeClr val="accent1">
-              <a:shade val="15000"/>
-            </a:schemeClr>
-          </a:lnRef>
-          <a:fillRef idx="1">
-            <a:schemeClr val="accent1"/>
-          </a:fillRef>
-          <a:effectRef idx="0">
-            <a:schemeClr val="accent1"/>
-          </a:effectRef>
-          <a:fontRef idx="minor">
-            <a:schemeClr val="lt1"/>
-          </a:fontRef>
-        </p:style>
-        <p:txBody>
-          <a:bodyPr rtlCol="0" anchor="ctr"/>
-          <a:lstStyle/>
-          <a:p>
-            <a:pPr algn="ctr"/>
-            <a:endParaRPr lang="en-GB"/>
+            <a:r>
+              <a:rPr lang="en-GB" sz="1800" dirty="0"/>
+              <a:t>The triangle, which is left of the square, is yellow</a:t>
+            </a:r>
+            <a:br>
+              <a:rPr lang="en-GB" sz="1800" dirty="0"/>
+            </a:br>
+            <a:br>
+              <a:rPr lang="en-GB" sz="1800" dirty="0"/>
+            </a:br>
+            <a:r>
+              <a:rPr lang="en-GB" sz="1800" dirty="0"/>
+              <a:t>Primary: triangle is yellow</a:t>
+            </a:r>
+            <a:br>
+              <a:rPr lang="en-GB" sz="1800" dirty="0"/>
+            </a:br>
+            <a:r>
+              <a:rPr lang="en-GB" sz="1800" dirty="0"/>
+              <a:t>Secondary: triangle is left of square</a:t>
+            </a:r>
           </a:p>
         </p:txBody>
       </p:sp>
     </p:spTree>
     <p:extLst>
       <p:ext uri="{BB962C8B-B14F-4D97-AF65-F5344CB8AC3E}">
-        <p14:creationId xmlns:p14="http://schemas.microsoft.com/office/powerpoint/2010/main" val="1566346412"/>
+        <p14:creationId xmlns:p14="http://schemas.microsoft.com/office/powerpoint/2010/main" val="4256202876"/>
       </p:ext>
     </p:extLst>
   </p:cSld>
@@ -11437,7 +11890,7 @@
         </p:nvSpPr>
         <p:spPr>
           <a:xfrm>
-            <a:off x="254378" y="1846050"/>
+            <a:off x="3754423" y="1846050"/>
             <a:ext cx="1391874" cy="1357365"/>
           </a:xfrm>
           <a:prstGeom prst="rect">
@@ -11545,7 +11998,7 @@
         </p:nvSpPr>
         <p:spPr>
           <a:xfrm>
-            <a:off x="3754423" y="1846050"/>
+            <a:off x="254377" y="1846052"/>
             <a:ext cx="1391874" cy="1357365"/>
           </a:xfrm>
           <a:prstGeom prst="triangle">
@@ -11586,7 +12039,7 @@
     </p:spTree>
     <p:extLst>
       <p:ext uri="{BB962C8B-B14F-4D97-AF65-F5344CB8AC3E}">
-        <p14:creationId xmlns:p14="http://schemas.microsoft.com/office/powerpoint/2010/main" val="3880578676"/>
+        <p14:creationId xmlns:p14="http://schemas.microsoft.com/office/powerpoint/2010/main" val="681272763"/>
       </p:ext>
     </p:extLst>
   </p:cSld>
@@ -11629,14 +12082,14 @@
         </p:nvSpPr>
         <p:spPr>
           <a:xfrm>
-            <a:off x="254378" y="1846050"/>
+            <a:off x="2004400" y="1846052"/>
             <a:ext cx="1391874" cy="1357365"/>
           </a:xfrm>
           <a:prstGeom prst="rect">
             <a:avLst/>
           </a:prstGeom>
           <a:solidFill>
-            <a:srgbClr val="FF6100"/>
+            <a:srgbClr val="0C6B2E"/>
           </a:solidFill>
           <a:ln>
             <a:noFill/>
@@ -11683,7 +12136,7 @@
         </p:nvSpPr>
         <p:spPr>
           <a:xfrm>
-            <a:off x="3754423" y="1846049"/>
+            <a:off x="3754424" y="1846053"/>
             <a:ext cx="1391874" cy="1357365"/>
           </a:xfrm>
           <a:prstGeom prst="ellipse">
@@ -11737,14 +12190,14 @@
         </p:nvSpPr>
         <p:spPr>
           <a:xfrm>
-            <a:off x="2004400" y="1846049"/>
+            <a:off x="254377" y="1846052"/>
             <a:ext cx="1391874" cy="1357365"/>
           </a:xfrm>
           <a:prstGeom prst="triangle">
             <a:avLst/>
           </a:prstGeom>
           <a:solidFill>
-            <a:srgbClr val="F9AD00"/>
+            <a:srgbClr val="0C6B2E"/>
           </a:solidFill>
           <a:ln>
             <a:noFill/>
@@ -11771,14 +12224,14 @@
           <a:lstStyle/>
           <a:p>
             <a:pPr algn="ctr"/>
-            <a:endParaRPr lang="en-GB" dirty="0"/>
+            <a:endParaRPr lang="en-GB"/>
           </a:p>
         </p:txBody>
       </p:sp>
     </p:spTree>
     <p:extLst>
       <p:ext uri="{BB962C8B-B14F-4D97-AF65-F5344CB8AC3E}">
-        <p14:creationId xmlns:p14="http://schemas.microsoft.com/office/powerpoint/2010/main" val="3283227988"/>
+        <p14:creationId xmlns:p14="http://schemas.microsoft.com/office/powerpoint/2010/main" val="988771508"/>
       </p:ext>
     </p:extLst>
   </p:cSld>
@@ -11821,14 +12274,14 @@
         </p:nvSpPr>
         <p:spPr>
           <a:xfrm>
-            <a:off x="2004400" y="1846049"/>
+            <a:off x="3754423" y="1846050"/>
             <a:ext cx="1391874" cy="1357365"/>
           </a:xfrm>
           <a:prstGeom prst="rect">
             <a:avLst/>
           </a:prstGeom>
           <a:solidFill>
-            <a:srgbClr val="0C6B2E"/>
+            <a:srgbClr val="FF6100"/>
           </a:solidFill>
           <a:ln>
             <a:noFill/>
@@ -11875,14 +12328,14 @@
         </p:nvSpPr>
         <p:spPr>
           <a:xfrm>
-            <a:off x="254377" y="1854557"/>
+            <a:off x="254378" y="1846050"/>
             <a:ext cx="1391874" cy="1357365"/>
           </a:xfrm>
           <a:prstGeom prst="ellipse">
             <a:avLst/>
           </a:prstGeom>
           <a:solidFill>
-            <a:srgbClr val="0C6B2E"/>
+            <a:srgbClr val="658FFF"/>
           </a:solidFill>
           <a:ln>
             <a:noFill/>
@@ -11929,14 +12382,14 @@
         </p:nvSpPr>
         <p:spPr>
           <a:xfrm>
-            <a:off x="3754423" y="1846050"/>
+            <a:off x="2004400" y="1846050"/>
             <a:ext cx="1391874" cy="1357365"/>
           </a:xfrm>
           <a:prstGeom prst="triangle">
             <a:avLst/>
           </a:prstGeom>
           <a:solidFill>
-            <a:srgbClr val="648FFF"/>
+            <a:srgbClr val="F9AD00"/>
           </a:solidFill>
           <a:ln>
             <a:noFill/>
@@ -11970,7 +12423,7 @@
     </p:spTree>
     <p:extLst>
       <p:ext uri="{BB962C8B-B14F-4D97-AF65-F5344CB8AC3E}">
-        <p14:creationId xmlns:p14="http://schemas.microsoft.com/office/powerpoint/2010/main" val="3611824275"/>
+        <p14:creationId xmlns:p14="http://schemas.microsoft.com/office/powerpoint/2010/main" val="1566346412"/>
       </p:ext>
     </p:extLst>
   </p:cSld>
@@ -12013,7 +12466,7 @@
         </p:nvSpPr>
         <p:spPr>
           <a:xfrm>
-            <a:off x="3754423" y="1846050"/>
+            <a:off x="254378" y="1846050"/>
             <a:ext cx="1391874" cy="1357365"/>
           </a:xfrm>
           <a:prstGeom prst="rect">
@@ -12121,14 +12574,14 @@
         </p:nvSpPr>
         <p:spPr>
           <a:xfrm>
-            <a:off x="254377" y="1846052"/>
+            <a:off x="3754423" y="1846050"/>
             <a:ext cx="1391874" cy="1357365"/>
           </a:xfrm>
           <a:prstGeom prst="triangle">
             <a:avLst/>
           </a:prstGeom>
           <a:solidFill>
-            <a:srgbClr val="DC257F"/>
+            <a:srgbClr val="F9AD00"/>
           </a:solidFill>
           <a:ln>
             <a:noFill/>
@@ -12162,7 +12615,7 @@
     </p:spTree>
     <p:extLst>
       <p:ext uri="{BB962C8B-B14F-4D97-AF65-F5344CB8AC3E}">
-        <p14:creationId xmlns:p14="http://schemas.microsoft.com/office/powerpoint/2010/main" val="3617004165"/>
+        <p14:creationId xmlns:p14="http://schemas.microsoft.com/office/powerpoint/2010/main" val="3880578676"/>
       </p:ext>
     </p:extLst>
   </p:cSld>
@@ -12205,7 +12658,7 @@
         </p:nvSpPr>
         <p:spPr>
           <a:xfrm>
-            <a:off x="2004400" y="1846052"/>
+            <a:off x="254378" y="1846050"/>
             <a:ext cx="1391874" cy="1357365"/>
           </a:xfrm>
           <a:prstGeom prst="rect">
@@ -12259,7 +12712,7 @@
         </p:nvSpPr>
         <p:spPr>
           <a:xfrm>
-            <a:off x="3754424" y="1846053"/>
+            <a:off x="3754423" y="1846049"/>
             <a:ext cx="1391874" cy="1357365"/>
           </a:xfrm>
           <a:prstGeom prst="ellipse">
@@ -12313,14 +12766,14 @@
         </p:nvSpPr>
         <p:spPr>
           <a:xfrm>
-            <a:off x="254377" y="1846052"/>
+            <a:off x="2004400" y="1846049"/>
             <a:ext cx="1391874" cy="1357365"/>
           </a:xfrm>
           <a:prstGeom prst="triangle">
             <a:avLst/>
           </a:prstGeom>
           <a:solidFill>
-            <a:srgbClr val="DC257F"/>
+            <a:srgbClr val="F9AD00"/>
           </a:solidFill>
           <a:ln>
             <a:noFill/>
@@ -12347,14 +12800,14 @@
           <a:lstStyle/>
           <a:p>
             <a:pPr algn="ctr"/>
-            <a:endParaRPr lang="en-GB"/>
+            <a:endParaRPr lang="en-GB" dirty="0"/>
           </a:p>
         </p:txBody>
       </p:sp>
     </p:spTree>
     <p:extLst>
       <p:ext uri="{BB962C8B-B14F-4D97-AF65-F5344CB8AC3E}">
-        <p14:creationId xmlns:p14="http://schemas.microsoft.com/office/powerpoint/2010/main" val="2882964139"/>
+        <p14:creationId xmlns:p14="http://schemas.microsoft.com/office/powerpoint/2010/main" val="3283227988"/>
       </p:ext>
     </p:extLst>
   </p:cSld>
@@ -12397,14 +12850,14 @@
         </p:nvSpPr>
         <p:spPr>
           <a:xfrm>
-            <a:off x="3754423" y="1846050"/>
+            <a:off x="2004400" y="1846049"/>
             <a:ext cx="1391874" cy="1357365"/>
           </a:xfrm>
           <a:prstGeom prst="rect">
             <a:avLst/>
           </a:prstGeom>
           <a:solidFill>
-            <a:srgbClr val="FF6100"/>
+            <a:srgbClr val="0C6B2E"/>
           </a:solidFill>
           <a:ln>
             <a:noFill/>
@@ -12451,14 +12904,14 @@
         </p:nvSpPr>
         <p:spPr>
           <a:xfrm>
-            <a:off x="254378" y="1846050"/>
+            <a:off x="254377" y="1854557"/>
             <a:ext cx="1391874" cy="1357365"/>
           </a:xfrm>
           <a:prstGeom prst="ellipse">
             <a:avLst/>
           </a:prstGeom>
           <a:solidFill>
-            <a:srgbClr val="658FFF"/>
+            <a:srgbClr val="0C6B2E"/>
           </a:solidFill>
           <a:ln>
             <a:noFill/>
@@ -12505,14 +12958,14 @@
         </p:nvSpPr>
         <p:spPr>
           <a:xfrm>
-            <a:off x="2004400" y="1846050"/>
+            <a:off x="3754423" y="1846050"/>
             <a:ext cx="1391874" cy="1357365"/>
           </a:xfrm>
           <a:prstGeom prst="triangle">
             <a:avLst/>
           </a:prstGeom>
           <a:solidFill>
-            <a:srgbClr val="DC257F"/>
+            <a:srgbClr val="648FFF"/>
           </a:solidFill>
           <a:ln>
             <a:noFill/>
@@ -12546,7 +12999,7 @@
     </p:spTree>
     <p:extLst>
       <p:ext uri="{BB962C8B-B14F-4D97-AF65-F5344CB8AC3E}">
-        <p14:creationId xmlns:p14="http://schemas.microsoft.com/office/powerpoint/2010/main" val="4157295180"/>
+        <p14:creationId xmlns:p14="http://schemas.microsoft.com/office/powerpoint/2010/main" val="3611824275"/>
       </p:ext>
     </p:extLst>
   </p:cSld>
@@ -12589,7 +13042,7 @@
         </p:nvSpPr>
         <p:spPr>
           <a:xfrm>
-            <a:off x="254378" y="1846050"/>
+            <a:off x="3754423" y="1846050"/>
             <a:ext cx="1391874" cy="1357365"/>
           </a:xfrm>
           <a:prstGeom prst="rect">
@@ -12697,7 +13150,7 @@
         </p:nvSpPr>
         <p:spPr>
           <a:xfrm>
-            <a:off x="3754423" y="1846050"/>
+            <a:off x="254377" y="1846052"/>
             <a:ext cx="1391874" cy="1357365"/>
           </a:xfrm>
           <a:prstGeom prst="triangle">
@@ -12738,7 +13191,7 @@
     </p:spTree>
     <p:extLst>
       <p:ext uri="{BB962C8B-B14F-4D97-AF65-F5344CB8AC3E}">
-        <p14:creationId xmlns:p14="http://schemas.microsoft.com/office/powerpoint/2010/main" val="465693968"/>
+        <p14:creationId xmlns:p14="http://schemas.microsoft.com/office/powerpoint/2010/main" val="3617004165"/>
       </p:ext>
     </p:extLst>
   </p:cSld>
@@ -12781,7 +13234,7 @@
         </p:nvSpPr>
         <p:spPr>
           <a:xfrm>
-            <a:off x="254378" y="1846050"/>
+            <a:off x="2004400" y="1846052"/>
             <a:ext cx="1391874" cy="1357365"/>
           </a:xfrm>
           <a:prstGeom prst="rect">
@@ -12835,7 +13288,7 @@
         </p:nvSpPr>
         <p:spPr>
           <a:xfrm>
-            <a:off x="3754423" y="1846049"/>
+            <a:off x="3754424" y="1846053"/>
             <a:ext cx="1391874" cy="1357365"/>
           </a:xfrm>
           <a:prstGeom prst="ellipse">
@@ -12889,7 +13342,7 @@
         </p:nvSpPr>
         <p:spPr>
           <a:xfrm>
-            <a:off x="2004400" y="1846049"/>
+            <a:off x="254377" y="1846052"/>
             <a:ext cx="1391874" cy="1357365"/>
           </a:xfrm>
           <a:prstGeom prst="triangle">
@@ -12923,14 +13376,14 @@
           <a:lstStyle/>
           <a:p>
             <a:pPr algn="ctr"/>
-            <a:endParaRPr lang="en-GB" dirty="0"/>
+            <a:endParaRPr lang="en-GB"/>
           </a:p>
         </p:txBody>
       </p:sp>
     </p:spTree>
     <p:extLst>
       <p:ext uri="{BB962C8B-B14F-4D97-AF65-F5344CB8AC3E}">
-        <p14:creationId xmlns:p14="http://schemas.microsoft.com/office/powerpoint/2010/main" val="2197134230"/>
+        <p14:creationId xmlns:p14="http://schemas.microsoft.com/office/powerpoint/2010/main" val="2882964139"/>
       </p:ext>
     </p:extLst>
   </p:cSld>
@@ -12973,7 +13426,7 @@
         </p:nvSpPr>
         <p:spPr>
           <a:xfrm>
-            <a:off x="2004400" y="1846049"/>
+            <a:off x="3754423" y="1846050"/>
             <a:ext cx="1391874" cy="1357365"/>
           </a:xfrm>
           <a:prstGeom prst="rect">
@@ -13027,7 +13480,7 @@
         </p:nvSpPr>
         <p:spPr>
           <a:xfrm>
-            <a:off x="254377" y="1854557"/>
+            <a:off x="254378" y="1846050"/>
             <a:ext cx="1391874" cy="1357365"/>
           </a:xfrm>
           <a:prstGeom prst="ellipse">
@@ -13081,7 +13534,7 @@
         </p:nvSpPr>
         <p:spPr>
           <a:xfrm>
-            <a:off x="3754423" y="1846050"/>
+            <a:off x="2004400" y="1846050"/>
             <a:ext cx="1391874" cy="1357365"/>
           </a:xfrm>
           <a:prstGeom prst="triangle">
@@ -13122,7 +13575,7 @@
     </p:spTree>
     <p:extLst>
       <p:ext uri="{BB962C8B-B14F-4D97-AF65-F5344CB8AC3E}">
-        <p14:creationId xmlns:p14="http://schemas.microsoft.com/office/powerpoint/2010/main" val="1484962244"/>
+        <p14:creationId xmlns:p14="http://schemas.microsoft.com/office/powerpoint/2010/main" val="4157295180"/>
       </p:ext>
     </p:extLst>
   </p:cSld>
@@ -13172,7 +13625,7 @@
             <a:avLst/>
           </a:prstGeom>
           <a:solidFill>
-            <a:srgbClr val="FF9400"/>
+            <a:srgbClr val="F35BB4"/>
           </a:solidFill>
           <a:ln>
             <a:noFill/>
@@ -13315,6 +13768,582 @@
     <p:extLst>
       <p:ext uri="{BB962C8B-B14F-4D97-AF65-F5344CB8AC3E}">
         <p14:creationId xmlns:p14="http://schemas.microsoft.com/office/powerpoint/2010/main" val="4131962679"/>
+      </p:ext>
+    </p:extLst>
+  </p:cSld>
+  <p:clrMapOvr>
+    <a:masterClrMapping/>
+  </p:clrMapOvr>
+</p:sld>
+</file>
+
+<file path=ppt/slides/slide40.xml><?xml version="1.0" encoding="utf-8"?>
+<p:sld xmlns:a="http://schemas.openxmlformats.org/drawingml/2006/main" xmlns:r="http://schemas.openxmlformats.org/officeDocument/2006/relationships" xmlns:p="http://schemas.openxmlformats.org/presentationml/2006/main">
+  <p:cSld>
+    <p:spTree>
+      <p:nvGrpSpPr>
+        <p:cNvPr id="1" name=""/>
+        <p:cNvGrpSpPr/>
+        <p:nvPr/>
+      </p:nvGrpSpPr>
+      <p:grpSpPr>
+        <a:xfrm>
+          <a:off x="0" y="0"/>
+          <a:ext cx="0" cy="0"/>
+          <a:chOff x="0" y="0"/>
+          <a:chExt cx="0" cy="0"/>
+        </a:xfrm>
+      </p:grpSpPr>
+      <p:sp>
+        <p:nvSpPr>
+          <p:cNvPr id="6" name="Rectangle 5">
+            <a:extLst>
+              <a:ext uri="{FF2B5EF4-FFF2-40B4-BE49-F238E27FC236}">
+                <a16:creationId xmlns:a16="http://schemas.microsoft.com/office/drawing/2014/main" id="{77DC5F38-6BDB-1600-9AB3-2A45AEAB8EAB}"/>
+              </a:ext>
+            </a:extLst>
+          </p:cNvPr>
+          <p:cNvSpPr>
+            <a:spLocks noChangeAspect="1"/>
+          </p:cNvSpPr>
+          <p:nvPr/>
+        </p:nvSpPr>
+        <p:spPr>
+          <a:xfrm>
+            <a:off x="254378" y="1846050"/>
+            <a:ext cx="1391874" cy="1357365"/>
+          </a:xfrm>
+          <a:prstGeom prst="rect">
+            <a:avLst/>
+          </a:prstGeom>
+          <a:solidFill>
+            <a:srgbClr val="FF6100"/>
+          </a:solidFill>
+          <a:ln>
+            <a:noFill/>
+          </a:ln>
+        </p:spPr>
+        <p:style>
+          <a:lnRef idx="2">
+            <a:schemeClr val="accent1">
+              <a:shade val="15000"/>
+            </a:schemeClr>
+          </a:lnRef>
+          <a:fillRef idx="1">
+            <a:schemeClr val="accent1"/>
+          </a:fillRef>
+          <a:effectRef idx="0">
+            <a:schemeClr val="accent1"/>
+          </a:effectRef>
+          <a:fontRef idx="minor">
+            <a:schemeClr val="lt1"/>
+          </a:fontRef>
+        </p:style>
+        <p:txBody>
+          <a:bodyPr rtlCol="0" anchor="ctr"/>
+          <a:lstStyle/>
+          <a:p>
+            <a:pPr algn="ctr"/>
+            <a:endParaRPr lang="en-GB"/>
+          </a:p>
+        </p:txBody>
+      </p:sp>
+      <p:sp>
+        <p:nvSpPr>
+          <p:cNvPr id="4" name="Oval 3">
+            <a:extLst>
+              <a:ext uri="{FF2B5EF4-FFF2-40B4-BE49-F238E27FC236}">
+                <a16:creationId xmlns:a16="http://schemas.microsoft.com/office/drawing/2014/main" id="{A5D00632-C5F2-B986-62B7-5205D04E5C68}"/>
+              </a:ext>
+            </a:extLst>
+          </p:cNvPr>
+          <p:cNvSpPr>
+            <a:spLocks noChangeAspect="1"/>
+          </p:cNvSpPr>
+          <p:nvPr/>
+        </p:nvSpPr>
+        <p:spPr>
+          <a:xfrm>
+            <a:off x="2004400" y="1846051"/>
+            <a:ext cx="1391874" cy="1357365"/>
+          </a:xfrm>
+          <a:prstGeom prst="ellipse">
+            <a:avLst/>
+          </a:prstGeom>
+          <a:solidFill>
+            <a:srgbClr val="658FFF"/>
+          </a:solidFill>
+          <a:ln>
+            <a:noFill/>
+          </a:ln>
+        </p:spPr>
+        <p:style>
+          <a:lnRef idx="2">
+            <a:schemeClr val="accent1">
+              <a:shade val="15000"/>
+            </a:schemeClr>
+          </a:lnRef>
+          <a:fillRef idx="1">
+            <a:schemeClr val="accent1"/>
+          </a:fillRef>
+          <a:effectRef idx="0">
+            <a:schemeClr val="accent1"/>
+          </a:effectRef>
+          <a:fontRef idx="minor">
+            <a:schemeClr val="lt1"/>
+          </a:fontRef>
+        </p:style>
+        <p:txBody>
+          <a:bodyPr rtlCol="0" anchor="ctr"/>
+          <a:lstStyle/>
+          <a:p>
+            <a:pPr algn="ctr"/>
+            <a:endParaRPr lang="en-GB"/>
+          </a:p>
+        </p:txBody>
+      </p:sp>
+      <p:sp>
+        <p:nvSpPr>
+          <p:cNvPr id="5" name="Triangle 4">
+            <a:extLst>
+              <a:ext uri="{FF2B5EF4-FFF2-40B4-BE49-F238E27FC236}">
+                <a16:creationId xmlns:a16="http://schemas.microsoft.com/office/drawing/2014/main" id="{D8CFA293-B87D-E0E0-0746-085DD53471E8}"/>
+              </a:ext>
+            </a:extLst>
+          </p:cNvPr>
+          <p:cNvSpPr>
+            <a:spLocks noChangeAspect="1"/>
+          </p:cNvSpPr>
+          <p:nvPr/>
+        </p:nvSpPr>
+        <p:spPr>
+          <a:xfrm>
+            <a:off x="3754423" y="1846050"/>
+            <a:ext cx="1391874" cy="1357365"/>
+          </a:xfrm>
+          <a:prstGeom prst="triangle">
+            <a:avLst/>
+          </a:prstGeom>
+          <a:solidFill>
+            <a:srgbClr val="DC257F"/>
+          </a:solidFill>
+          <a:ln>
+            <a:noFill/>
+          </a:ln>
+        </p:spPr>
+        <p:style>
+          <a:lnRef idx="2">
+            <a:schemeClr val="accent1">
+              <a:shade val="15000"/>
+            </a:schemeClr>
+          </a:lnRef>
+          <a:fillRef idx="1">
+            <a:schemeClr val="accent1"/>
+          </a:fillRef>
+          <a:effectRef idx="0">
+            <a:schemeClr val="accent1"/>
+          </a:effectRef>
+          <a:fontRef idx="minor">
+            <a:schemeClr val="lt1"/>
+          </a:fontRef>
+        </p:style>
+        <p:txBody>
+          <a:bodyPr rtlCol="0" anchor="ctr"/>
+          <a:lstStyle/>
+          <a:p>
+            <a:pPr algn="ctr"/>
+            <a:endParaRPr lang="en-GB"/>
+          </a:p>
+        </p:txBody>
+      </p:sp>
+    </p:spTree>
+    <p:extLst>
+      <p:ext uri="{BB962C8B-B14F-4D97-AF65-F5344CB8AC3E}">
+        <p14:creationId xmlns:p14="http://schemas.microsoft.com/office/powerpoint/2010/main" val="465693968"/>
+      </p:ext>
+    </p:extLst>
+  </p:cSld>
+  <p:clrMapOvr>
+    <a:masterClrMapping/>
+  </p:clrMapOvr>
+</p:sld>
+</file>
+
+<file path=ppt/slides/slide41.xml><?xml version="1.0" encoding="utf-8"?>
+<p:sld xmlns:a="http://schemas.openxmlformats.org/drawingml/2006/main" xmlns:r="http://schemas.openxmlformats.org/officeDocument/2006/relationships" xmlns:p="http://schemas.openxmlformats.org/presentationml/2006/main">
+  <p:cSld>
+    <p:spTree>
+      <p:nvGrpSpPr>
+        <p:cNvPr id="1" name=""/>
+        <p:cNvGrpSpPr/>
+        <p:nvPr/>
+      </p:nvGrpSpPr>
+      <p:grpSpPr>
+        <a:xfrm>
+          <a:off x="0" y="0"/>
+          <a:ext cx="0" cy="0"/>
+          <a:chOff x="0" y="0"/>
+          <a:chExt cx="0" cy="0"/>
+        </a:xfrm>
+      </p:grpSpPr>
+      <p:sp>
+        <p:nvSpPr>
+          <p:cNvPr id="6" name="Rectangle 5">
+            <a:extLst>
+              <a:ext uri="{FF2B5EF4-FFF2-40B4-BE49-F238E27FC236}">
+                <a16:creationId xmlns:a16="http://schemas.microsoft.com/office/drawing/2014/main" id="{77DC5F38-6BDB-1600-9AB3-2A45AEAB8EAB}"/>
+              </a:ext>
+            </a:extLst>
+          </p:cNvPr>
+          <p:cNvSpPr>
+            <a:spLocks noChangeAspect="1"/>
+          </p:cNvSpPr>
+          <p:nvPr/>
+        </p:nvSpPr>
+        <p:spPr>
+          <a:xfrm>
+            <a:off x="254378" y="1846050"/>
+            <a:ext cx="1391874" cy="1357365"/>
+          </a:xfrm>
+          <a:prstGeom prst="rect">
+            <a:avLst/>
+          </a:prstGeom>
+          <a:solidFill>
+            <a:srgbClr val="FF6100"/>
+          </a:solidFill>
+          <a:ln>
+            <a:noFill/>
+          </a:ln>
+        </p:spPr>
+        <p:style>
+          <a:lnRef idx="2">
+            <a:schemeClr val="accent1">
+              <a:shade val="15000"/>
+            </a:schemeClr>
+          </a:lnRef>
+          <a:fillRef idx="1">
+            <a:schemeClr val="accent1"/>
+          </a:fillRef>
+          <a:effectRef idx="0">
+            <a:schemeClr val="accent1"/>
+          </a:effectRef>
+          <a:fontRef idx="minor">
+            <a:schemeClr val="lt1"/>
+          </a:fontRef>
+        </p:style>
+        <p:txBody>
+          <a:bodyPr rtlCol="0" anchor="ctr"/>
+          <a:lstStyle/>
+          <a:p>
+            <a:pPr algn="ctr"/>
+            <a:endParaRPr lang="en-GB"/>
+          </a:p>
+        </p:txBody>
+      </p:sp>
+      <p:sp>
+        <p:nvSpPr>
+          <p:cNvPr id="4" name="Oval 3">
+            <a:extLst>
+              <a:ext uri="{FF2B5EF4-FFF2-40B4-BE49-F238E27FC236}">
+                <a16:creationId xmlns:a16="http://schemas.microsoft.com/office/drawing/2014/main" id="{A5D00632-C5F2-B986-62B7-5205D04E5C68}"/>
+              </a:ext>
+            </a:extLst>
+          </p:cNvPr>
+          <p:cNvSpPr>
+            <a:spLocks noChangeAspect="1"/>
+          </p:cNvSpPr>
+          <p:nvPr/>
+        </p:nvSpPr>
+        <p:spPr>
+          <a:xfrm>
+            <a:off x="3754423" y="1846049"/>
+            <a:ext cx="1391874" cy="1357365"/>
+          </a:xfrm>
+          <a:prstGeom prst="ellipse">
+            <a:avLst/>
+          </a:prstGeom>
+          <a:solidFill>
+            <a:srgbClr val="658FFF"/>
+          </a:solidFill>
+          <a:ln>
+            <a:noFill/>
+          </a:ln>
+        </p:spPr>
+        <p:style>
+          <a:lnRef idx="2">
+            <a:schemeClr val="accent1">
+              <a:shade val="15000"/>
+            </a:schemeClr>
+          </a:lnRef>
+          <a:fillRef idx="1">
+            <a:schemeClr val="accent1"/>
+          </a:fillRef>
+          <a:effectRef idx="0">
+            <a:schemeClr val="accent1"/>
+          </a:effectRef>
+          <a:fontRef idx="minor">
+            <a:schemeClr val="lt1"/>
+          </a:fontRef>
+        </p:style>
+        <p:txBody>
+          <a:bodyPr rtlCol="0" anchor="ctr"/>
+          <a:lstStyle/>
+          <a:p>
+            <a:pPr algn="ctr"/>
+            <a:endParaRPr lang="en-GB"/>
+          </a:p>
+        </p:txBody>
+      </p:sp>
+      <p:sp>
+        <p:nvSpPr>
+          <p:cNvPr id="5" name="Triangle 4">
+            <a:extLst>
+              <a:ext uri="{FF2B5EF4-FFF2-40B4-BE49-F238E27FC236}">
+                <a16:creationId xmlns:a16="http://schemas.microsoft.com/office/drawing/2014/main" id="{D8CFA293-B87D-E0E0-0746-085DD53471E8}"/>
+              </a:ext>
+            </a:extLst>
+          </p:cNvPr>
+          <p:cNvSpPr>
+            <a:spLocks noChangeAspect="1"/>
+          </p:cNvSpPr>
+          <p:nvPr/>
+        </p:nvSpPr>
+        <p:spPr>
+          <a:xfrm>
+            <a:off x="2004400" y="1846049"/>
+            <a:ext cx="1391874" cy="1357365"/>
+          </a:xfrm>
+          <a:prstGeom prst="triangle">
+            <a:avLst/>
+          </a:prstGeom>
+          <a:solidFill>
+            <a:srgbClr val="DC257F"/>
+          </a:solidFill>
+          <a:ln>
+            <a:noFill/>
+          </a:ln>
+        </p:spPr>
+        <p:style>
+          <a:lnRef idx="2">
+            <a:schemeClr val="accent1">
+              <a:shade val="15000"/>
+            </a:schemeClr>
+          </a:lnRef>
+          <a:fillRef idx="1">
+            <a:schemeClr val="accent1"/>
+          </a:fillRef>
+          <a:effectRef idx="0">
+            <a:schemeClr val="accent1"/>
+          </a:effectRef>
+          <a:fontRef idx="minor">
+            <a:schemeClr val="lt1"/>
+          </a:fontRef>
+        </p:style>
+        <p:txBody>
+          <a:bodyPr rtlCol="0" anchor="ctr"/>
+          <a:lstStyle/>
+          <a:p>
+            <a:pPr algn="ctr"/>
+            <a:endParaRPr lang="en-GB" dirty="0"/>
+          </a:p>
+        </p:txBody>
+      </p:sp>
+    </p:spTree>
+    <p:extLst>
+      <p:ext uri="{BB962C8B-B14F-4D97-AF65-F5344CB8AC3E}">
+        <p14:creationId xmlns:p14="http://schemas.microsoft.com/office/powerpoint/2010/main" val="2197134230"/>
+      </p:ext>
+    </p:extLst>
+  </p:cSld>
+  <p:clrMapOvr>
+    <a:masterClrMapping/>
+  </p:clrMapOvr>
+</p:sld>
+</file>
+
+<file path=ppt/slides/slide42.xml><?xml version="1.0" encoding="utf-8"?>
+<p:sld xmlns:a="http://schemas.openxmlformats.org/drawingml/2006/main" xmlns:r="http://schemas.openxmlformats.org/officeDocument/2006/relationships" xmlns:p="http://schemas.openxmlformats.org/presentationml/2006/main">
+  <p:cSld>
+    <p:spTree>
+      <p:nvGrpSpPr>
+        <p:cNvPr id="1" name=""/>
+        <p:cNvGrpSpPr/>
+        <p:nvPr/>
+      </p:nvGrpSpPr>
+      <p:grpSpPr>
+        <a:xfrm>
+          <a:off x="0" y="0"/>
+          <a:ext cx="0" cy="0"/>
+          <a:chOff x="0" y="0"/>
+          <a:chExt cx="0" cy="0"/>
+        </a:xfrm>
+      </p:grpSpPr>
+      <p:sp>
+        <p:nvSpPr>
+          <p:cNvPr id="6" name="Rectangle 5">
+            <a:extLst>
+              <a:ext uri="{FF2B5EF4-FFF2-40B4-BE49-F238E27FC236}">
+                <a16:creationId xmlns:a16="http://schemas.microsoft.com/office/drawing/2014/main" id="{77DC5F38-6BDB-1600-9AB3-2A45AEAB8EAB}"/>
+              </a:ext>
+            </a:extLst>
+          </p:cNvPr>
+          <p:cNvSpPr>
+            <a:spLocks noChangeAspect="1"/>
+          </p:cNvSpPr>
+          <p:nvPr/>
+        </p:nvSpPr>
+        <p:spPr>
+          <a:xfrm>
+            <a:off x="2004400" y="1846049"/>
+            <a:ext cx="1391874" cy="1357365"/>
+          </a:xfrm>
+          <a:prstGeom prst="rect">
+            <a:avLst/>
+          </a:prstGeom>
+          <a:solidFill>
+            <a:srgbClr val="FF6100"/>
+          </a:solidFill>
+          <a:ln>
+            <a:noFill/>
+          </a:ln>
+        </p:spPr>
+        <p:style>
+          <a:lnRef idx="2">
+            <a:schemeClr val="accent1">
+              <a:shade val="15000"/>
+            </a:schemeClr>
+          </a:lnRef>
+          <a:fillRef idx="1">
+            <a:schemeClr val="accent1"/>
+          </a:fillRef>
+          <a:effectRef idx="0">
+            <a:schemeClr val="accent1"/>
+          </a:effectRef>
+          <a:fontRef idx="minor">
+            <a:schemeClr val="lt1"/>
+          </a:fontRef>
+        </p:style>
+        <p:txBody>
+          <a:bodyPr rtlCol="0" anchor="ctr"/>
+          <a:lstStyle/>
+          <a:p>
+            <a:pPr algn="ctr"/>
+            <a:endParaRPr lang="en-GB"/>
+          </a:p>
+        </p:txBody>
+      </p:sp>
+      <p:sp>
+        <p:nvSpPr>
+          <p:cNvPr id="4" name="Oval 3">
+            <a:extLst>
+              <a:ext uri="{FF2B5EF4-FFF2-40B4-BE49-F238E27FC236}">
+                <a16:creationId xmlns:a16="http://schemas.microsoft.com/office/drawing/2014/main" id="{A5D00632-C5F2-B986-62B7-5205D04E5C68}"/>
+              </a:ext>
+            </a:extLst>
+          </p:cNvPr>
+          <p:cNvSpPr>
+            <a:spLocks noChangeAspect="1"/>
+          </p:cNvSpPr>
+          <p:nvPr/>
+        </p:nvSpPr>
+        <p:spPr>
+          <a:xfrm>
+            <a:off x="254377" y="1854557"/>
+            <a:ext cx="1391874" cy="1357365"/>
+          </a:xfrm>
+          <a:prstGeom prst="ellipse">
+            <a:avLst/>
+          </a:prstGeom>
+          <a:solidFill>
+            <a:srgbClr val="658FFF"/>
+          </a:solidFill>
+          <a:ln>
+            <a:noFill/>
+          </a:ln>
+        </p:spPr>
+        <p:style>
+          <a:lnRef idx="2">
+            <a:schemeClr val="accent1">
+              <a:shade val="15000"/>
+            </a:schemeClr>
+          </a:lnRef>
+          <a:fillRef idx="1">
+            <a:schemeClr val="accent1"/>
+          </a:fillRef>
+          <a:effectRef idx="0">
+            <a:schemeClr val="accent1"/>
+          </a:effectRef>
+          <a:fontRef idx="minor">
+            <a:schemeClr val="lt1"/>
+          </a:fontRef>
+        </p:style>
+        <p:txBody>
+          <a:bodyPr rtlCol="0" anchor="ctr"/>
+          <a:lstStyle/>
+          <a:p>
+            <a:pPr algn="ctr"/>
+            <a:endParaRPr lang="en-GB"/>
+          </a:p>
+        </p:txBody>
+      </p:sp>
+      <p:sp>
+        <p:nvSpPr>
+          <p:cNvPr id="5" name="Triangle 4">
+            <a:extLst>
+              <a:ext uri="{FF2B5EF4-FFF2-40B4-BE49-F238E27FC236}">
+                <a16:creationId xmlns:a16="http://schemas.microsoft.com/office/drawing/2014/main" id="{D8CFA293-B87D-E0E0-0746-085DD53471E8}"/>
+              </a:ext>
+            </a:extLst>
+          </p:cNvPr>
+          <p:cNvSpPr>
+            <a:spLocks noChangeAspect="1"/>
+          </p:cNvSpPr>
+          <p:nvPr/>
+        </p:nvSpPr>
+        <p:spPr>
+          <a:xfrm>
+            <a:off x="3754423" y="1846050"/>
+            <a:ext cx="1391874" cy="1357365"/>
+          </a:xfrm>
+          <a:prstGeom prst="triangle">
+            <a:avLst/>
+          </a:prstGeom>
+          <a:solidFill>
+            <a:srgbClr val="DC257F"/>
+          </a:solidFill>
+          <a:ln>
+            <a:noFill/>
+          </a:ln>
+        </p:spPr>
+        <p:style>
+          <a:lnRef idx="2">
+            <a:schemeClr val="accent1">
+              <a:shade val="15000"/>
+            </a:schemeClr>
+          </a:lnRef>
+          <a:fillRef idx="1">
+            <a:schemeClr val="accent1"/>
+          </a:fillRef>
+          <a:effectRef idx="0">
+            <a:schemeClr val="accent1"/>
+          </a:effectRef>
+          <a:fontRef idx="minor">
+            <a:schemeClr val="lt1"/>
+          </a:fontRef>
+        </p:style>
+        <p:txBody>
+          <a:bodyPr rtlCol="0" anchor="ctr"/>
+          <a:lstStyle/>
+          <a:p>
+            <a:pPr algn="ctr"/>
+            <a:endParaRPr lang="en-GB"/>
+          </a:p>
+        </p:txBody>
+      </p:sp>
+    </p:spTree>
+    <p:extLst>
+      <p:ext uri="{BB962C8B-B14F-4D97-AF65-F5344CB8AC3E}">
+        <p14:creationId xmlns:p14="http://schemas.microsoft.com/office/powerpoint/2010/main" val="1484962244"/>
       </p:ext>
     </p:extLst>
   </p:cSld>
@@ -13472,7 +14501,7 @@
             <a:avLst/>
           </a:prstGeom>
           <a:solidFill>
-            <a:srgbClr val="FF9400"/>
+            <a:srgbClr val="F35BB4"/>
           </a:solidFill>
           <a:ln>
             <a:noFill/>
@@ -13556,7 +14585,7 @@
             <a:avLst/>
           </a:prstGeom>
           <a:solidFill>
-            <a:srgbClr val="FF9400"/>
+            <a:srgbClr val="F35BB4"/>
           </a:solidFill>
           <a:ln>
             <a:noFill/>
@@ -13748,7 +14777,7 @@
             <a:avLst/>
           </a:prstGeom>
           <a:solidFill>
-            <a:srgbClr val="648FFF"/>
+            <a:srgbClr val="F35BB4"/>
           </a:solidFill>
           <a:ln>
             <a:noFill/>
@@ -13856,7 +14885,7 @@
             <a:avLst/>
           </a:prstGeom>
           <a:solidFill>
-            <a:srgbClr val="0C6B2E"/>
+            <a:srgbClr val="F35BB4"/>
           </a:solidFill>
           <a:ln>
             <a:noFill/>
@@ -14048,7 +15077,7 @@
             <a:avLst/>
           </a:prstGeom>
           <a:solidFill>
-            <a:srgbClr val="FF9400"/>
+            <a:srgbClr val="F57600"/>
           </a:solidFill>
           <a:ln>
             <a:noFill/>
@@ -14097,7 +15126,13 @@
   <p:cSld>
     <p:spTree>
       <p:nvGrpSpPr>
-        <p:cNvPr id="1" name=""/>
+        <p:cNvPr id="1" name="">
+          <a:extLst>
+            <a:ext uri="{FF2B5EF4-FFF2-40B4-BE49-F238E27FC236}">
+              <a16:creationId xmlns:a16="http://schemas.microsoft.com/office/drawing/2014/main" id="{763166E4-4755-DD68-D208-C6704232839B}"/>
+            </a:ext>
+          </a:extLst>
+        </p:cNvPr>
         <p:cNvGrpSpPr/>
         <p:nvPr/>
       </p:nvGrpSpPr>
@@ -14114,7 +15149,7 @@
           <p:cNvPr id="4" name="Oval 3">
             <a:extLst>
               <a:ext uri="{FF2B5EF4-FFF2-40B4-BE49-F238E27FC236}">
-                <a16:creationId xmlns:a16="http://schemas.microsoft.com/office/drawing/2014/main" id="{A5D00632-C5F2-B986-62B7-5205D04E5C68}"/>
+                <a16:creationId xmlns:a16="http://schemas.microsoft.com/office/drawing/2014/main" id="{EDD92874-0E61-9FD3-4C8D-DD9AA9C193EE}"/>
               </a:ext>
             </a:extLst>
           </p:cNvPr>
@@ -14125,7 +15160,7 @@
         </p:nvSpPr>
         <p:spPr>
           <a:xfrm>
-            <a:off x="2004400" y="1840239"/>
+            <a:off x="3754423" y="1846050"/>
             <a:ext cx="1391874" cy="1357365"/>
           </a:xfrm>
           <a:prstGeom prst="ellipse">
@@ -14168,7 +15203,7 @@
           <p:cNvPr id="5" name="Triangle 4">
             <a:extLst>
               <a:ext uri="{FF2B5EF4-FFF2-40B4-BE49-F238E27FC236}">
-                <a16:creationId xmlns:a16="http://schemas.microsoft.com/office/drawing/2014/main" id="{D8CFA293-B87D-E0E0-0746-085DD53471E8}"/>
+                <a16:creationId xmlns:a16="http://schemas.microsoft.com/office/drawing/2014/main" id="{FAA7D6F8-93E9-330E-9010-E1FE852E4C38}"/>
               </a:ext>
             </a:extLst>
           </p:cNvPr>
@@ -14179,64 +15214,10 @@
         </p:nvSpPr>
         <p:spPr>
           <a:xfrm>
-            <a:off x="3754424" y="1846053"/>
+            <a:off x="254377" y="1846050"/>
             <a:ext cx="1391874" cy="1357365"/>
           </a:xfrm>
           <a:prstGeom prst="triangle">
-            <a:avLst/>
-          </a:prstGeom>
-          <a:solidFill>
-            <a:srgbClr val="FF9400"/>
-          </a:solidFill>
-          <a:ln>
-            <a:noFill/>
-          </a:ln>
-        </p:spPr>
-        <p:style>
-          <a:lnRef idx="2">
-            <a:schemeClr val="accent1">
-              <a:shade val="15000"/>
-            </a:schemeClr>
-          </a:lnRef>
-          <a:fillRef idx="1">
-            <a:schemeClr val="accent1"/>
-          </a:fillRef>
-          <a:effectRef idx="0">
-            <a:schemeClr val="accent1"/>
-          </a:effectRef>
-          <a:fontRef idx="minor">
-            <a:schemeClr val="lt1"/>
-          </a:fontRef>
-        </p:style>
-        <p:txBody>
-          <a:bodyPr rtlCol="0" anchor="ctr"/>
-          <a:lstStyle/>
-          <a:p>
-            <a:pPr algn="ctr"/>
-            <a:endParaRPr lang="en-GB"/>
-          </a:p>
-        </p:txBody>
-      </p:sp>
-      <p:sp>
-        <p:nvSpPr>
-          <p:cNvPr id="6" name="Rectangle 5">
-            <a:extLst>
-              <a:ext uri="{FF2B5EF4-FFF2-40B4-BE49-F238E27FC236}">
-                <a16:creationId xmlns:a16="http://schemas.microsoft.com/office/drawing/2014/main" id="{77DC5F38-6BDB-1600-9AB3-2A45AEAB8EAB}"/>
-              </a:ext>
-            </a:extLst>
-          </p:cNvPr>
-          <p:cNvSpPr>
-            <a:spLocks noChangeAspect="1"/>
-          </p:cNvSpPr>
-          <p:nvPr/>
-        </p:nvSpPr>
-        <p:spPr>
-          <a:xfrm>
-            <a:off x="254376" y="1840238"/>
-            <a:ext cx="1391874" cy="1357365"/>
-          </a:xfrm>
-          <a:prstGeom prst="rect">
             <a:avLst/>
           </a:prstGeom>
           <a:solidFill>
@@ -14267,6 +15248,60 @@
           <a:lstStyle/>
           <a:p>
             <a:pPr algn="ctr"/>
+            <a:endParaRPr lang="en-GB" dirty="0"/>
+          </a:p>
+        </p:txBody>
+      </p:sp>
+      <p:sp>
+        <p:nvSpPr>
+          <p:cNvPr id="2" name="Oval 1">
+            <a:extLst>
+              <a:ext uri="{FF2B5EF4-FFF2-40B4-BE49-F238E27FC236}">
+                <a16:creationId xmlns:a16="http://schemas.microsoft.com/office/drawing/2014/main" id="{96770C80-15B3-6C6A-93EC-B86EBE7EFB98}"/>
+              </a:ext>
+            </a:extLst>
+          </p:cNvPr>
+          <p:cNvSpPr>
+            <a:spLocks noChangeAspect="1"/>
+          </p:cNvSpPr>
+          <p:nvPr/>
+        </p:nvSpPr>
+        <p:spPr>
+          <a:xfrm>
+            <a:off x="2004400" y="1846051"/>
+            <a:ext cx="1391874" cy="1357365"/>
+          </a:xfrm>
+          <a:prstGeom prst="ellipse">
+            <a:avLst/>
+          </a:prstGeom>
+          <a:solidFill>
+            <a:srgbClr val="F35BB4"/>
+          </a:solidFill>
+          <a:ln>
+            <a:noFill/>
+          </a:ln>
+        </p:spPr>
+        <p:style>
+          <a:lnRef idx="2">
+            <a:schemeClr val="accent1">
+              <a:shade val="15000"/>
+            </a:schemeClr>
+          </a:lnRef>
+          <a:fillRef idx="1">
+            <a:schemeClr val="accent1"/>
+          </a:fillRef>
+          <a:effectRef idx="0">
+            <a:schemeClr val="accent1"/>
+          </a:effectRef>
+          <a:fontRef idx="minor">
+            <a:schemeClr val="lt1"/>
+          </a:fontRef>
+        </p:style>
+        <p:txBody>
+          <a:bodyPr rtlCol="0" anchor="ctr"/>
+          <a:lstStyle/>
+          <a:p>
+            <a:pPr algn="ctr"/>
             <a:endParaRPr lang="en-GB"/>
           </a:p>
         </p:txBody>
@@ -14274,7 +15309,7 @@
     </p:spTree>
     <p:extLst>
       <p:ext uri="{BB962C8B-B14F-4D97-AF65-F5344CB8AC3E}">
-        <p14:creationId xmlns:p14="http://schemas.microsoft.com/office/powerpoint/2010/main" val="9109051"/>
+        <p14:creationId xmlns:p14="http://schemas.microsoft.com/office/powerpoint/2010/main" val="1035981177"/>
       </p:ext>
     </p:extLst>
   </p:cSld>

</xml_diff>